<commit_message>
Imcomlete presentation - WEEK 04
</commit_message>
<xml_diff>
--- a/prabhashwara/PROGRESS AND SUMMARY.pptx
+++ b/prabhashwara/PROGRESS AND SUMMARY.pptx
@@ -4,6 +4,9 @@
   <p:sldMasterIdLst>
     <p:sldMasterId id="2147483648" r:id="rId1"/>
   </p:sldMasterIdLst>
+  <p:notesMasterIdLst>
+    <p:notesMasterId r:id="rId17"/>
+  </p:notesMasterIdLst>
   <p:sldIdLst>
     <p:sldId id="256" r:id="rId2"/>
     <p:sldId id="257" r:id="rId3"/>
@@ -12,7 +15,14 @@
     <p:sldId id="260" r:id="rId6"/>
     <p:sldId id="261" r:id="rId7"/>
     <p:sldId id="263" r:id="rId8"/>
-    <p:sldId id="262" r:id="rId9"/>
+    <p:sldId id="264" r:id="rId9"/>
+    <p:sldId id="265" r:id="rId10"/>
+    <p:sldId id="266" r:id="rId11"/>
+    <p:sldId id="267" r:id="rId12"/>
+    <p:sldId id="268" r:id="rId13"/>
+    <p:sldId id="269" r:id="rId14"/>
+    <p:sldId id="270" r:id="rId15"/>
+    <p:sldId id="271" r:id="rId16"/>
   </p:sldIdLst>
   <p:sldSz cx="12192000" cy="6858000"/>
   <p:notesSz cx="6858000" cy="9144000"/>
@@ -119,6 +129,355 @@
 </p:presentation>
 </file>
 
+<file path=ppt/notesMasters/notesMaster1.xml><?xml version="1.0" encoding="utf-8"?>
+<p:notesMaster xmlns:a="http://schemas.openxmlformats.org/drawingml/2006/main" xmlns:r="http://schemas.openxmlformats.org/officeDocument/2006/relationships" xmlns:p="http://schemas.openxmlformats.org/presentationml/2006/main">
+  <p:cSld>
+    <p:bg>
+      <p:bgRef idx="1001">
+        <a:schemeClr val="bg1"/>
+      </p:bgRef>
+    </p:bg>
+    <p:spTree>
+      <p:nvGrpSpPr>
+        <p:cNvPr id="1" name=""/>
+        <p:cNvGrpSpPr/>
+        <p:nvPr/>
+      </p:nvGrpSpPr>
+      <p:grpSpPr>
+        <a:xfrm>
+          <a:off x="0" y="0"/>
+          <a:ext cx="0" cy="0"/>
+          <a:chOff x="0" y="0"/>
+          <a:chExt cx="0" cy="0"/>
+        </a:xfrm>
+      </p:grpSpPr>
+      <p:sp>
+        <p:nvSpPr>
+          <p:cNvPr id="2" name="Header Placeholder 1"/>
+          <p:cNvSpPr>
+            <a:spLocks noGrp="1"/>
+          </p:cNvSpPr>
+          <p:nvPr>
+            <p:ph type="hdr" sz="quarter"/>
+          </p:nvPr>
+        </p:nvSpPr>
+        <p:spPr>
+          <a:xfrm>
+            <a:off x="0" y="0"/>
+            <a:ext cx="2971800" cy="458788"/>
+          </a:xfrm>
+          <a:prstGeom prst="rect">
+            <a:avLst/>
+          </a:prstGeom>
+        </p:spPr>
+        <p:txBody>
+          <a:bodyPr vert="horz" lIns="91440" tIns="45720" rIns="91440" bIns="45720" rtlCol="0"/>
+          <a:lstStyle>
+            <a:lvl1pPr algn="l">
+              <a:defRPr sz="1200"/>
+            </a:lvl1pPr>
+          </a:lstStyle>
+          <a:p>
+            <a:endParaRPr lang="en-US"/>
+          </a:p>
+        </p:txBody>
+      </p:sp>
+      <p:sp>
+        <p:nvSpPr>
+          <p:cNvPr id="3" name="Date Placeholder 2"/>
+          <p:cNvSpPr>
+            <a:spLocks noGrp="1"/>
+          </p:cNvSpPr>
+          <p:nvPr>
+            <p:ph type="dt" idx="1"/>
+          </p:nvPr>
+        </p:nvSpPr>
+        <p:spPr>
+          <a:xfrm>
+            <a:off x="3884613" y="0"/>
+            <a:ext cx="2971800" cy="458788"/>
+          </a:xfrm>
+          <a:prstGeom prst="rect">
+            <a:avLst/>
+          </a:prstGeom>
+        </p:spPr>
+        <p:txBody>
+          <a:bodyPr vert="horz" lIns="91440" tIns="45720" rIns="91440" bIns="45720" rtlCol="0"/>
+          <a:lstStyle>
+            <a:lvl1pPr algn="r">
+              <a:defRPr sz="1200"/>
+            </a:lvl1pPr>
+          </a:lstStyle>
+          <a:p>
+            <a:fld id="{CCB5ECA5-1104-4B05-8F1F-CD4FEDAB6D0D}" type="datetimeFigureOut">
+              <a:rPr lang="en-US" smtClean="0"/>
+              <a:t>2021-05-11</a:t>
+            </a:fld>
+            <a:endParaRPr lang="en-US"/>
+          </a:p>
+        </p:txBody>
+      </p:sp>
+      <p:sp>
+        <p:nvSpPr>
+          <p:cNvPr id="4" name="Slide Image Placeholder 3"/>
+          <p:cNvSpPr>
+            <a:spLocks noGrp="1" noRot="1" noChangeAspect="1"/>
+          </p:cNvSpPr>
+          <p:nvPr>
+            <p:ph type="sldImg" idx="2"/>
+          </p:nvPr>
+        </p:nvSpPr>
+        <p:spPr>
+          <a:xfrm>
+            <a:off x="685800" y="1143000"/>
+            <a:ext cx="5486400" cy="3086100"/>
+          </a:xfrm>
+          <a:prstGeom prst="rect">
+            <a:avLst/>
+          </a:prstGeom>
+          <a:noFill/>
+          <a:ln w="12700">
+            <a:solidFill>
+              <a:prstClr val="black"/>
+            </a:solidFill>
+          </a:ln>
+        </p:spPr>
+        <p:txBody>
+          <a:bodyPr vert="horz" lIns="91440" tIns="45720" rIns="91440" bIns="45720" rtlCol="0" anchor="ctr"/>
+          <a:lstStyle/>
+          <a:p>
+            <a:endParaRPr lang="en-US"/>
+          </a:p>
+        </p:txBody>
+      </p:sp>
+      <p:sp>
+        <p:nvSpPr>
+          <p:cNvPr id="5" name="Notes Placeholder 4"/>
+          <p:cNvSpPr>
+            <a:spLocks noGrp="1"/>
+          </p:cNvSpPr>
+          <p:nvPr>
+            <p:ph type="body" sz="quarter" idx="3"/>
+          </p:nvPr>
+        </p:nvSpPr>
+        <p:spPr>
+          <a:xfrm>
+            <a:off x="685800" y="4400550"/>
+            <a:ext cx="5486400" cy="3600450"/>
+          </a:xfrm>
+          <a:prstGeom prst="rect">
+            <a:avLst/>
+          </a:prstGeom>
+        </p:spPr>
+        <p:txBody>
+          <a:bodyPr vert="horz" lIns="91440" tIns="45720" rIns="91440" bIns="45720" rtlCol="0"/>
+          <a:lstStyle/>
+          <a:p>
+            <a:pPr lvl="0"/>
+            <a:r>
+              <a:rPr lang="en-US"/>
+              <a:t>Click to edit Master text styles</a:t>
+            </a:r>
+          </a:p>
+          <a:p>
+            <a:pPr lvl="1"/>
+            <a:r>
+              <a:rPr lang="en-US"/>
+              <a:t>Second level</a:t>
+            </a:r>
+          </a:p>
+          <a:p>
+            <a:pPr lvl="2"/>
+            <a:r>
+              <a:rPr lang="en-US"/>
+              <a:t>Third level</a:t>
+            </a:r>
+          </a:p>
+          <a:p>
+            <a:pPr lvl="3"/>
+            <a:r>
+              <a:rPr lang="en-US"/>
+              <a:t>Fourth level</a:t>
+            </a:r>
+          </a:p>
+          <a:p>
+            <a:pPr lvl="4"/>
+            <a:r>
+              <a:rPr lang="en-US"/>
+              <a:t>Fifth level</a:t>
+            </a:r>
+          </a:p>
+        </p:txBody>
+      </p:sp>
+      <p:sp>
+        <p:nvSpPr>
+          <p:cNvPr id="6" name="Footer Placeholder 5"/>
+          <p:cNvSpPr>
+            <a:spLocks noGrp="1"/>
+          </p:cNvSpPr>
+          <p:nvPr>
+            <p:ph type="ftr" sz="quarter" idx="4"/>
+          </p:nvPr>
+        </p:nvSpPr>
+        <p:spPr>
+          <a:xfrm>
+            <a:off x="0" y="8685213"/>
+            <a:ext cx="2971800" cy="458787"/>
+          </a:xfrm>
+          <a:prstGeom prst="rect">
+            <a:avLst/>
+          </a:prstGeom>
+        </p:spPr>
+        <p:txBody>
+          <a:bodyPr vert="horz" lIns="91440" tIns="45720" rIns="91440" bIns="45720" rtlCol="0" anchor="b"/>
+          <a:lstStyle>
+            <a:lvl1pPr algn="l">
+              <a:defRPr sz="1200"/>
+            </a:lvl1pPr>
+          </a:lstStyle>
+          <a:p>
+            <a:endParaRPr lang="en-US"/>
+          </a:p>
+        </p:txBody>
+      </p:sp>
+      <p:sp>
+        <p:nvSpPr>
+          <p:cNvPr id="7" name="Slide Number Placeholder 6"/>
+          <p:cNvSpPr>
+            <a:spLocks noGrp="1"/>
+          </p:cNvSpPr>
+          <p:nvPr>
+            <p:ph type="sldNum" sz="quarter" idx="5"/>
+          </p:nvPr>
+        </p:nvSpPr>
+        <p:spPr>
+          <a:xfrm>
+            <a:off x="3884613" y="8685213"/>
+            <a:ext cx="2971800" cy="458787"/>
+          </a:xfrm>
+          <a:prstGeom prst="rect">
+            <a:avLst/>
+          </a:prstGeom>
+        </p:spPr>
+        <p:txBody>
+          <a:bodyPr vert="horz" lIns="91440" tIns="45720" rIns="91440" bIns="45720" rtlCol="0" anchor="b"/>
+          <a:lstStyle>
+            <a:lvl1pPr algn="r">
+              <a:defRPr sz="1200"/>
+            </a:lvl1pPr>
+          </a:lstStyle>
+          <a:p>
+            <a:fld id="{59CDA958-8509-46C5-8F0D-C584B7E3A838}" type="slidenum">
+              <a:rPr lang="en-US" smtClean="0"/>
+              <a:t>‹#›</a:t>
+            </a:fld>
+            <a:endParaRPr lang="en-US"/>
+          </a:p>
+        </p:txBody>
+      </p:sp>
+    </p:spTree>
+    <p:extLst>
+      <p:ext uri="{BB962C8B-B14F-4D97-AF65-F5344CB8AC3E}">
+        <p14:creationId xmlns:p14="http://schemas.microsoft.com/office/powerpoint/2010/main" val="601959277"/>
+      </p:ext>
+    </p:extLst>
+  </p:cSld>
+  <p:clrMap bg1="lt1" tx1="dk1" bg2="lt2" tx2="dk2" accent1="accent1" accent2="accent2" accent3="accent3" accent4="accent4" accent5="accent5" accent6="accent6" hlink="hlink" folHlink="folHlink"/>
+  <p:notesStyle>
+    <a:lvl1pPr marL="0" algn="l" defTabSz="914400" rtl="0" eaLnBrk="1" latinLnBrk="0" hangingPunct="1">
+      <a:defRPr sz="1200" kern="1200">
+        <a:solidFill>
+          <a:schemeClr val="tx1"/>
+        </a:solidFill>
+        <a:latin typeface="+mn-lt"/>
+        <a:ea typeface="+mn-ea"/>
+        <a:cs typeface="+mn-cs"/>
+      </a:defRPr>
+    </a:lvl1pPr>
+    <a:lvl2pPr marL="457200" algn="l" defTabSz="914400" rtl="0" eaLnBrk="1" latinLnBrk="0" hangingPunct="1">
+      <a:defRPr sz="1200" kern="1200">
+        <a:solidFill>
+          <a:schemeClr val="tx1"/>
+        </a:solidFill>
+        <a:latin typeface="+mn-lt"/>
+        <a:ea typeface="+mn-ea"/>
+        <a:cs typeface="+mn-cs"/>
+      </a:defRPr>
+    </a:lvl2pPr>
+    <a:lvl3pPr marL="914400" algn="l" defTabSz="914400" rtl="0" eaLnBrk="1" latinLnBrk="0" hangingPunct="1">
+      <a:defRPr sz="1200" kern="1200">
+        <a:solidFill>
+          <a:schemeClr val="tx1"/>
+        </a:solidFill>
+        <a:latin typeface="+mn-lt"/>
+        <a:ea typeface="+mn-ea"/>
+        <a:cs typeface="+mn-cs"/>
+      </a:defRPr>
+    </a:lvl3pPr>
+    <a:lvl4pPr marL="1371600" algn="l" defTabSz="914400" rtl="0" eaLnBrk="1" latinLnBrk="0" hangingPunct="1">
+      <a:defRPr sz="1200" kern="1200">
+        <a:solidFill>
+          <a:schemeClr val="tx1"/>
+        </a:solidFill>
+        <a:latin typeface="+mn-lt"/>
+        <a:ea typeface="+mn-ea"/>
+        <a:cs typeface="+mn-cs"/>
+      </a:defRPr>
+    </a:lvl4pPr>
+    <a:lvl5pPr marL="1828800" algn="l" defTabSz="914400" rtl="0" eaLnBrk="1" latinLnBrk="0" hangingPunct="1">
+      <a:defRPr sz="1200" kern="1200">
+        <a:solidFill>
+          <a:schemeClr val="tx1"/>
+        </a:solidFill>
+        <a:latin typeface="+mn-lt"/>
+        <a:ea typeface="+mn-ea"/>
+        <a:cs typeface="+mn-cs"/>
+      </a:defRPr>
+    </a:lvl5pPr>
+    <a:lvl6pPr marL="2286000" algn="l" defTabSz="914400" rtl="0" eaLnBrk="1" latinLnBrk="0" hangingPunct="1">
+      <a:defRPr sz="1200" kern="1200">
+        <a:solidFill>
+          <a:schemeClr val="tx1"/>
+        </a:solidFill>
+        <a:latin typeface="+mn-lt"/>
+        <a:ea typeface="+mn-ea"/>
+        <a:cs typeface="+mn-cs"/>
+      </a:defRPr>
+    </a:lvl6pPr>
+    <a:lvl7pPr marL="2743200" algn="l" defTabSz="914400" rtl="0" eaLnBrk="1" latinLnBrk="0" hangingPunct="1">
+      <a:defRPr sz="1200" kern="1200">
+        <a:solidFill>
+          <a:schemeClr val="tx1"/>
+        </a:solidFill>
+        <a:latin typeface="+mn-lt"/>
+        <a:ea typeface="+mn-ea"/>
+        <a:cs typeface="+mn-cs"/>
+      </a:defRPr>
+    </a:lvl7pPr>
+    <a:lvl8pPr marL="3200400" algn="l" defTabSz="914400" rtl="0" eaLnBrk="1" latinLnBrk="0" hangingPunct="1">
+      <a:defRPr sz="1200" kern="1200">
+        <a:solidFill>
+          <a:schemeClr val="tx1"/>
+        </a:solidFill>
+        <a:latin typeface="+mn-lt"/>
+        <a:ea typeface="+mn-ea"/>
+        <a:cs typeface="+mn-cs"/>
+      </a:defRPr>
+    </a:lvl8pPr>
+    <a:lvl9pPr marL="3657600" algn="l" defTabSz="914400" rtl="0" eaLnBrk="1" latinLnBrk="0" hangingPunct="1">
+      <a:defRPr sz="1200" kern="1200">
+        <a:solidFill>
+          <a:schemeClr val="tx1"/>
+        </a:solidFill>
+        <a:latin typeface="+mn-lt"/>
+        <a:ea typeface="+mn-ea"/>
+        <a:cs typeface="+mn-cs"/>
+      </a:defRPr>
+    </a:lvl9pPr>
+  </p:notesStyle>
+</p:notesMaster>
+</file>
+
 <file path=ppt/slideLayouts/slideLayout1.xml><?xml version="1.0" encoding="utf-8"?>
 <p:sldLayout xmlns:a="http://schemas.openxmlformats.org/drawingml/2006/main" xmlns:r="http://schemas.openxmlformats.org/officeDocument/2006/relationships" xmlns:p="http://schemas.openxmlformats.org/presentationml/2006/main" type="title" preserve="1">
   <p:cSld name="Title Slide">
@@ -266,7 +625,7 @@
           <a:p>
             <a:fld id="{BA55A736-0673-4DCE-ABF9-C67D5500DA64}" type="datetimeFigureOut">
               <a:rPr lang="en-US" smtClean="0"/>
-              <a:t>2021-04-21</a:t>
+              <a:t>2021-05-11</a:t>
             </a:fld>
             <a:endParaRPr lang="en-US"/>
           </a:p>
@@ -464,7 +823,7 @@
           <a:p>
             <a:fld id="{BA55A736-0673-4DCE-ABF9-C67D5500DA64}" type="datetimeFigureOut">
               <a:rPr lang="en-US" smtClean="0"/>
-              <a:t>2021-04-21</a:t>
+              <a:t>2021-05-11</a:t>
             </a:fld>
             <a:endParaRPr lang="en-US"/>
           </a:p>
@@ -672,7 +1031,7 @@
           <a:p>
             <a:fld id="{BA55A736-0673-4DCE-ABF9-C67D5500DA64}" type="datetimeFigureOut">
               <a:rPr lang="en-US" smtClean="0"/>
-              <a:t>2021-04-21</a:t>
+              <a:t>2021-05-11</a:t>
             </a:fld>
             <a:endParaRPr lang="en-US"/>
           </a:p>
@@ -870,7 +1229,7 @@
           <a:p>
             <a:fld id="{BA55A736-0673-4DCE-ABF9-C67D5500DA64}" type="datetimeFigureOut">
               <a:rPr lang="en-US" smtClean="0"/>
-              <a:t>2021-04-21</a:t>
+              <a:t>2021-05-11</a:t>
             </a:fld>
             <a:endParaRPr lang="en-US"/>
           </a:p>
@@ -1145,7 +1504,7 @@
           <a:p>
             <a:fld id="{BA55A736-0673-4DCE-ABF9-C67D5500DA64}" type="datetimeFigureOut">
               <a:rPr lang="en-US" smtClean="0"/>
-              <a:t>2021-04-21</a:t>
+              <a:t>2021-05-11</a:t>
             </a:fld>
             <a:endParaRPr lang="en-US"/>
           </a:p>
@@ -1410,7 +1769,7 @@
           <a:p>
             <a:fld id="{BA55A736-0673-4DCE-ABF9-C67D5500DA64}" type="datetimeFigureOut">
               <a:rPr lang="en-US" smtClean="0"/>
-              <a:t>2021-04-21</a:t>
+              <a:t>2021-05-11</a:t>
             </a:fld>
             <a:endParaRPr lang="en-US"/>
           </a:p>
@@ -1822,7 +2181,7 @@
           <a:p>
             <a:fld id="{BA55A736-0673-4DCE-ABF9-C67D5500DA64}" type="datetimeFigureOut">
               <a:rPr lang="en-US" smtClean="0"/>
-              <a:t>2021-04-21</a:t>
+              <a:t>2021-05-11</a:t>
             </a:fld>
             <a:endParaRPr lang="en-US"/>
           </a:p>
@@ -1963,7 +2322,7 @@
           <a:p>
             <a:fld id="{BA55A736-0673-4DCE-ABF9-C67D5500DA64}" type="datetimeFigureOut">
               <a:rPr lang="en-US" smtClean="0"/>
-              <a:t>2021-04-21</a:t>
+              <a:t>2021-05-11</a:t>
             </a:fld>
             <a:endParaRPr lang="en-US"/>
           </a:p>
@@ -2076,7 +2435,7 @@
           <a:p>
             <a:fld id="{BA55A736-0673-4DCE-ABF9-C67D5500DA64}" type="datetimeFigureOut">
               <a:rPr lang="en-US" smtClean="0"/>
-              <a:t>2021-04-21</a:t>
+              <a:t>2021-05-11</a:t>
             </a:fld>
             <a:endParaRPr lang="en-US"/>
           </a:p>
@@ -2387,7 +2746,7 @@
           <a:p>
             <a:fld id="{BA55A736-0673-4DCE-ABF9-C67D5500DA64}" type="datetimeFigureOut">
               <a:rPr lang="en-US" smtClean="0"/>
-              <a:t>2021-04-21</a:t>
+              <a:t>2021-05-11</a:t>
             </a:fld>
             <a:endParaRPr lang="en-US"/>
           </a:p>
@@ -2675,7 +3034,7 @@
           <a:p>
             <a:fld id="{BA55A736-0673-4DCE-ABF9-C67D5500DA64}" type="datetimeFigureOut">
               <a:rPr lang="en-US" smtClean="0"/>
-              <a:t>2021-04-21</a:t>
+              <a:t>2021-05-11</a:t>
             </a:fld>
             <a:endParaRPr lang="en-US"/>
           </a:p>
@@ -2916,7 +3275,7 @@
           <a:p>
             <a:fld id="{BA55A736-0673-4DCE-ABF9-C67D5500DA64}" type="datetimeFigureOut">
               <a:rPr lang="en-US" smtClean="0"/>
-              <a:t>2021-04-21</a:t>
+              <a:t>2021-05-11</a:t>
             </a:fld>
             <a:endParaRPr lang="en-US"/>
           </a:p>
@@ -3456,6 +3815,2659 @@
 </p:sld>
 </file>
 
+<file path=ppt/slides/slide10.xml><?xml version="1.0" encoding="utf-8"?>
+<p:sld xmlns:a="http://schemas.openxmlformats.org/drawingml/2006/main" xmlns:r="http://schemas.openxmlformats.org/officeDocument/2006/relationships" xmlns:p="http://schemas.openxmlformats.org/presentationml/2006/main">
+  <p:cSld>
+    <p:spTree>
+      <p:nvGrpSpPr>
+        <p:cNvPr id="1" name=""/>
+        <p:cNvGrpSpPr/>
+        <p:nvPr/>
+      </p:nvGrpSpPr>
+      <p:grpSpPr>
+        <a:xfrm>
+          <a:off x="0" y="0"/>
+          <a:ext cx="0" cy="0"/>
+          <a:chOff x="0" y="0"/>
+          <a:chExt cx="0" cy="0"/>
+        </a:xfrm>
+      </p:grpSpPr>
+      <p:pic>
+        <p:nvPicPr>
+          <p:cNvPr id="5" name="Content Placeholder 4" descr="Graphical user interface, text&#10;&#10;Description automatically generated">
+            <a:extLst>
+              <a:ext uri="{FF2B5EF4-FFF2-40B4-BE49-F238E27FC236}">
+                <a16:creationId xmlns:a16="http://schemas.microsoft.com/office/drawing/2014/main" id="{51B80631-6674-47CE-8262-D571E22F5B4A}"/>
+              </a:ext>
+            </a:extLst>
+          </p:cNvPr>
+          <p:cNvPicPr>
+            <a:picLocks noGrp="1" noChangeAspect="1"/>
+          </p:cNvPicPr>
+          <p:nvPr>
+            <p:ph idx="1"/>
+          </p:nvPr>
+        </p:nvPicPr>
+        <p:blipFill rotWithShape="1">
+          <a:blip r:embed="rId2">
+            <a:extLst>
+              <a:ext uri="{28A0092B-C50C-407E-A947-70E740481C1C}">
+                <a14:useLocalDpi xmlns:a14="http://schemas.microsoft.com/office/drawing/2010/main" val="0"/>
+              </a:ext>
+            </a:extLst>
+          </a:blip>
+          <a:srcRect l="4738" t="29608" r="37827" b="13325"/>
+          <a:stretch/>
+        </p:blipFill>
+        <p:spPr>
+          <a:xfrm>
+            <a:off x="426085" y="1946076"/>
+            <a:ext cx="8469381" cy="4387272"/>
+          </a:xfrm>
+        </p:spPr>
+      </p:pic>
+      <mc:AlternateContent xmlns:mc="http://schemas.openxmlformats.org/markup-compatibility/2006">
+        <mc:Choice xmlns:a14="http://schemas.microsoft.com/office/drawing/2010/main" Requires="a14">
+          <p:sp>
+            <p:nvSpPr>
+              <p:cNvPr id="7" name="TextBox 6">
+                <a:extLst>
+                  <a:ext uri="{FF2B5EF4-FFF2-40B4-BE49-F238E27FC236}">
+                    <a16:creationId xmlns:a16="http://schemas.microsoft.com/office/drawing/2014/main" id="{57BBC9A6-26A7-48C5-B35C-EA649C509453}"/>
+                  </a:ext>
+                </a:extLst>
+              </p:cNvPr>
+              <p:cNvSpPr txBox="1"/>
+              <p:nvPr/>
+            </p:nvSpPr>
+            <p:spPr>
+              <a:xfrm>
+                <a:off x="559292" y="656711"/>
+                <a:ext cx="10963924" cy="669992"/>
+              </a:xfrm>
+              <a:prstGeom prst="rect">
+                <a:avLst/>
+              </a:prstGeom>
+              <a:noFill/>
+            </p:spPr>
+            <p:txBody>
+              <a:bodyPr wrap="square" rtlCol="0">
+                <a:spAutoFit/>
+              </a:bodyPr>
+              <a:lstStyle/>
+              <a:p>
+                <a:r>
+                  <a:rPr lang="en-US" dirty="0"/>
+                  <a:t>By assuming  </a:t>
+                </a:r>
+                <a14:m>
+                  <m:oMath xmlns:m="http://schemas.openxmlformats.org/officeDocument/2006/math">
+                    <m:r>
+                      <a:rPr lang="en-US" b="1" i="0" smtClean="0">
+                        <a:latin typeface="Cambria Math" panose="02040503050406030204" pitchFamily="18" charset="0"/>
+                      </a:rPr>
+                      <m:t>𝐲</m:t>
+                    </m:r>
+                    <m:r>
+                      <a:rPr lang="en-US" b="1" i="0" smtClean="0">
+                        <a:latin typeface="Cambria Math" panose="02040503050406030204" pitchFamily="18" charset="0"/>
+                      </a:rPr>
+                      <m:t>=</m:t>
+                    </m:r>
+                    <m:r>
+                      <a:rPr lang="en-US" b="1" i="1" smtClean="0">
+                        <a:latin typeface="Cambria Math" panose="02040503050406030204" pitchFamily="18" charset="0"/>
+                      </a:rPr>
+                      <m:t>𝒂</m:t>
+                    </m:r>
+                    <m:sSup>
+                      <m:sSupPr>
+                        <m:ctrlPr>
+                          <a:rPr lang="en-US" b="1" i="1" smtClean="0">
+                            <a:latin typeface="Cambria Math" panose="02040503050406030204" pitchFamily="18" charset="0"/>
+                          </a:rPr>
+                        </m:ctrlPr>
+                      </m:sSupPr>
+                      <m:e>
+                        <m:d>
+                          <m:dPr>
+                            <m:ctrlPr>
+                              <a:rPr lang="en-US" b="1" i="1" smtClean="0">
+                                <a:latin typeface="Cambria Math" panose="02040503050406030204" pitchFamily="18" charset="0"/>
+                              </a:rPr>
+                            </m:ctrlPr>
+                          </m:dPr>
+                          <m:e>
+                            <m:r>
+                              <a:rPr lang="en-US" b="1" i="1" smtClean="0">
+                                <a:latin typeface="Cambria Math" panose="02040503050406030204" pitchFamily="18" charset="0"/>
+                              </a:rPr>
+                              <m:t>𝒃</m:t>
+                            </m:r>
+                            <m:r>
+                              <a:rPr lang="en-US" b="1" i="1" smtClean="0">
+                                <a:latin typeface="Cambria Math" panose="02040503050406030204" pitchFamily="18" charset="0"/>
+                              </a:rPr>
+                              <m:t>𝑿</m:t>
+                            </m:r>
+                            <m:r>
+                              <a:rPr lang="en-US" b="1" i="1" smtClean="0">
+                                <a:latin typeface="Cambria Math" panose="02040503050406030204" pitchFamily="18" charset="0"/>
+                              </a:rPr>
+                              <m:t>+</m:t>
+                            </m:r>
+                            <m:r>
+                              <a:rPr lang="en-US" b="1" i="1" smtClean="0">
+                                <a:latin typeface="Cambria Math" panose="02040503050406030204" pitchFamily="18" charset="0"/>
+                              </a:rPr>
+                              <m:t>𝒄</m:t>
+                            </m:r>
+                          </m:e>
+                        </m:d>
+                      </m:e>
+                      <m:sup>
+                        <m:r>
+                          <a:rPr lang="en-US" b="1" i="1" smtClean="0">
+                            <a:latin typeface="Cambria Math" panose="02040503050406030204" pitchFamily="18" charset="0"/>
+                          </a:rPr>
+                          <m:t>𝒅</m:t>
+                        </m:r>
+                      </m:sup>
+                    </m:sSup>
+                    <m:r>
+                      <a:rPr lang="en-US" b="1" i="1" smtClean="0">
+                        <a:latin typeface="Cambria Math" panose="02040503050406030204" pitchFamily="18" charset="0"/>
+                      </a:rPr>
+                      <m:t>+</m:t>
+                    </m:r>
+                    <m:r>
+                      <a:rPr lang="en-US" b="1" i="1" smtClean="0">
+                        <a:latin typeface="Cambria Math" panose="02040503050406030204" pitchFamily="18" charset="0"/>
+                      </a:rPr>
+                      <m:t>𝒆</m:t>
+                    </m:r>
+                    <m:r>
+                      <a:rPr lang="en-US" b="1" i="1" smtClean="0">
+                        <a:latin typeface="Cambria Math" panose="02040503050406030204" pitchFamily="18" charset="0"/>
+                      </a:rPr>
+                      <m:t> </m:t>
+                    </m:r>
+                  </m:oMath>
+                </a14:m>
+                <a:r>
+                  <a:rPr lang="en-US" b="1" dirty="0"/>
+                  <a:t> </a:t>
+                </a:r>
+                <a:r>
+                  <a:rPr lang="en-US" dirty="0"/>
+                  <a:t>as relationship between </a:t>
+                </a:r>
+                <a:r>
+                  <a:rPr lang="en-US" b="1" dirty="0"/>
+                  <a:t>Reading</a:t>
+                </a:r>
+                <a:r>
+                  <a:rPr lang="en-US" dirty="0"/>
+                  <a:t> and </a:t>
+                </a:r>
+                <a:r>
+                  <a:rPr lang="en-US" b="1" dirty="0"/>
+                  <a:t>Intensity, </a:t>
+                </a:r>
+                <a:r>
+                  <a:rPr lang="en-US" dirty="0"/>
+                  <a:t>following equation were derived from a graphical approach using DESMOS.</a:t>
+                </a:r>
+                <a:r>
+                  <a:rPr lang="en-US" b="1" dirty="0"/>
+                  <a:t>   &lt;</a:t>
+                </a:r>
+                <a:r>
+                  <a:rPr lang="en-US" b="1" dirty="0" err="1"/>
+                  <a:t>desmos</a:t>
+                </a:r>
+                <a:r>
+                  <a:rPr lang="en-US" b="1" dirty="0"/>
+                  <a:t> link&gt;</a:t>
+                </a:r>
+              </a:p>
+            </p:txBody>
+          </p:sp>
+        </mc:Choice>
+        <mc:Fallback>
+          <p:sp>
+            <p:nvSpPr>
+              <p:cNvPr id="7" name="TextBox 6">
+                <a:extLst>
+                  <a:ext uri="{FF2B5EF4-FFF2-40B4-BE49-F238E27FC236}">
+                    <a16:creationId xmlns:a16="http://schemas.microsoft.com/office/drawing/2014/main" id="{57BBC9A6-26A7-48C5-B35C-EA649C509453}"/>
+                  </a:ext>
+                </a:extLst>
+              </p:cNvPr>
+              <p:cNvSpPr txBox="1">
+                <a:spLocks noRot="1" noChangeAspect="1" noMove="1" noResize="1" noEditPoints="1" noAdjustHandles="1" noChangeArrowheads="1" noChangeShapeType="1" noTextEdit="1"/>
+              </p:cNvSpPr>
+              <p:nvPr/>
+            </p:nvSpPr>
+            <p:spPr>
+              <a:xfrm>
+                <a:off x="559292" y="656711"/>
+                <a:ext cx="10963924" cy="669992"/>
+              </a:xfrm>
+              <a:prstGeom prst="rect">
+                <a:avLst/>
+              </a:prstGeom>
+              <a:blipFill>
+                <a:blip r:embed="rId3"/>
+                <a:stretch>
+                  <a:fillRect l="-501" t="-3636" r="-612" b="-11818"/>
+                </a:stretch>
+              </a:blipFill>
+            </p:spPr>
+            <p:txBody>
+              <a:bodyPr/>
+              <a:lstStyle/>
+              <a:p>
+                <a:r>
+                  <a:rPr lang="en-US">
+                    <a:noFill/>
+                  </a:rPr>
+                  <a:t> </a:t>
+                </a:r>
+              </a:p>
+            </p:txBody>
+          </p:sp>
+        </mc:Fallback>
+      </mc:AlternateContent>
+      <p:cxnSp>
+        <p:nvCxnSpPr>
+          <p:cNvPr id="9" name="Straight Arrow Connector 8">
+            <a:extLst>
+              <a:ext uri="{FF2B5EF4-FFF2-40B4-BE49-F238E27FC236}">
+                <a16:creationId xmlns:a16="http://schemas.microsoft.com/office/drawing/2014/main" id="{AF47E266-E527-4E74-923B-974344A5F14C}"/>
+              </a:ext>
+            </a:extLst>
+          </p:cNvPr>
+          <p:cNvCxnSpPr>
+            <a:cxnSpLocks/>
+          </p:cNvCxnSpPr>
+          <p:nvPr/>
+        </p:nvCxnSpPr>
+        <p:spPr>
+          <a:xfrm flipH="1">
+            <a:off x="7190914" y="1893859"/>
+            <a:ext cx="2281560" cy="494234"/>
+          </a:xfrm>
+          <a:prstGeom prst="straightConnector1">
+            <a:avLst/>
+          </a:prstGeom>
+          <a:ln w="28575">
+            <a:solidFill>
+              <a:srgbClr val="FF0000"/>
+            </a:solidFill>
+            <a:tailEnd type="triangle"/>
+          </a:ln>
+        </p:spPr>
+        <p:style>
+          <a:lnRef idx="1">
+            <a:schemeClr val="accent1"/>
+          </a:lnRef>
+          <a:fillRef idx="0">
+            <a:schemeClr val="accent1"/>
+          </a:fillRef>
+          <a:effectRef idx="0">
+            <a:schemeClr val="accent1"/>
+          </a:effectRef>
+          <a:fontRef idx="minor">
+            <a:schemeClr val="tx1"/>
+          </a:fontRef>
+        </p:style>
+      </p:cxnSp>
+      <p:cxnSp>
+        <p:nvCxnSpPr>
+          <p:cNvPr id="11" name="Straight Arrow Connector 10">
+            <a:extLst>
+              <a:ext uri="{FF2B5EF4-FFF2-40B4-BE49-F238E27FC236}">
+                <a16:creationId xmlns:a16="http://schemas.microsoft.com/office/drawing/2014/main" id="{3B3360C2-BE95-4F5C-AB6A-32B24036973E}"/>
+              </a:ext>
+            </a:extLst>
+          </p:cNvPr>
+          <p:cNvCxnSpPr>
+            <a:cxnSpLocks/>
+          </p:cNvCxnSpPr>
+          <p:nvPr/>
+        </p:nvCxnSpPr>
+        <p:spPr>
+          <a:xfrm flipH="1">
+            <a:off x="7057790" y="1893859"/>
+            <a:ext cx="2414684" cy="891951"/>
+          </a:xfrm>
+          <a:prstGeom prst="straightConnector1">
+            <a:avLst/>
+          </a:prstGeom>
+          <a:ln w="28575">
+            <a:solidFill>
+              <a:srgbClr val="FF0000"/>
+            </a:solidFill>
+            <a:tailEnd type="triangle"/>
+          </a:ln>
+        </p:spPr>
+        <p:style>
+          <a:lnRef idx="1">
+            <a:schemeClr val="accent1"/>
+          </a:lnRef>
+          <a:fillRef idx="0">
+            <a:schemeClr val="accent1"/>
+          </a:fillRef>
+          <a:effectRef idx="0">
+            <a:schemeClr val="accent1"/>
+          </a:effectRef>
+          <a:fontRef idx="minor">
+            <a:schemeClr val="tx1"/>
+          </a:fontRef>
+        </p:style>
+      </p:cxnSp>
+      <p:cxnSp>
+        <p:nvCxnSpPr>
+          <p:cNvPr id="12" name="Straight Arrow Connector 11">
+            <a:extLst>
+              <a:ext uri="{FF2B5EF4-FFF2-40B4-BE49-F238E27FC236}">
+                <a16:creationId xmlns:a16="http://schemas.microsoft.com/office/drawing/2014/main" id="{8769FC55-2A1B-4EF2-B8A9-B2A967B9AA26}"/>
+              </a:ext>
+            </a:extLst>
+          </p:cNvPr>
+          <p:cNvCxnSpPr>
+            <a:cxnSpLocks/>
+          </p:cNvCxnSpPr>
+          <p:nvPr/>
+        </p:nvCxnSpPr>
+        <p:spPr>
+          <a:xfrm flipH="1">
+            <a:off x="7057789" y="1893859"/>
+            <a:ext cx="2414685" cy="1206673"/>
+          </a:xfrm>
+          <a:prstGeom prst="straightConnector1">
+            <a:avLst/>
+          </a:prstGeom>
+          <a:ln w="28575">
+            <a:solidFill>
+              <a:srgbClr val="FF0000"/>
+            </a:solidFill>
+            <a:tailEnd type="triangle"/>
+          </a:ln>
+        </p:spPr>
+        <p:style>
+          <a:lnRef idx="1">
+            <a:schemeClr val="accent1"/>
+          </a:lnRef>
+          <a:fillRef idx="0">
+            <a:schemeClr val="accent1"/>
+          </a:fillRef>
+          <a:effectRef idx="0">
+            <a:schemeClr val="accent1"/>
+          </a:effectRef>
+          <a:fontRef idx="minor">
+            <a:schemeClr val="tx1"/>
+          </a:fontRef>
+        </p:style>
+      </p:cxnSp>
+      <p:cxnSp>
+        <p:nvCxnSpPr>
+          <p:cNvPr id="16" name="Straight Arrow Connector 15">
+            <a:extLst>
+              <a:ext uri="{FF2B5EF4-FFF2-40B4-BE49-F238E27FC236}">
+                <a16:creationId xmlns:a16="http://schemas.microsoft.com/office/drawing/2014/main" id="{459058AA-7A8C-412B-B967-E64A85A1FF86}"/>
+              </a:ext>
+            </a:extLst>
+          </p:cNvPr>
+          <p:cNvCxnSpPr>
+            <a:cxnSpLocks/>
+          </p:cNvCxnSpPr>
+          <p:nvPr/>
+        </p:nvCxnSpPr>
+        <p:spPr>
+          <a:xfrm flipV="1">
+            <a:off x="3755254" y="2414626"/>
+            <a:ext cx="2175028" cy="82569"/>
+          </a:xfrm>
+          <a:prstGeom prst="straightConnector1">
+            <a:avLst/>
+          </a:prstGeom>
+          <a:ln w="28575">
+            <a:solidFill>
+              <a:srgbClr val="FF0000"/>
+            </a:solidFill>
+            <a:tailEnd type="triangle"/>
+          </a:ln>
+        </p:spPr>
+        <p:style>
+          <a:lnRef idx="1">
+            <a:schemeClr val="accent1"/>
+          </a:lnRef>
+          <a:fillRef idx="0">
+            <a:schemeClr val="accent1"/>
+          </a:fillRef>
+          <a:effectRef idx="0">
+            <a:schemeClr val="accent1"/>
+          </a:effectRef>
+          <a:fontRef idx="minor">
+            <a:schemeClr val="tx1"/>
+          </a:fontRef>
+        </p:style>
+      </p:cxnSp>
+      <p:cxnSp>
+        <p:nvCxnSpPr>
+          <p:cNvPr id="19" name="Straight Arrow Connector 18">
+            <a:extLst>
+              <a:ext uri="{FF2B5EF4-FFF2-40B4-BE49-F238E27FC236}">
+                <a16:creationId xmlns:a16="http://schemas.microsoft.com/office/drawing/2014/main" id="{18DB3E5D-9DE8-4CA0-A1F4-73EC279129DE}"/>
+              </a:ext>
+            </a:extLst>
+          </p:cNvPr>
+          <p:cNvCxnSpPr>
+            <a:cxnSpLocks/>
+          </p:cNvCxnSpPr>
+          <p:nvPr/>
+        </p:nvCxnSpPr>
+        <p:spPr>
+          <a:xfrm>
+            <a:off x="3755254" y="2497195"/>
+            <a:ext cx="2175028" cy="288616"/>
+          </a:xfrm>
+          <a:prstGeom prst="straightConnector1">
+            <a:avLst/>
+          </a:prstGeom>
+          <a:ln w="28575">
+            <a:solidFill>
+              <a:srgbClr val="FF0000"/>
+            </a:solidFill>
+            <a:tailEnd type="triangle"/>
+          </a:ln>
+        </p:spPr>
+        <p:style>
+          <a:lnRef idx="1">
+            <a:schemeClr val="accent1"/>
+          </a:lnRef>
+          <a:fillRef idx="0">
+            <a:schemeClr val="accent1"/>
+          </a:fillRef>
+          <a:effectRef idx="0">
+            <a:schemeClr val="accent1"/>
+          </a:effectRef>
+          <a:fontRef idx="minor">
+            <a:schemeClr val="tx1"/>
+          </a:fontRef>
+        </p:style>
+      </p:cxnSp>
+      <p:cxnSp>
+        <p:nvCxnSpPr>
+          <p:cNvPr id="21" name="Straight Arrow Connector 20">
+            <a:extLst>
+              <a:ext uri="{FF2B5EF4-FFF2-40B4-BE49-F238E27FC236}">
+                <a16:creationId xmlns:a16="http://schemas.microsoft.com/office/drawing/2014/main" id="{E5585B09-02C5-4C32-B994-71AF799F33BC}"/>
+              </a:ext>
+            </a:extLst>
+          </p:cNvPr>
+          <p:cNvCxnSpPr>
+            <a:cxnSpLocks/>
+          </p:cNvCxnSpPr>
+          <p:nvPr/>
+        </p:nvCxnSpPr>
+        <p:spPr>
+          <a:xfrm>
+            <a:off x="3755254" y="2497195"/>
+            <a:ext cx="2175028" cy="601750"/>
+          </a:xfrm>
+          <a:prstGeom prst="straightConnector1">
+            <a:avLst/>
+          </a:prstGeom>
+          <a:ln w="28575">
+            <a:solidFill>
+              <a:srgbClr val="FF0000"/>
+            </a:solidFill>
+            <a:tailEnd type="triangle"/>
+          </a:ln>
+        </p:spPr>
+        <p:style>
+          <a:lnRef idx="1">
+            <a:schemeClr val="accent1"/>
+          </a:lnRef>
+          <a:fillRef idx="0">
+            <a:schemeClr val="accent1"/>
+          </a:fillRef>
+          <a:effectRef idx="0">
+            <a:schemeClr val="accent1"/>
+          </a:effectRef>
+          <a:fontRef idx="minor">
+            <a:schemeClr val="tx1"/>
+          </a:fontRef>
+        </p:style>
+      </p:cxnSp>
+      <p:sp>
+        <p:nvSpPr>
+          <p:cNvPr id="23" name="TextBox 22">
+            <a:extLst>
+              <a:ext uri="{FF2B5EF4-FFF2-40B4-BE49-F238E27FC236}">
+                <a16:creationId xmlns:a16="http://schemas.microsoft.com/office/drawing/2014/main" id="{3913F6F0-099B-4FB4-9C9B-1E07ABC3649F}"/>
+              </a:ext>
+            </a:extLst>
+          </p:cNvPr>
+          <p:cNvSpPr txBox="1"/>
+          <p:nvPr/>
+        </p:nvSpPr>
+        <p:spPr>
+          <a:xfrm>
+            <a:off x="942468" y="2286421"/>
+            <a:ext cx="3175248" cy="369332"/>
+          </a:xfrm>
+          <a:prstGeom prst="rect">
+            <a:avLst/>
+          </a:prstGeom>
+          <a:noFill/>
+        </p:spPr>
+        <p:txBody>
+          <a:bodyPr wrap="square" rtlCol="0">
+            <a:spAutoFit/>
+          </a:bodyPr>
+          <a:lstStyle/>
+          <a:p>
+            <a:r>
+              <a:rPr lang="en-US" b="1" dirty="0">
+                <a:solidFill>
+                  <a:srgbClr val="FF0000"/>
+                </a:solidFill>
+              </a:rPr>
+              <a:t>Raw readings for each color</a:t>
+            </a:r>
+          </a:p>
+        </p:txBody>
+      </p:sp>
+      <p:sp>
+        <p:nvSpPr>
+          <p:cNvPr id="24" name="TextBox 23">
+            <a:extLst>
+              <a:ext uri="{FF2B5EF4-FFF2-40B4-BE49-F238E27FC236}">
+                <a16:creationId xmlns:a16="http://schemas.microsoft.com/office/drawing/2014/main" id="{46BB512C-2CAE-4F91-B854-16FB72E44DD8}"/>
+              </a:ext>
+            </a:extLst>
+          </p:cNvPr>
+          <p:cNvSpPr txBox="1"/>
+          <p:nvPr/>
+        </p:nvSpPr>
+        <p:spPr>
+          <a:xfrm>
+            <a:off x="9472474" y="1570693"/>
+            <a:ext cx="2539013" cy="646331"/>
+          </a:xfrm>
+          <a:prstGeom prst="rect">
+            <a:avLst/>
+          </a:prstGeom>
+          <a:noFill/>
+        </p:spPr>
+        <p:txBody>
+          <a:bodyPr wrap="square" rtlCol="0">
+            <a:spAutoFit/>
+          </a:bodyPr>
+          <a:lstStyle/>
+          <a:p>
+            <a:r>
+              <a:rPr lang="en-US" b="1" dirty="0">
+                <a:solidFill>
+                  <a:srgbClr val="FF0000"/>
+                </a:solidFill>
+              </a:rPr>
+              <a:t>Corresponding average for each color</a:t>
+            </a:r>
+          </a:p>
+        </p:txBody>
+      </p:sp>
+      <p:sp>
+        <p:nvSpPr>
+          <p:cNvPr id="25" name="TextBox 24">
+            <a:extLst>
+              <a:ext uri="{FF2B5EF4-FFF2-40B4-BE49-F238E27FC236}">
+                <a16:creationId xmlns:a16="http://schemas.microsoft.com/office/drawing/2014/main" id="{A69704F6-4EFE-4C94-ADAF-9B3D5B971E46}"/>
+              </a:ext>
+            </a:extLst>
+          </p:cNvPr>
+          <p:cNvSpPr txBox="1"/>
+          <p:nvPr/>
+        </p:nvSpPr>
+        <p:spPr>
+          <a:xfrm>
+            <a:off x="713826" y="4968452"/>
+            <a:ext cx="3780452" cy="923330"/>
+          </a:xfrm>
+          <a:prstGeom prst="rect">
+            <a:avLst/>
+          </a:prstGeom>
+          <a:noFill/>
+        </p:spPr>
+        <p:txBody>
+          <a:bodyPr wrap="square" rtlCol="0">
+            <a:spAutoFit/>
+          </a:bodyPr>
+          <a:lstStyle/>
+          <a:p>
+            <a:r>
+              <a:rPr lang="en-US" b="1" dirty="0">
+                <a:solidFill>
+                  <a:srgbClr val="FF0000"/>
+                </a:solidFill>
+              </a:rPr>
+              <a:t>In the case of white light,</a:t>
+            </a:r>
+          </a:p>
+          <a:p>
+            <a:r>
+              <a:rPr lang="en-US" b="1" dirty="0">
+                <a:solidFill>
+                  <a:srgbClr val="FF0000"/>
+                </a:solidFill>
+              </a:rPr>
+              <a:t>These values are equal and depend only on the light intensity. </a:t>
+            </a:r>
+          </a:p>
+        </p:txBody>
+      </p:sp>
+      <p:cxnSp>
+        <p:nvCxnSpPr>
+          <p:cNvPr id="26" name="Straight Arrow Connector 25">
+            <a:extLst>
+              <a:ext uri="{FF2B5EF4-FFF2-40B4-BE49-F238E27FC236}">
+                <a16:creationId xmlns:a16="http://schemas.microsoft.com/office/drawing/2014/main" id="{D95FB717-9615-4F23-83E8-00790898BAD1}"/>
+              </a:ext>
+            </a:extLst>
+          </p:cNvPr>
+          <p:cNvCxnSpPr>
+            <a:cxnSpLocks/>
+          </p:cNvCxnSpPr>
+          <p:nvPr/>
+        </p:nvCxnSpPr>
+        <p:spPr>
+          <a:xfrm flipV="1">
+            <a:off x="4298271" y="4199833"/>
+            <a:ext cx="1797729" cy="1312357"/>
+          </a:xfrm>
+          <a:prstGeom prst="straightConnector1">
+            <a:avLst/>
+          </a:prstGeom>
+          <a:ln w="28575">
+            <a:solidFill>
+              <a:srgbClr val="FF0000"/>
+            </a:solidFill>
+            <a:tailEnd type="triangle"/>
+          </a:ln>
+        </p:spPr>
+        <p:style>
+          <a:lnRef idx="1">
+            <a:schemeClr val="accent1"/>
+          </a:lnRef>
+          <a:fillRef idx="0">
+            <a:schemeClr val="accent1"/>
+          </a:fillRef>
+          <a:effectRef idx="0">
+            <a:schemeClr val="accent1"/>
+          </a:effectRef>
+          <a:fontRef idx="minor">
+            <a:schemeClr val="tx1"/>
+          </a:fontRef>
+        </p:style>
+      </p:cxnSp>
+      <p:cxnSp>
+        <p:nvCxnSpPr>
+          <p:cNvPr id="27" name="Straight Arrow Connector 26">
+            <a:extLst>
+              <a:ext uri="{FF2B5EF4-FFF2-40B4-BE49-F238E27FC236}">
+                <a16:creationId xmlns:a16="http://schemas.microsoft.com/office/drawing/2014/main" id="{A5B99ABE-C98D-48DA-86A1-641AECACA1C3}"/>
+              </a:ext>
+            </a:extLst>
+          </p:cNvPr>
+          <p:cNvCxnSpPr>
+            <a:cxnSpLocks/>
+          </p:cNvCxnSpPr>
+          <p:nvPr/>
+        </p:nvCxnSpPr>
+        <p:spPr>
+          <a:xfrm flipV="1">
+            <a:off x="4298271" y="5051394"/>
+            <a:ext cx="1797729" cy="460796"/>
+          </a:xfrm>
+          <a:prstGeom prst="straightConnector1">
+            <a:avLst/>
+          </a:prstGeom>
+          <a:ln w="28575">
+            <a:solidFill>
+              <a:srgbClr val="FF0000"/>
+            </a:solidFill>
+            <a:tailEnd type="triangle"/>
+          </a:ln>
+        </p:spPr>
+        <p:style>
+          <a:lnRef idx="1">
+            <a:schemeClr val="accent1"/>
+          </a:lnRef>
+          <a:fillRef idx="0">
+            <a:schemeClr val="accent1"/>
+          </a:fillRef>
+          <a:effectRef idx="0">
+            <a:schemeClr val="accent1"/>
+          </a:effectRef>
+          <a:fontRef idx="minor">
+            <a:schemeClr val="tx1"/>
+          </a:fontRef>
+        </p:style>
+      </p:cxnSp>
+      <p:cxnSp>
+        <p:nvCxnSpPr>
+          <p:cNvPr id="28" name="Straight Arrow Connector 27">
+            <a:extLst>
+              <a:ext uri="{FF2B5EF4-FFF2-40B4-BE49-F238E27FC236}">
+                <a16:creationId xmlns:a16="http://schemas.microsoft.com/office/drawing/2014/main" id="{B2BDBCE2-EAB0-4F67-8AF6-5DEA16D78778}"/>
+              </a:ext>
+            </a:extLst>
+          </p:cNvPr>
+          <p:cNvCxnSpPr>
+            <a:cxnSpLocks/>
+          </p:cNvCxnSpPr>
+          <p:nvPr/>
+        </p:nvCxnSpPr>
+        <p:spPr>
+          <a:xfrm>
+            <a:off x="4298271" y="5512190"/>
+            <a:ext cx="1797729" cy="462482"/>
+          </a:xfrm>
+          <a:prstGeom prst="straightConnector1">
+            <a:avLst/>
+          </a:prstGeom>
+          <a:ln w="28575">
+            <a:solidFill>
+              <a:srgbClr val="FF0000"/>
+            </a:solidFill>
+            <a:tailEnd type="triangle"/>
+          </a:ln>
+        </p:spPr>
+        <p:style>
+          <a:lnRef idx="1">
+            <a:schemeClr val="accent1"/>
+          </a:lnRef>
+          <a:fillRef idx="0">
+            <a:schemeClr val="accent1"/>
+          </a:fillRef>
+          <a:effectRef idx="0">
+            <a:schemeClr val="accent1"/>
+          </a:effectRef>
+          <a:fontRef idx="minor">
+            <a:schemeClr val="tx1"/>
+          </a:fontRef>
+        </p:style>
+      </p:cxnSp>
+      <p:sp>
+        <p:nvSpPr>
+          <p:cNvPr id="41" name="Oval 40">
+            <a:extLst>
+              <a:ext uri="{FF2B5EF4-FFF2-40B4-BE49-F238E27FC236}">
+                <a16:creationId xmlns:a16="http://schemas.microsoft.com/office/drawing/2014/main" id="{48C85E76-D7D6-434C-BDE3-7172013F0E3B}"/>
+              </a:ext>
+            </a:extLst>
+          </p:cNvPr>
+          <p:cNvSpPr/>
+          <p:nvPr/>
+        </p:nvSpPr>
+        <p:spPr>
+          <a:xfrm>
+            <a:off x="6764784" y="4065562"/>
+            <a:ext cx="701336" cy="336656"/>
+          </a:xfrm>
+          <a:prstGeom prst="ellipse">
+            <a:avLst/>
+          </a:prstGeom>
+          <a:noFill/>
+          <a:ln w="28575">
+            <a:solidFill>
+              <a:srgbClr val="FF0000"/>
+            </a:solidFill>
+          </a:ln>
+        </p:spPr>
+        <p:style>
+          <a:lnRef idx="2">
+            <a:schemeClr val="accent1">
+              <a:shade val="50000"/>
+            </a:schemeClr>
+          </a:lnRef>
+          <a:fillRef idx="1">
+            <a:schemeClr val="accent1"/>
+          </a:fillRef>
+          <a:effectRef idx="0">
+            <a:schemeClr val="accent1"/>
+          </a:effectRef>
+          <a:fontRef idx="minor">
+            <a:schemeClr val="lt1"/>
+          </a:fontRef>
+        </p:style>
+        <p:txBody>
+          <a:bodyPr rtlCol="0" anchor="ctr"/>
+          <a:lstStyle/>
+          <a:p>
+            <a:pPr algn="ctr"/>
+            <a:endParaRPr lang="en-US"/>
+          </a:p>
+        </p:txBody>
+      </p:sp>
+      <p:sp>
+        <p:nvSpPr>
+          <p:cNvPr id="42" name="Oval 41">
+            <a:extLst>
+              <a:ext uri="{FF2B5EF4-FFF2-40B4-BE49-F238E27FC236}">
+                <a16:creationId xmlns:a16="http://schemas.microsoft.com/office/drawing/2014/main" id="{E48B03F6-D413-430C-BFBA-C92DA12DF00A}"/>
+              </a:ext>
+            </a:extLst>
+          </p:cNvPr>
+          <p:cNvSpPr/>
+          <p:nvPr/>
+        </p:nvSpPr>
+        <p:spPr>
+          <a:xfrm>
+            <a:off x="6794397" y="5013782"/>
+            <a:ext cx="701336" cy="336656"/>
+          </a:xfrm>
+          <a:prstGeom prst="ellipse">
+            <a:avLst/>
+          </a:prstGeom>
+          <a:noFill/>
+          <a:ln w="28575">
+            <a:solidFill>
+              <a:srgbClr val="FF0000"/>
+            </a:solidFill>
+          </a:ln>
+        </p:spPr>
+        <p:style>
+          <a:lnRef idx="2">
+            <a:schemeClr val="accent1">
+              <a:shade val="50000"/>
+            </a:schemeClr>
+          </a:lnRef>
+          <a:fillRef idx="1">
+            <a:schemeClr val="accent1"/>
+          </a:fillRef>
+          <a:effectRef idx="0">
+            <a:schemeClr val="accent1"/>
+          </a:effectRef>
+          <a:fontRef idx="minor">
+            <a:schemeClr val="lt1"/>
+          </a:fontRef>
+        </p:style>
+        <p:txBody>
+          <a:bodyPr rtlCol="0" anchor="ctr"/>
+          <a:lstStyle/>
+          <a:p>
+            <a:pPr algn="ctr"/>
+            <a:endParaRPr lang="en-US"/>
+          </a:p>
+        </p:txBody>
+      </p:sp>
+      <p:sp>
+        <p:nvSpPr>
+          <p:cNvPr id="43" name="Oval 42">
+            <a:extLst>
+              <a:ext uri="{FF2B5EF4-FFF2-40B4-BE49-F238E27FC236}">
+                <a16:creationId xmlns:a16="http://schemas.microsoft.com/office/drawing/2014/main" id="{C2FFAEEF-F7CE-41C2-AB8F-928112A9AF19}"/>
+              </a:ext>
+            </a:extLst>
+          </p:cNvPr>
+          <p:cNvSpPr/>
+          <p:nvPr/>
+        </p:nvSpPr>
+        <p:spPr>
+          <a:xfrm>
+            <a:off x="6794397" y="5962002"/>
+            <a:ext cx="701336" cy="336656"/>
+          </a:xfrm>
+          <a:prstGeom prst="ellipse">
+            <a:avLst/>
+          </a:prstGeom>
+          <a:noFill/>
+          <a:ln w="28575">
+            <a:solidFill>
+              <a:srgbClr val="FF0000"/>
+            </a:solidFill>
+          </a:ln>
+        </p:spPr>
+        <p:style>
+          <a:lnRef idx="2">
+            <a:schemeClr val="accent1">
+              <a:shade val="50000"/>
+            </a:schemeClr>
+          </a:lnRef>
+          <a:fillRef idx="1">
+            <a:schemeClr val="accent1"/>
+          </a:fillRef>
+          <a:effectRef idx="0">
+            <a:schemeClr val="accent1"/>
+          </a:effectRef>
+          <a:fontRef idx="minor">
+            <a:schemeClr val="lt1"/>
+          </a:fontRef>
+        </p:style>
+        <p:txBody>
+          <a:bodyPr rtlCol="0" anchor="ctr"/>
+          <a:lstStyle/>
+          <a:p>
+            <a:pPr algn="ctr"/>
+            <a:endParaRPr lang="en-US"/>
+          </a:p>
+        </p:txBody>
+      </p:sp>
+    </p:spTree>
+    <p:extLst>
+      <p:ext uri="{BB962C8B-B14F-4D97-AF65-F5344CB8AC3E}">
+        <p14:creationId xmlns:p14="http://schemas.microsoft.com/office/powerpoint/2010/main" val="698794833"/>
+      </p:ext>
+    </p:extLst>
+  </p:cSld>
+  <p:clrMapOvr>
+    <a:masterClrMapping/>
+  </p:clrMapOvr>
+  <p:timing>
+    <p:tnLst>
+      <p:par>
+        <p:cTn id="1" dur="indefinite" restart="never" nodeType="tmRoot">
+          <p:childTnLst>
+            <p:seq concurrent="1" nextAc="seek">
+              <p:cTn id="2" dur="indefinite" nodeType="mainSeq">
+                <p:childTnLst>
+                  <p:par>
+                    <p:cTn id="3" fill="hold">
+                      <p:stCondLst>
+                        <p:cond delay="indefinite"/>
+                      </p:stCondLst>
+                      <p:childTnLst>
+                        <p:par>
+                          <p:cTn id="4" fill="hold">
+                            <p:stCondLst>
+                              <p:cond delay="0"/>
+                            </p:stCondLst>
+                            <p:childTnLst>
+                              <p:par>
+                                <p:cTn id="5" presetID="10" presetClass="entr" presetSubtype="0" fill="hold" grpId="0" nodeType="clickEffect">
+                                  <p:stCondLst>
+                                    <p:cond delay="0"/>
+                                  </p:stCondLst>
+                                  <p:childTnLst>
+                                    <p:set>
+                                      <p:cBhvr>
+                                        <p:cTn id="6" dur="1" fill="hold">
+                                          <p:stCondLst>
+                                            <p:cond delay="0"/>
+                                          </p:stCondLst>
+                                        </p:cTn>
+                                        <p:tgtEl>
+                                          <p:spTgt spid="23"/>
+                                        </p:tgtEl>
+                                        <p:attrNameLst>
+                                          <p:attrName>style.visibility</p:attrName>
+                                        </p:attrNameLst>
+                                      </p:cBhvr>
+                                      <p:to>
+                                        <p:strVal val="visible"/>
+                                      </p:to>
+                                    </p:set>
+                                    <p:animEffect transition="in" filter="fade">
+                                      <p:cBhvr>
+                                        <p:cTn id="7" dur="3250"/>
+                                        <p:tgtEl>
+                                          <p:spTgt spid="23"/>
+                                        </p:tgtEl>
+                                      </p:cBhvr>
+                                    </p:animEffect>
+                                  </p:childTnLst>
+                                </p:cTn>
+                              </p:par>
+                              <p:par>
+                                <p:cTn id="8" presetID="10" presetClass="entr" presetSubtype="0" fill="hold" nodeType="withEffect">
+                                  <p:stCondLst>
+                                    <p:cond delay="0"/>
+                                  </p:stCondLst>
+                                  <p:childTnLst>
+                                    <p:set>
+                                      <p:cBhvr>
+                                        <p:cTn id="9" dur="1" fill="hold">
+                                          <p:stCondLst>
+                                            <p:cond delay="0"/>
+                                          </p:stCondLst>
+                                        </p:cTn>
+                                        <p:tgtEl>
+                                          <p:spTgt spid="16"/>
+                                        </p:tgtEl>
+                                        <p:attrNameLst>
+                                          <p:attrName>style.visibility</p:attrName>
+                                        </p:attrNameLst>
+                                      </p:cBhvr>
+                                      <p:to>
+                                        <p:strVal val="visible"/>
+                                      </p:to>
+                                    </p:set>
+                                    <p:animEffect transition="in" filter="fade">
+                                      <p:cBhvr>
+                                        <p:cTn id="10" dur="3250"/>
+                                        <p:tgtEl>
+                                          <p:spTgt spid="16"/>
+                                        </p:tgtEl>
+                                      </p:cBhvr>
+                                    </p:animEffect>
+                                  </p:childTnLst>
+                                </p:cTn>
+                              </p:par>
+                              <p:par>
+                                <p:cTn id="11" presetID="10" presetClass="entr" presetSubtype="0" fill="hold" nodeType="withEffect">
+                                  <p:stCondLst>
+                                    <p:cond delay="0"/>
+                                  </p:stCondLst>
+                                  <p:childTnLst>
+                                    <p:set>
+                                      <p:cBhvr>
+                                        <p:cTn id="12" dur="1" fill="hold">
+                                          <p:stCondLst>
+                                            <p:cond delay="0"/>
+                                          </p:stCondLst>
+                                        </p:cTn>
+                                        <p:tgtEl>
+                                          <p:spTgt spid="19"/>
+                                        </p:tgtEl>
+                                        <p:attrNameLst>
+                                          <p:attrName>style.visibility</p:attrName>
+                                        </p:attrNameLst>
+                                      </p:cBhvr>
+                                      <p:to>
+                                        <p:strVal val="visible"/>
+                                      </p:to>
+                                    </p:set>
+                                    <p:animEffect transition="in" filter="fade">
+                                      <p:cBhvr>
+                                        <p:cTn id="13" dur="3250"/>
+                                        <p:tgtEl>
+                                          <p:spTgt spid="19"/>
+                                        </p:tgtEl>
+                                      </p:cBhvr>
+                                    </p:animEffect>
+                                  </p:childTnLst>
+                                </p:cTn>
+                              </p:par>
+                              <p:par>
+                                <p:cTn id="14" presetID="10" presetClass="entr" presetSubtype="0" fill="hold" nodeType="withEffect">
+                                  <p:stCondLst>
+                                    <p:cond delay="0"/>
+                                  </p:stCondLst>
+                                  <p:childTnLst>
+                                    <p:set>
+                                      <p:cBhvr>
+                                        <p:cTn id="15" dur="1" fill="hold">
+                                          <p:stCondLst>
+                                            <p:cond delay="0"/>
+                                          </p:stCondLst>
+                                        </p:cTn>
+                                        <p:tgtEl>
+                                          <p:spTgt spid="21"/>
+                                        </p:tgtEl>
+                                        <p:attrNameLst>
+                                          <p:attrName>style.visibility</p:attrName>
+                                        </p:attrNameLst>
+                                      </p:cBhvr>
+                                      <p:to>
+                                        <p:strVal val="visible"/>
+                                      </p:to>
+                                    </p:set>
+                                    <p:animEffect transition="in" filter="fade">
+                                      <p:cBhvr>
+                                        <p:cTn id="16" dur="3250"/>
+                                        <p:tgtEl>
+                                          <p:spTgt spid="21"/>
+                                        </p:tgtEl>
+                                      </p:cBhvr>
+                                    </p:animEffect>
+                                  </p:childTnLst>
+                                </p:cTn>
+                              </p:par>
+                              <p:par>
+                                <p:cTn id="17" presetID="10" presetClass="entr" presetSubtype="0" fill="hold" nodeType="withEffect">
+                                  <p:stCondLst>
+                                    <p:cond delay="0"/>
+                                  </p:stCondLst>
+                                  <p:childTnLst>
+                                    <p:set>
+                                      <p:cBhvr>
+                                        <p:cTn id="18" dur="1" fill="hold">
+                                          <p:stCondLst>
+                                            <p:cond delay="0"/>
+                                          </p:stCondLst>
+                                        </p:cTn>
+                                        <p:tgtEl>
+                                          <p:spTgt spid="9"/>
+                                        </p:tgtEl>
+                                        <p:attrNameLst>
+                                          <p:attrName>style.visibility</p:attrName>
+                                        </p:attrNameLst>
+                                      </p:cBhvr>
+                                      <p:to>
+                                        <p:strVal val="visible"/>
+                                      </p:to>
+                                    </p:set>
+                                    <p:animEffect transition="in" filter="fade">
+                                      <p:cBhvr>
+                                        <p:cTn id="19" dur="3250"/>
+                                        <p:tgtEl>
+                                          <p:spTgt spid="9"/>
+                                        </p:tgtEl>
+                                      </p:cBhvr>
+                                    </p:animEffect>
+                                  </p:childTnLst>
+                                </p:cTn>
+                              </p:par>
+                              <p:par>
+                                <p:cTn id="20" presetID="10" presetClass="entr" presetSubtype="0" fill="hold" nodeType="withEffect">
+                                  <p:stCondLst>
+                                    <p:cond delay="0"/>
+                                  </p:stCondLst>
+                                  <p:childTnLst>
+                                    <p:set>
+                                      <p:cBhvr>
+                                        <p:cTn id="21" dur="1" fill="hold">
+                                          <p:stCondLst>
+                                            <p:cond delay="0"/>
+                                          </p:stCondLst>
+                                        </p:cTn>
+                                        <p:tgtEl>
+                                          <p:spTgt spid="11"/>
+                                        </p:tgtEl>
+                                        <p:attrNameLst>
+                                          <p:attrName>style.visibility</p:attrName>
+                                        </p:attrNameLst>
+                                      </p:cBhvr>
+                                      <p:to>
+                                        <p:strVal val="visible"/>
+                                      </p:to>
+                                    </p:set>
+                                    <p:animEffect transition="in" filter="fade">
+                                      <p:cBhvr>
+                                        <p:cTn id="22" dur="3250"/>
+                                        <p:tgtEl>
+                                          <p:spTgt spid="11"/>
+                                        </p:tgtEl>
+                                      </p:cBhvr>
+                                    </p:animEffect>
+                                  </p:childTnLst>
+                                </p:cTn>
+                              </p:par>
+                              <p:par>
+                                <p:cTn id="23" presetID="10" presetClass="entr" presetSubtype="0" fill="hold" nodeType="withEffect">
+                                  <p:stCondLst>
+                                    <p:cond delay="0"/>
+                                  </p:stCondLst>
+                                  <p:childTnLst>
+                                    <p:set>
+                                      <p:cBhvr>
+                                        <p:cTn id="24" dur="1" fill="hold">
+                                          <p:stCondLst>
+                                            <p:cond delay="0"/>
+                                          </p:stCondLst>
+                                        </p:cTn>
+                                        <p:tgtEl>
+                                          <p:spTgt spid="12"/>
+                                        </p:tgtEl>
+                                        <p:attrNameLst>
+                                          <p:attrName>style.visibility</p:attrName>
+                                        </p:attrNameLst>
+                                      </p:cBhvr>
+                                      <p:to>
+                                        <p:strVal val="visible"/>
+                                      </p:to>
+                                    </p:set>
+                                    <p:animEffect transition="in" filter="fade">
+                                      <p:cBhvr>
+                                        <p:cTn id="25" dur="3250"/>
+                                        <p:tgtEl>
+                                          <p:spTgt spid="12"/>
+                                        </p:tgtEl>
+                                      </p:cBhvr>
+                                    </p:animEffect>
+                                  </p:childTnLst>
+                                </p:cTn>
+                              </p:par>
+                              <p:par>
+                                <p:cTn id="26" presetID="10" presetClass="entr" presetSubtype="0" fill="hold" grpId="0" nodeType="withEffect">
+                                  <p:stCondLst>
+                                    <p:cond delay="0"/>
+                                  </p:stCondLst>
+                                  <p:childTnLst>
+                                    <p:set>
+                                      <p:cBhvr>
+                                        <p:cTn id="27" dur="1" fill="hold">
+                                          <p:stCondLst>
+                                            <p:cond delay="0"/>
+                                          </p:stCondLst>
+                                        </p:cTn>
+                                        <p:tgtEl>
+                                          <p:spTgt spid="24"/>
+                                        </p:tgtEl>
+                                        <p:attrNameLst>
+                                          <p:attrName>style.visibility</p:attrName>
+                                        </p:attrNameLst>
+                                      </p:cBhvr>
+                                      <p:to>
+                                        <p:strVal val="visible"/>
+                                      </p:to>
+                                    </p:set>
+                                    <p:animEffect transition="in" filter="fade">
+                                      <p:cBhvr>
+                                        <p:cTn id="28" dur="3250"/>
+                                        <p:tgtEl>
+                                          <p:spTgt spid="24"/>
+                                        </p:tgtEl>
+                                      </p:cBhvr>
+                                    </p:animEffect>
+                                  </p:childTnLst>
+                                </p:cTn>
+                              </p:par>
+                            </p:childTnLst>
+                          </p:cTn>
+                        </p:par>
+                      </p:childTnLst>
+                    </p:cTn>
+                  </p:par>
+                  <p:par>
+                    <p:cTn id="29" fill="hold">
+                      <p:stCondLst>
+                        <p:cond delay="indefinite"/>
+                      </p:stCondLst>
+                      <p:childTnLst>
+                        <p:par>
+                          <p:cTn id="30" fill="hold">
+                            <p:stCondLst>
+                              <p:cond delay="0"/>
+                            </p:stCondLst>
+                            <p:childTnLst>
+                              <p:par>
+                                <p:cTn id="31" presetID="10" presetClass="entr" presetSubtype="0" fill="hold" grpId="0" nodeType="clickEffect">
+                                  <p:stCondLst>
+                                    <p:cond delay="0"/>
+                                  </p:stCondLst>
+                                  <p:childTnLst>
+                                    <p:set>
+                                      <p:cBhvr>
+                                        <p:cTn id="32" dur="1" fill="hold">
+                                          <p:stCondLst>
+                                            <p:cond delay="0"/>
+                                          </p:stCondLst>
+                                        </p:cTn>
+                                        <p:tgtEl>
+                                          <p:spTgt spid="25"/>
+                                        </p:tgtEl>
+                                        <p:attrNameLst>
+                                          <p:attrName>style.visibility</p:attrName>
+                                        </p:attrNameLst>
+                                      </p:cBhvr>
+                                      <p:to>
+                                        <p:strVal val="visible"/>
+                                      </p:to>
+                                    </p:set>
+                                    <p:animEffect transition="in" filter="fade">
+                                      <p:cBhvr>
+                                        <p:cTn id="33" dur="3750"/>
+                                        <p:tgtEl>
+                                          <p:spTgt spid="25"/>
+                                        </p:tgtEl>
+                                      </p:cBhvr>
+                                    </p:animEffect>
+                                  </p:childTnLst>
+                                </p:cTn>
+                              </p:par>
+                              <p:par>
+                                <p:cTn id="34" presetID="10" presetClass="entr" presetSubtype="0" fill="hold" nodeType="withEffect">
+                                  <p:stCondLst>
+                                    <p:cond delay="0"/>
+                                  </p:stCondLst>
+                                  <p:childTnLst>
+                                    <p:set>
+                                      <p:cBhvr>
+                                        <p:cTn id="35" dur="1" fill="hold">
+                                          <p:stCondLst>
+                                            <p:cond delay="0"/>
+                                          </p:stCondLst>
+                                        </p:cTn>
+                                        <p:tgtEl>
+                                          <p:spTgt spid="26"/>
+                                        </p:tgtEl>
+                                        <p:attrNameLst>
+                                          <p:attrName>style.visibility</p:attrName>
+                                        </p:attrNameLst>
+                                      </p:cBhvr>
+                                      <p:to>
+                                        <p:strVal val="visible"/>
+                                      </p:to>
+                                    </p:set>
+                                    <p:animEffect transition="in" filter="fade">
+                                      <p:cBhvr>
+                                        <p:cTn id="36" dur="3750"/>
+                                        <p:tgtEl>
+                                          <p:spTgt spid="26"/>
+                                        </p:tgtEl>
+                                      </p:cBhvr>
+                                    </p:animEffect>
+                                  </p:childTnLst>
+                                </p:cTn>
+                              </p:par>
+                              <p:par>
+                                <p:cTn id="37" presetID="10" presetClass="entr" presetSubtype="0" fill="hold" nodeType="withEffect">
+                                  <p:stCondLst>
+                                    <p:cond delay="0"/>
+                                  </p:stCondLst>
+                                  <p:childTnLst>
+                                    <p:set>
+                                      <p:cBhvr>
+                                        <p:cTn id="38" dur="1" fill="hold">
+                                          <p:stCondLst>
+                                            <p:cond delay="0"/>
+                                          </p:stCondLst>
+                                        </p:cTn>
+                                        <p:tgtEl>
+                                          <p:spTgt spid="27"/>
+                                        </p:tgtEl>
+                                        <p:attrNameLst>
+                                          <p:attrName>style.visibility</p:attrName>
+                                        </p:attrNameLst>
+                                      </p:cBhvr>
+                                      <p:to>
+                                        <p:strVal val="visible"/>
+                                      </p:to>
+                                    </p:set>
+                                    <p:animEffect transition="in" filter="fade">
+                                      <p:cBhvr>
+                                        <p:cTn id="39" dur="3750"/>
+                                        <p:tgtEl>
+                                          <p:spTgt spid="27"/>
+                                        </p:tgtEl>
+                                      </p:cBhvr>
+                                    </p:animEffect>
+                                  </p:childTnLst>
+                                </p:cTn>
+                              </p:par>
+                              <p:par>
+                                <p:cTn id="40" presetID="10" presetClass="entr" presetSubtype="0" fill="hold" nodeType="withEffect">
+                                  <p:stCondLst>
+                                    <p:cond delay="0"/>
+                                  </p:stCondLst>
+                                  <p:childTnLst>
+                                    <p:set>
+                                      <p:cBhvr>
+                                        <p:cTn id="41" dur="1" fill="hold">
+                                          <p:stCondLst>
+                                            <p:cond delay="0"/>
+                                          </p:stCondLst>
+                                        </p:cTn>
+                                        <p:tgtEl>
+                                          <p:spTgt spid="28"/>
+                                        </p:tgtEl>
+                                        <p:attrNameLst>
+                                          <p:attrName>style.visibility</p:attrName>
+                                        </p:attrNameLst>
+                                      </p:cBhvr>
+                                      <p:to>
+                                        <p:strVal val="visible"/>
+                                      </p:to>
+                                    </p:set>
+                                    <p:animEffect transition="in" filter="fade">
+                                      <p:cBhvr>
+                                        <p:cTn id="42" dur="3750"/>
+                                        <p:tgtEl>
+                                          <p:spTgt spid="28"/>
+                                        </p:tgtEl>
+                                      </p:cBhvr>
+                                    </p:animEffect>
+                                  </p:childTnLst>
+                                </p:cTn>
+                              </p:par>
+                            </p:childTnLst>
+                          </p:cTn>
+                        </p:par>
+                      </p:childTnLst>
+                    </p:cTn>
+                  </p:par>
+                  <p:par>
+                    <p:cTn id="43" fill="hold">
+                      <p:stCondLst>
+                        <p:cond delay="indefinite"/>
+                      </p:stCondLst>
+                      <p:childTnLst>
+                        <p:par>
+                          <p:cTn id="44" fill="hold">
+                            <p:stCondLst>
+                              <p:cond delay="0"/>
+                            </p:stCondLst>
+                            <p:childTnLst>
+                              <p:par>
+                                <p:cTn id="45" presetID="10" presetClass="entr" presetSubtype="0" fill="hold" grpId="0" nodeType="clickEffect">
+                                  <p:stCondLst>
+                                    <p:cond delay="0"/>
+                                  </p:stCondLst>
+                                  <p:childTnLst>
+                                    <p:set>
+                                      <p:cBhvr>
+                                        <p:cTn id="46" dur="1" fill="hold">
+                                          <p:stCondLst>
+                                            <p:cond delay="0"/>
+                                          </p:stCondLst>
+                                        </p:cTn>
+                                        <p:tgtEl>
+                                          <p:spTgt spid="41"/>
+                                        </p:tgtEl>
+                                        <p:attrNameLst>
+                                          <p:attrName>style.visibility</p:attrName>
+                                        </p:attrNameLst>
+                                      </p:cBhvr>
+                                      <p:to>
+                                        <p:strVal val="visible"/>
+                                      </p:to>
+                                    </p:set>
+                                    <p:animEffect transition="in" filter="fade">
+                                      <p:cBhvr>
+                                        <p:cTn id="47" dur="2000"/>
+                                        <p:tgtEl>
+                                          <p:spTgt spid="41"/>
+                                        </p:tgtEl>
+                                      </p:cBhvr>
+                                    </p:animEffect>
+                                  </p:childTnLst>
+                                </p:cTn>
+                              </p:par>
+                              <p:par>
+                                <p:cTn id="48" presetID="10" presetClass="entr" presetSubtype="0" fill="hold" grpId="0" nodeType="withEffect">
+                                  <p:stCondLst>
+                                    <p:cond delay="0"/>
+                                  </p:stCondLst>
+                                  <p:childTnLst>
+                                    <p:set>
+                                      <p:cBhvr>
+                                        <p:cTn id="49" dur="1" fill="hold">
+                                          <p:stCondLst>
+                                            <p:cond delay="0"/>
+                                          </p:stCondLst>
+                                        </p:cTn>
+                                        <p:tgtEl>
+                                          <p:spTgt spid="42"/>
+                                        </p:tgtEl>
+                                        <p:attrNameLst>
+                                          <p:attrName>style.visibility</p:attrName>
+                                        </p:attrNameLst>
+                                      </p:cBhvr>
+                                      <p:to>
+                                        <p:strVal val="visible"/>
+                                      </p:to>
+                                    </p:set>
+                                    <p:animEffect transition="in" filter="fade">
+                                      <p:cBhvr>
+                                        <p:cTn id="50" dur="2000"/>
+                                        <p:tgtEl>
+                                          <p:spTgt spid="42"/>
+                                        </p:tgtEl>
+                                      </p:cBhvr>
+                                    </p:animEffect>
+                                  </p:childTnLst>
+                                </p:cTn>
+                              </p:par>
+                              <p:par>
+                                <p:cTn id="51" presetID="10" presetClass="entr" presetSubtype="0" fill="hold" grpId="0" nodeType="withEffect">
+                                  <p:stCondLst>
+                                    <p:cond delay="0"/>
+                                  </p:stCondLst>
+                                  <p:childTnLst>
+                                    <p:set>
+                                      <p:cBhvr>
+                                        <p:cTn id="52" dur="1" fill="hold">
+                                          <p:stCondLst>
+                                            <p:cond delay="0"/>
+                                          </p:stCondLst>
+                                        </p:cTn>
+                                        <p:tgtEl>
+                                          <p:spTgt spid="43"/>
+                                        </p:tgtEl>
+                                        <p:attrNameLst>
+                                          <p:attrName>style.visibility</p:attrName>
+                                        </p:attrNameLst>
+                                      </p:cBhvr>
+                                      <p:to>
+                                        <p:strVal val="visible"/>
+                                      </p:to>
+                                    </p:set>
+                                    <p:animEffect transition="in" filter="fade">
+                                      <p:cBhvr>
+                                        <p:cTn id="53" dur="2000"/>
+                                        <p:tgtEl>
+                                          <p:spTgt spid="43"/>
+                                        </p:tgtEl>
+                                      </p:cBhvr>
+                                    </p:animEffect>
+                                  </p:childTnLst>
+                                </p:cTn>
+                              </p:par>
+                            </p:childTnLst>
+                          </p:cTn>
+                        </p:par>
+                      </p:childTnLst>
+                    </p:cTn>
+                  </p:par>
+                </p:childTnLst>
+              </p:cTn>
+              <p:prevCondLst>
+                <p:cond evt="onPrev" delay="0">
+                  <p:tgtEl>
+                    <p:sldTgt/>
+                  </p:tgtEl>
+                </p:cond>
+              </p:prevCondLst>
+              <p:nextCondLst>
+                <p:cond evt="onNext" delay="0">
+                  <p:tgtEl>
+                    <p:sldTgt/>
+                  </p:tgtEl>
+                </p:cond>
+              </p:nextCondLst>
+            </p:seq>
+          </p:childTnLst>
+        </p:cTn>
+      </p:par>
+    </p:tnLst>
+    <p:bldLst>
+      <p:bldP spid="23" grpId="0"/>
+      <p:bldP spid="24" grpId="0"/>
+      <p:bldP spid="25" grpId="0"/>
+      <p:bldP spid="41" grpId="0" animBg="1"/>
+      <p:bldP spid="42" grpId="0" animBg="1"/>
+      <p:bldP spid="43" grpId="0" animBg="1"/>
+    </p:bldLst>
+  </p:timing>
+</p:sld>
+</file>
+
+<file path=ppt/slides/slide11.xml><?xml version="1.0" encoding="utf-8"?>
+<p:sld xmlns:a="http://schemas.openxmlformats.org/drawingml/2006/main" xmlns:r="http://schemas.openxmlformats.org/officeDocument/2006/relationships" xmlns:p="http://schemas.openxmlformats.org/presentationml/2006/main">
+  <p:cSld>
+    <p:spTree>
+      <p:nvGrpSpPr>
+        <p:cNvPr id="1" name=""/>
+        <p:cNvGrpSpPr/>
+        <p:nvPr/>
+      </p:nvGrpSpPr>
+      <p:grpSpPr>
+        <a:xfrm>
+          <a:off x="0" y="0"/>
+          <a:ext cx="0" cy="0"/>
+          <a:chOff x="0" y="0"/>
+          <a:chExt cx="0" cy="0"/>
+        </a:xfrm>
+      </p:grpSpPr>
+      <p:sp>
+        <p:nvSpPr>
+          <p:cNvPr id="2" name="Title 1">
+            <a:extLst>
+              <a:ext uri="{FF2B5EF4-FFF2-40B4-BE49-F238E27FC236}">
+                <a16:creationId xmlns:a16="http://schemas.microsoft.com/office/drawing/2014/main" id="{26B08546-88E8-4C8E-B76A-30C02E67700D}"/>
+              </a:ext>
+            </a:extLst>
+          </p:cNvPr>
+          <p:cNvSpPr>
+            <a:spLocks noGrp="1"/>
+          </p:cNvSpPr>
+          <p:nvPr>
+            <p:ph type="title"/>
+          </p:nvPr>
+        </p:nvSpPr>
+        <p:spPr>
+          <a:xfrm>
+            <a:off x="838200" y="89918"/>
+            <a:ext cx="10515600" cy="737702"/>
+          </a:xfrm>
+        </p:spPr>
+        <p:txBody>
+          <a:bodyPr>
+            <a:normAutofit/>
+          </a:bodyPr>
+          <a:lstStyle/>
+          <a:p>
+            <a:pPr algn="ctr"/>
+            <a:r>
+              <a:rPr lang="en-US" sz="3600" dirty="0"/>
+              <a:t>It worked out fine!</a:t>
+            </a:r>
+          </a:p>
+        </p:txBody>
+      </p:sp>
+      <p:sp>
+        <p:nvSpPr>
+          <p:cNvPr id="3" name="Content Placeholder 2">
+            <a:extLst>
+              <a:ext uri="{FF2B5EF4-FFF2-40B4-BE49-F238E27FC236}">
+                <a16:creationId xmlns:a16="http://schemas.microsoft.com/office/drawing/2014/main" id="{AF86BCC4-71A6-47D3-AF75-B146C9E50E28}"/>
+              </a:ext>
+            </a:extLst>
+          </p:cNvPr>
+          <p:cNvSpPr>
+            <a:spLocks noGrp="1"/>
+          </p:cNvSpPr>
+          <p:nvPr>
+            <p:ph idx="1"/>
+          </p:nvPr>
+        </p:nvSpPr>
+        <p:spPr>
+          <a:xfrm>
+            <a:off x="838200" y="899466"/>
+            <a:ext cx="10515600" cy="4351338"/>
+          </a:xfrm>
+        </p:spPr>
+        <p:txBody>
+          <a:bodyPr>
+            <a:normAutofit/>
+          </a:bodyPr>
+          <a:lstStyle/>
+          <a:p>
+            <a:r>
+              <a:rPr lang="en-US" sz="2000" dirty="0"/>
+              <a:t>Without this calibration, green line always deviated from the expectations. </a:t>
+            </a:r>
+          </a:p>
+          <a:p>
+            <a:pPr marL="0" indent="0">
+              <a:buNone/>
+            </a:pPr>
+            <a:r>
+              <a:rPr lang="en-US" sz="2000" dirty="0"/>
+              <a:t>     But now that is also settled.</a:t>
+            </a:r>
+          </a:p>
+        </p:txBody>
+      </p:sp>
+      <p:pic>
+        <p:nvPicPr>
+          <p:cNvPr id="5" name="Picture 4" descr="Chart, histogram&#10;&#10;Description automatically generated">
+            <a:extLst>
+              <a:ext uri="{FF2B5EF4-FFF2-40B4-BE49-F238E27FC236}">
+                <a16:creationId xmlns:a16="http://schemas.microsoft.com/office/drawing/2014/main" id="{60B06028-55C7-4A08-B476-08E423A7FE71}"/>
+              </a:ext>
+            </a:extLst>
+          </p:cNvPr>
+          <p:cNvPicPr>
+            <a:picLocks noChangeAspect="1"/>
+          </p:cNvPicPr>
+          <p:nvPr/>
+        </p:nvPicPr>
+        <p:blipFill rotWithShape="1">
+          <a:blip r:embed="rId2">
+            <a:extLst>
+              <a:ext uri="{28A0092B-C50C-407E-A947-70E740481C1C}">
+                <a14:useLocalDpi xmlns:a14="http://schemas.microsoft.com/office/drawing/2010/main" val="0"/>
+              </a:ext>
+            </a:extLst>
+          </a:blip>
+          <a:srcRect r="46806"/>
+          <a:stretch/>
+        </p:blipFill>
+        <p:spPr>
+          <a:xfrm>
+            <a:off x="3145182" y="1952638"/>
+            <a:ext cx="6256360" cy="4686423"/>
+          </a:xfrm>
+          <a:prstGeom prst="rect">
+            <a:avLst/>
+          </a:prstGeom>
+        </p:spPr>
+      </p:pic>
+      <p:sp>
+        <p:nvSpPr>
+          <p:cNvPr id="6" name="TextBox 5">
+            <a:extLst>
+              <a:ext uri="{FF2B5EF4-FFF2-40B4-BE49-F238E27FC236}">
+                <a16:creationId xmlns:a16="http://schemas.microsoft.com/office/drawing/2014/main" id="{46662D56-A5B9-4AF3-96CF-66D0BA9C79E6}"/>
+              </a:ext>
+            </a:extLst>
+          </p:cNvPr>
+          <p:cNvSpPr txBox="1"/>
+          <p:nvPr/>
+        </p:nvSpPr>
+        <p:spPr>
+          <a:xfrm>
+            <a:off x="494345" y="2433894"/>
+            <a:ext cx="2558472" cy="369332"/>
+          </a:xfrm>
+          <a:prstGeom prst="rect">
+            <a:avLst/>
+          </a:prstGeom>
+          <a:noFill/>
+        </p:spPr>
+        <p:txBody>
+          <a:bodyPr wrap="square" rtlCol="0">
+            <a:spAutoFit/>
+          </a:bodyPr>
+          <a:lstStyle/>
+          <a:p>
+            <a:r>
+              <a:rPr lang="en-US" dirty="0"/>
+              <a:t>Before transform</a:t>
+            </a:r>
+          </a:p>
+        </p:txBody>
+      </p:sp>
+      <p:sp>
+        <p:nvSpPr>
+          <p:cNvPr id="7" name="TextBox 6">
+            <a:extLst>
+              <a:ext uri="{FF2B5EF4-FFF2-40B4-BE49-F238E27FC236}">
+                <a16:creationId xmlns:a16="http://schemas.microsoft.com/office/drawing/2014/main" id="{5E6C860A-E845-4C0C-851E-9FDD6C365A6A}"/>
+              </a:ext>
+            </a:extLst>
+          </p:cNvPr>
+          <p:cNvSpPr txBox="1"/>
+          <p:nvPr/>
+        </p:nvSpPr>
+        <p:spPr>
+          <a:xfrm>
+            <a:off x="494345" y="4817822"/>
+            <a:ext cx="2558472" cy="369332"/>
+          </a:xfrm>
+          <a:prstGeom prst="rect">
+            <a:avLst/>
+          </a:prstGeom>
+          <a:noFill/>
+        </p:spPr>
+        <p:txBody>
+          <a:bodyPr wrap="square" rtlCol="0">
+            <a:spAutoFit/>
+          </a:bodyPr>
+          <a:lstStyle/>
+          <a:p>
+            <a:r>
+              <a:rPr lang="en-US" dirty="0"/>
+              <a:t>After transform</a:t>
+            </a:r>
+          </a:p>
+        </p:txBody>
+      </p:sp>
+      <p:sp>
+        <p:nvSpPr>
+          <p:cNvPr id="8" name="TextBox 7">
+            <a:extLst>
+              <a:ext uri="{FF2B5EF4-FFF2-40B4-BE49-F238E27FC236}">
+                <a16:creationId xmlns:a16="http://schemas.microsoft.com/office/drawing/2014/main" id="{5D6EC3A5-C894-43B0-9ED1-49102CCE03A9}"/>
+              </a:ext>
+            </a:extLst>
+          </p:cNvPr>
+          <p:cNvSpPr txBox="1"/>
+          <p:nvPr/>
+        </p:nvSpPr>
+        <p:spPr>
+          <a:xfrm>
+            <a:off x="10324701" y="4633156"/>
+            <a:ext cx="1484894" cy="369332"/>
+          </a:xfrm>
+          <a:prstGeom prst="rect">
+            <a:avLst/>
+          </a:prstGeom>
+          <a:noFill/>
+        </p:spPr>
+        <p:txBody>
+          <a:bodyPr wrap="none" rtlCol="0">
+            <a:spAutoFit/>
+          </a:bodyPr>
+          <a:lstStyle/>
+          <a:p>
+            <a:r>
+              <a:rPr lang="en-US" dirty="0"/>
+              <a:t>Green Object </a:t>
+            </a:r>
+          </a:p>
+        </p:txBody>
+      </p:sp>
+      <p:sp>
+        <p:nvSpPr>
+          <p:cNvPr id="9" name="TextBox 8">
+            <a:extLst>
+              <a:ext uri="{FF2B5EF4-FFF2-40B4-BE49-F238E27FC236}">
+                <a16:creationId xmlns:a16="http://schemas.microsoft.com/office/drawing/2014/main" id="{B47A52F7-A0CB-4C0B-BD0D-CB1EC06F589E}"/>
+              </a:ext>
+            </a:extLst>
+          </p:cNvPr>
+          <p:cNvSpPr txBox="1"/>
+          <p:nvPr/>
+        </p:nvSpPr>
+        <p:spPr>
+          <a:xfrm>
+            <a:off x="9401542" y="906187"/>
+            <a:ext cx="1478995" cy="369332"/>
+          </a:xfrm>
+          <a:prstGeom prst="rect">
+            <a:avLst/>
+          </a:prstGeom>
+          <a:noFill/>
+        </p:spPr>
+        <p:txBody>
+          <a:bodyPr wrap="none" rtlCol="0">
+            <a:spAutoFit/>
+          </a:bodyPr>
+          <a:lstStyle/>
+          <a:p>
+            <a:r>
+              <a:rPr lang="en-US" dirty="0"/>
+              <a:t>White Object </a:t>
+            </a:r>
+          </a:p>
+        </p:txBody>
+      </p:sp>
+      <p:cxnSp>
+        <p:nvCxnSpPr>
+          <p:cNvPr id="11" name="Straight Arrow Connector 10">
+            <a:extLst>
+              <a:ext uri="{FF2B5EF4-FFF2-40B4-BE49-F238E27FC236}">
+                <a16:creationId xmlns:a16="http://schemas.microsoft.com/office/drawing/2014/main" id="{58C78138-821B-41C6-BF4D-E06D5CF65240}"/>
+              </a:ext>
+            </a:extLst>
+          </p:cNvPr>
+          <p:cNvCxnSpPr>
+            <a:cxnSpLocks/>
+          </p:cNvCxnSpPr>
+          <p:nvPr/>
+        </p:nvCxnSpPr>
+        <p:spPr>
+          <a:xfrm flipH="1">
+            <a:off x="6226010" y="1104926"/>
+            <a:ext cx="3175532" cy="750587"/>
+          </a:xfrm>
+          <a:prstGeom prst="straightConnector1">
+            <a:avLst/>
+          </a:prstGeom>
+          <a:ln w="28575">
+            <a:solidFill>
+              <a:srgbClr val="FF0000"/>
+            </a:solidFill>
+            <a:tailEnd type="triangle"/>
+          </a:ln>
+        </p:spPr>
+        <p:style>
+          <a:lnRef idx="1">
+            <a:schemeClr val="accent1"/>
+          </a:lnRef>
+          <a:fillRef idx="0">
+            <a:schemeClr val="accent1"/>
+          </a:fillRef>
+          <a:effectRef idx="0">
+            <a:schemeClr val="accent1"/>
+          </a:effectRef>
+          <a:fontRef idx="minor">
+            <a:schemeClr val="tx1"/>
+          </a:fontRef>
+        </p:style>
+      </p:cxnSp>
+      <p:cxnSp>
+        <p:nvCxnSpPr>
+          <p:cNvPr id="13" name="Straight Arrow Connector 12">
+            <a:extLst>
+              <a:ext uri="{FF2B5EF4-FFF2-40B4-BE49-F238E27FC236}">
+                <a16:creationId xmlns:a16="http://schemas.microsoft.com/office/drawing/2014/main" id="{AC9DBAC3-B934-4E50-B085-751EBCBB4600}"/>
+              </a:ext>
+            </a:extLst>
+          </p:cNvPr>
+          <p:cNvCxnSpPr>
+            <a:cxnSpLocks/>
+          </p:cNvCxnSpPr>
+          <p:nvPr/>
+        </p:nvCxnSpPr>
+        <p:spPr>
+          <a:xfrm flipH="1" flipV="1">
+            <a:off x="8120674" y="4003672"/>
+            <a:ext cx="2184657" cy="708572"/>
+          </a:xfrm>
+          <a:prstGeom prst="straightConnector1">
+            <a:avLst/>
+          </a:prstGeom>
+          <a:ln w="28575">
+            <a:solidFill>
+              <a:srgbClr val="FF0000"/>
+            </a:solidFill>
+            <a:tailEnd type="triangle"/>
+          </a:ln>
+        </p:spPr>
+        <p:style>
+          <a:lnRef idx="1">
+            <a:schemeClr val="accent1"/>
+          </a:lnRef>
+          <a:fillRef idx="0">
+            <a:schemeClr val="accent1"/>
+          </a:fillRef>
+          <a:effectRef idx="0">
+            <a:schemeClr val="accent1"/>
+          </a:effectRef>
+          <a:fontRef idx="minor">
+            <a:schemeClr val="tx1"/>
+          </a:fontRef>
+        </p:style>
+      </p:cxnSp>
+      <p:cxnSp>
+        <p:nvCxnSpPr>
+          <p:cNvPr id="18" name="Straight Connector 17">
+            <a:extLst>
+              <a:ext uri="{FF2B5EF4-FFF2-40B4-BE49-F238E27FC236}">
+                <a16:creationId xmlns:a16="http://schemas.microsoft.com/office/drawing/2014/main" id="{94F16454-CD88-483A-B19F-6F2F48894FB7}"/>
+              </a:ext>
+            </a:extLst>
+          </p:cNvPr>
+          <p:cNvCxnSpPr>
+            <a:cxnSpLocks/>
+          </p:cNvCxnSpPr>
+          <p:nvPr/>
+        </p:nvCxnSpPr>
+        <p:spPr>
+          <a:xfrm>
+            <a:off x="6226008" y="1783080"/>
+            <a:ext cx="0" cy="4617720"/>
+          </a:xfrm>
+          <a:prstGeom prst="line">
+            <a:avLst/>
+          </a:prstGeom>
+          <a:ln w="38100">
+            <a:solidFill>
+              <a:srgbClr val="FF0000"/>
+            </a:solidFill>
+            <a:prstDash val="lgDash"/>
+          </a:ln>
+        </p:spPr>
+        <p:style>
+          <a:lnRef idx="1">
+            <a:schemeClr val="accent1"/>
+          </a:lnRef>
+          <a:fillRef idx="0">
+            <a:schemeClr val="accent1"/>
+          </a:fillRef>
+          <a:effectRef idx="0">
+            <a:schemeClr val="accent1"/>
+          </a:effectRef>
+          <a:fontRef idx="minor">
+            <a:schemeClr val="tx1"/>
+          </a:fontRef>
+        </p:style>
+      </p:cxnSp>
+      <p:cxnSp>
+        <p:nvCxnSpPr>
+          <p:cNvPr id="22" name="Straight Connector 21">
+            <a:extLst>
+              <a:ext uri="{FF2B5EF4-FFF2-40B4-BE49-F238E27FC236}">
+                <a16:creationId xmlns:a16="http://schemas.microsoft.com/office/drawing/2014/main" id="{F51F677E-5754-488E-AD65-3FABC46B55B8}"/>
+              </a:ext>
+            </a:extLst>
+          </p:cNvPr>
+          <p:cNvCxnSpPr>
+            <a:cxnSpLocks/>
+          </p:cNvCxnSpPr>
+          <p:nvPr/>
+        </p:nvCxnSpPr>
+        <p:spPr>
+          <a:xfrm>
+            <a:off x="8033587" y="1758389"/>
+            <a:ext cx="0" cy="4642411"/>
+          </a:xfrm>
+          <a:prstGeom prst="line">
+            <a:avLst/>
+          </a:prstGeom>
+          <a:ln w="38100">
+            <a:solidFill>
+              <a:srgbClr val="FF0000"/>
+            </a:solidFill>
+            <a:prstDash val="lgDash"/>
+          </a:ln>
+        </p:spPr>
+        <p:style>
+          <a:lnRef idx="1">
+            <a:schemeClr val="accent1"/>
+          </a:lnRef>
+          <a:fillRef idx="0">
+            <a:schemeClr val="accent1"/>
+          </a:fillRef>
+          <a:effectRef idx="0">
+            <a:schemeClr val="accent1"/>
+          </a:effectRef>
+          <a:fontRef idx="minor">
+            <a:schemeClr val="tx1"/>
+          </a:fontRef>
+        </p:style>
+      </p:cxnSp>
+    </p:spTree>
+    <p:extLst>
+      <p:ext uri="{BB962C8B-B14F-4D97-AF65-F5344CB8AC3E}">
+        <p14:creationId xmlns:p14="http://schemas.microsoft.com/office/powerpoint/2010/main" val="3758335354"/>
+      </p:ext>
+    </p:extLst>
+  </p:cSld>
+  <p:clrMapOvr>
+    <a:masterClrMapping/>
+  </p:clrMapOvr>
+  <p:timing>
+    <p:tnLst>
+      <p:par>
+        <p:cTn id="1" dur="indefinite" restart="never" nodeType="tmRoot">
+          <p:childTnLst>
+            <p:seq concurrent="1" nextAc="seek">
+              <p:cTn id="2" dur="indefinite" nodeType="mainSeq">
+                <p:childTnLst>
+                  <p:par>
+                    <p:cTn id="3" fill="hold">
+                      <p:stCondLst>
+                        <p:cond delay="indefinite"/>
+                      </p:stCondLst>
+                      <p:childTnLst>
+                        <p:par>
+                          <p:cTn id="4" fill="hold">
+                            <p:stCondLst>
+                              <p:cond delay="0"/>
+                            </p:stCondLst>
+                            <p:childTnLst>
+                              <p:par>
+                                <p:cTn id="5" presetID="10" presetClass="entr" presetSubtype="0" fill="hold" nodeType="clickEffect">
+                                  <p:stCondLst>
+                                    <p:cond delay="0"/>
+                                  </p:stCondLst>
+                                  <p:childTnLst>
+                                    <p:set>
+                                      <p:cBhvr>
+                                        <p:cTn id="6" dur="1" fill="hold">
+                                          <p:stCondLst>
+                                            <p:cond delay="0"/>
+                                          </p:stCondLst>
+                                        </p:cTn>
+                                        <p:tgtEl>
+                                          <p:spTgt spid="11"/>
+                                        </p:tgtEl>
+                                        <p:attrNameLst>
+                                          <p:attrName>style.visibility</p:attrName>
+                                        </p:attrNameLst>
+                                      </p:cBhvr>
+                                      <p:to>
+                                        <p:strVal val="visible"/>
+                                      </p:to>
+                                    </p:set>
+                                    <p:animEffect transition="in" filter="fade">
+                                      <p:cBhvr>
+                                        <p:cTn id="7" dur="3000"/>
+                                        <p:tgtEl>
+                                          <p:spTgt spid="11"/>
+                                        </p:tgtEl>
+                                      </p:cBhvr>
+                                    </p:animEffect>
+                                  </p:childTnLst>
+                                </p:cTn>
+                              </p:par>
+                              <p:par>
+                                <p:cTn id="8" presetID="10" presetClass="entr" presetSubtype="0" fill="hold" grpId="0" nodeType="withEffect">
+                                  <p:stCondLst>
+                                    <p:cond delay="0"/>
+                                  </p:stCondLst>
+                                  <p:childTnLst>
+                                    <p:set>
+                                      <p:cBhvr>
+                                        <p:cTn id="9" dur="1" fill="hold">
+                                          <p:stCondLst>
+                                            <p:cond delay="0"/>
+                                          </p:stCondLst>
+                                        </p:cTn>
+                                        <p:tgtEl>
+                                          <p:spTgt spid="9"/>
+                                        </p:tgtEl>
+                                        <p:attrNameLst>
+                                          <p:attrName>style.visibility</p:attrName>
+                                        </p:attrNameLst>
+                                      </p:cBhvr>
+                                      <p:to>
+                                        <p:strVal val="visible"/>
+                                      </p:to>
+                                    </p:set>
+                                    <p:animEffect transition="in" filter="fade">
+                                      <p:cBhvr>
+                                        <p:cTn id="10" dur="3000"/>
+                                        <p:tgtEl>
+                                          <p:spTgt spid="9"/>
+                                        </p:tgtEl>
+                                      </p:cBhvr>
+                                    </p:animEffect>
+                                  </p:childTnLst>
+                                </p:cTn>
+                              </p:par>
+                              <p:par>
+                                <p:cTn id="11" presetID="10" presetClass="entr" presetSubtype="0" fill="hold" grpId="0" nodeType="withEffect">
+                                  <p:stCondLst>
+                                    <p:cond delay="0"/>
+                                  </p:stCondLst>
+                                  <p:childTnLst>
+                                    <p:set>
+                                      <p:cBhvr>
+                                        <p:cTn id="12" dur="1" fill="hold">
+                                          <p:stCondLst>
+                                            <p:cond delay="0"/>
+                                          </p:stCondLst>
+                                        </p:cTn>
+                                        <p:tgtEl>
+                                          <p:spTgt spid="8"/>
+                                        </p:tgtEl>
+                                        <p:attrNameLst>
+                                          <p:attrName>style.visibility</p:attrName>
+                                        </p:attrNameLst>
+                                      </p:cBhvr>
+                                      <p:to>
+                                        <p:strVal val="visible"/>
+                                      </p:to>
+                                    </p:set>
+                                    <p:animEffect transition="in" filter="fade">
+                                      <p:cBhvr>
+                                        <p:cTn id="13" dur="3000"/>
+                                        <p:tgtEl>
+                                          <p:spTgt spid="8"/>
+                                        </p:tgtEl>
+                                      </p:cBhvr>
+                                    </p:animEffect>
+                                  </p:childTnLst>
+                                </p:cTn>
+                              </p:par>
+                              <p:par>
+                                <p:cTn id="14" presetID="10" presetClass="entr" presetSubtype="0" fill="hold" nodeType="withEffect">
+                                  <p:stCondLst>
+                                    <p:cond delay="0"/>
+                                  </p:stCondLst>
+                                  <p:childTnLst>
+                                    <p:set>
+                                      <p:cBhvr>
+                                        <p:cTn id="15" dur="1" fill="hold">
+                                          <p:stCondLst>
+                                            <p:cond delay="0"/>
+                                          </p:stCondLst>
+                                        </p:cTn>
+                                        <p:tgtEl>
+                                          <p:spTgt spid="13"/>
+                                        </p:tgtEl>
+                                        <p:attrNameLst>
+                                          <p:attrName>style.visibility</p:attrName>
+                                        </p:attrNameLst>
+                                      </p:cBhvr>
+                                      <p:to>
+                                        <p:strVal val="visible"/>
+                                      </p:to>
+                                    </p:set>
+                                    <p:animEffect transition="in" filter="fade">
+                                      <p:cBhvr>
+                                        <p:cTn id="16" dur="3000"/>
+                                        <p:tgtEl>
+                                          <p:spTgt spid="13"/>
+                                        </p:tgtEl>
+                                      </p:cBhvr>
+                                    </p:animEffect>
+                                  </p:childTnLst>
+                                </p:cTn>
+                              </p:par>
+                              <p:par>
+                                <p:cTn id="17" presetID="10" presetClass="entr" presetSubtype="0" fill="hold" nodeType="withEffect">
+                                  <p:stCondLst>
+                                    <p:cond delay="0"/>
+                                  </p:stCondLst>
+                                  <p:childTnLst>
+                                    <p:set>
+                                      <p:cBhvr>
+                                        <p:cTn id="18" dur="1" fill="hold">
+                                          <p:stCondLst>
+                                            <p:cond delay="0"/>
+                                          </p:stCondLst>
+                                        </p:cTn>
+                                        <p:tgtEl>
+                                          <p:spTgt spid="22"/>
+                                        </p:tgtEl>
+                                        <p:attrNameLst>
+                                          <p:attrName>style.visibility</p:attrName>
+                                        </p:attrNameLst>
+                                      </p:cBhvr>
+                                      <p:to>
+                                        <p:strVal val="visible"/>
+                                      </p:to>
+                                    </p:set>
+                                    <p:animEffect transition="in" filter="fade">
+                                      <p:cBhvr>
+                                        <p:cTn id="19" dur="3000"/>
+                                        <p:tgtEl>
+                                          <p:spTgt spid="22"/>
+                                        </p:tgtEl>
+                                      </p:cBhvr>
+                                    </p:animEffect>
+                                  </p:childTnLst>
+                                </p:cTn>
+                              </p:par>
+                              <p:par>
+                                <p:cTn id="20" presetID="10" presetClass="entr" presetSubtype="0" fill="hold" nodeType="withEffect">
+                                  <p:stCondLst>
+                                    <p:cond delay="0"/>
+                                  </p:stCondLst>
+                                  <p:childTnLst>
+                                    <p:set>
+                                      <p:cBhvr>
+                                        <p:cTn id="21" dur="1" fill="hold">
+                                          <p:stCondLst>
+                                            <p:cond delay="0"/>
+                                          </p:stCondLst>
+                                        </p:cTn>
+                                        <p:tgtEl>
+                                          <p:spTgt spid="18"/>
+                                        </p:tgtEl>
+                                        <p:attrNameLst>
+                                          <p:attrName>style.visibility</p:attrName>
+                                        </p:attrNameLst>
+                                      </p:cBhvr>
+                                      <p:to>
+                                        <p:strVal val="visible"/>
+                                      </p:to>
+                                    </p:set>
+                                    <p:animEffect transition="in" filter="fade">
+                                      <p:cBhvr>
+                                        <p:cTn id="22" dur="3000"/>
+                                        <p:tgtEl>
+                                          <p:spTgt spid="18"/>
+                                        </p:tgtEl>
+                                      </p:cBhvr>
+                                    </p:animEffect>
+                                  </p:childTnLst>
+                                </p:cTn>
+                              </p:par>
+                            </p:childTnLst>
+                          </p:cTn>
+                        </p:par>
+                      </p:childTnLst>
+                    </p:cTn>
+                  </p:par>
+                </p:childTnLst>
+              </p:cTn>
+              <p:prevCondLst>
+                <p:cond evt="onPrev" delay="0">
+                  <p:tgtEl>
+                    <p:sldTgt/>
+                  </p:tgtEl>
+                </p:cond>
+              </p:prevCondLst>
+              <p:nextCondLst>
+                <p:cond evt="onNext" delay="0">
+                  <p:tgtEl>
+                    <p:sldTgt/>
+                  </p:tgtEl>
+                </p:cond>
+              </p:nextCondLst>
+            </p:seq>
+          </p:childTnLst>
+        </p:cTn>
+      </p:par>
+    </p:tnLst>
+    <p:bldLst>
+      <p:bldP spid="8" grpId="0"/>
+      <p:bldP spid="9" grpId="0"/>
+    </p:bldLst>
+  </p:timing>
+</p:sld>
+</file>
+
+<file path=ppt/slides/slide12.xml><?xml version="1.0" encoding="utf-8"?>
+<p:sld xmlns:a="http://schemas.openxmlformats.org/drawingml/2006/main" xmlns:r="http://schemas.openxmlformats.org/officeDocument/2006/relationships" xmlns:p="http://schemas.openxmlformats.org/presentationml/2006/main">
+  <p:cSld>
+    <p:spTree>
+      <p:nvGrpSpPr>
+        <p:cNvPr id="1" name=""/>
+        <p:cNvGrpSpPr/>
+        <p:nvPr/>
+      </p:nvGrpSpPr>
+      <p:grpSpPr>
+        <a:xfrm>
+          <a:off x="0" y="0"/>
+          <a:ext cx="0" cy="0"/>
+          <a:chOff x="0" y="0"/>
+          <a:chExt cx="0" cy="0"/>
+        </a:xfrm>
+      </p:grpSpPr>
+      <p:sp>
+        <p:nvSpPr>
+          <p:cNvPr id="2" name="Title 1">
+            <a:extLst>
+              <a:ext uri="{FF2B5EF4-FFF2-40B4-BE49-F238E27FC236}">
+                <a16:creationId xmlns:a16="http://schemas.microsoft.com/office/drawing/2014/main" id="{59212019-2788-4552-8BFF-C09BD26B605E}"/>
+              </a:ext>
+            </a:extLst>
+          </p:cNvPr>
+          <p:cNvSpPr>
+            <a:spLocks noGrp="1"/>
+          </p:cNvSpPr>
+          <p:nvPr>
+            <p:ph type="title"/>
+          </p:nvPr>
+        </p:nvSpPr>
+        <p:spPr>
+          <a:xfrm>
+            <a:off x="838200" y="365126"/>
+            <a:ext cx="10515600" cy="567030"/>
+          </a:xfrm>
+        </p:spPr>
+        <p:txBody>
+          <a:bodyPr>
+            <a:normAutofit/>
+          </a:bodyPr>
+          <a:lstStyle/>
+          <a:p>
+            <a:pPr algn="ctr"/>
+            <a:r>
+              <a:rPr lang="en-US" sz="3200" dirty="0"/>
+              <a:t>This calibration is only for current set up</a:t>
+            </a:r>
+          </a:p>
+        </p:txBody>
+      </p:sp>
+      <p:sp>
+        <p:nvSpPr>
+          <p:cNvPr id="3" name="Content Placeholder 2">
+            <a:extLst>
+              <a:ext uri="{FF2B5EF4-FFF2-40B4-BE49-F238E27FC236}">
+                <a16:creationId xmlns:a16="http://schemas.microsoft.com/office/drawing/2014/main" id="{3C8B4D76-9DE7-4C7F-9825-F6ABD6918061}"/>
+              </a:ext>
+            </a:extLst>
+          </p:cNvPr>
+          <p:cNvSpPr>
+            <a:spLocks noGrp="1"/>
+          </p:cNvSpPr>
+          <p:nvPr>
+            <p:ph idx="1"/>
+          </p:nvPr>
+        </p:nvSpPr>
+        <p:spPr>
+          <a:xfrm>
+            <a:off x="838200" y="1071023"/>
+            <a:ext cx="10515600" cy="4351338"/>
+          </a:xfrm>
+        </p:spPr>
+        <p:txBody>
+          <a:bodyPr/>
+          <a:lstStyle/>
+          <a:p>
+            <a:r>
+              <a:rPr lang="en-US" sz="2000" dirty="0"/>
+              <a:t>After assembling every component to the enclosure, we will have to calibrate the system once again (same as this).</a:t>
+            </a:r>
+          </a:p>
+          <a:p>
+            <a:pPr marL="0" indent="0">
+              <a:buNone/>
+            </a:pPr>
+            <a:endParaRPr lang="en-US" dirty="0"/>
+          </a:p>
+        </p:txBody>
+      </p:sp>
+    </p:spTree>
+    <p:extLst>
+      <p:ext uri="{BB962C8B-B14F-4D97-AF65-F5344CB8AC3E}">
+        <p14:creationId xmlns:p14="http://schemas.microsoft.com/office/powerpoint/2010/main" val="3230505574"/>
+      </p:ext>
+    </p:extLst>
+  </p:cSld>
+  <p:clrMapOvr>
+    <a:masterClrMapping/>
+  </p:clrMapOvr>
+</p:sld>
+</file>
+
+<file path=ppt/slides/slide13.xml><?xml version="1.0" encoding="utf-8"?>
+<p:sld xmlns:a="http://schemas.openxmlformats.org/drawingml/2006/main" xmlns:r="http://schemas.openxmlformats.org/officeDocument/2006/relationships" xmlns:p="http://schemas.openxmlformats.org/presentationml/2006/main">
+  <p:cSld>
+    <p:spTree>
+      <p:nvGrpSpPr>
+        <p:cNvPr id="1" name=""/>
+        <p:cNvGrpSpPr/>
+        <p:nvPr/>
+      </p:nvGrpSpPr>
+      <p:grpSpPr>
+        <a:xfrm>
+          <a:off x="0" y="0"/>
+          <a:ext cx="0" cy="0"/>
+          <a:chOff x="0" y="0"/>
+          <a:chExt cx="0" cy="0"/>
+        </a:xfrm>
+      </p:grpSpPr>
+      <p:sp>
+        <p:nvSpPr>
+          <p:cNvPr id="2" name="Title 1">
+            <a:extLst>
+              <a:ext uri="{FF2B5EF4-FFF2-40B4-BE49-F238E27FC236}">
+                <a16:creationId xmlns:a16="http://schemas.microsoft.com/office/drawing/2014/main" id="{E4375DBD-01ED-4834-BE04-EC4F1EBAA449}"/>
+              </a:ext>
+            </a:extLst>
+          </p:cNvPr>
+          <p:cNvSpPr>
+            <a:spLocks noGrp="1"/>
+          </p:cNvSpPr>
+          <p:nvPr>
+            <p:ph type="title"/>
+          </p:nvPr>
+        </p:nvSpPr>
+        <p:spPr/>
+        <p:txBody>
+          <a:bodyPr/>
+          <a:lstStyle/>
+          <a:p>
+            <a:pPr algn="ctr"/>
+            <a:r>
+              <a:rPr lang="en-US" dirty="0"/>
+              <a:t>Keypad and connections</a:t>
+            </a:r>
+          </a:p>
+        </p:txBody>
+      </p:sp>
+      <p:sp>
+        <p:nvSpPr>
+          <p:cNvPr id="3" name="Content Placeholder 2">
+            <a:extLst>
+              <a:ext uri="{FF2B5EF4-FFF2-40B4-BE49-F238E27FC236}">
+                <a16:creationId xmlns:a16="http://schemas.microsoft.com/office/drawing/2014/main" id="{44E0E11D-2F20-4098-A8BF-2CA1E3ED8609}"/>
+              </a:ext>
+            </a:extLst>
+          </p:cNvPr>
+          <p:cNvSpPr>
+            <a:spLocks noGrp="1"/>
+          </p:cNvSpPr>
+          <p:nvPr>
+            <p:ph idx="1"/>
+          </p:nvPr>
+        </p:nvSpPr>
+        <p:spPr/>
+        <p:txBody>
+          <a:bodyPr/>
+          <a:lstStyle/>
+          <a:p>
+            <a:endParaRPr lang="en-US" dirty="0"/>
+          </a:p>
+        </p:txBody>
+      </p:sp>
+    </p:spTree>
+    <p:extLst>
+      <p:ext uri="{BB962C8B-B14F-4D97-AF65-F5344CB8AC3E}">
+        <p14:creationId xmlns:p14="http://schemas.microsoft.com/office/powerpoint/2010/main" val="1335415783"/>
+      </p:ext>
+    </p:extLst>
+  </p:cSld>
+  <p:clrMapOvr>
+    <a:masterClrMapping/>
+  </p:clrMapOvr>
+</p:sld>
+</file>
+
+<file path=ppt/slides/slide14.xml><?xml version="1.0" encoding="utf-8"?>
+<p:sld xmlns:a="http://schemas.openxmlformats.org/drawingml/2006/main" xmlns:r="http://schemas.openxmlformats.org/officeDocument/2006/relationships" xmlns:p="http://schemas.openxmlformats.org/presentationml/2006/main">
+  <p:cSld>
+    <p:spTree>
+      <p:nvGrpSpPr>
+        <p:cNvPr id="1" name=""/>
+        <p:cNvGrpSpPr/>
+        <p:nvPr/>
+      </p:nvGrpSpPr>
+      <p:grpSpPr>
+        <a:xfrm>
+          <a:off x="0" y="0"/>
+          <a:ext cx="0" cy="0"/>
+          <a:chOff x="0" y="0"/>
+          <a:chExt cx="0" cy="0"/>
+        </a:xfrm>
+      </p:grpSpPr>
+      <p:sp>
+        <p:nvSpPr>
+          <p:cNvPr id="2" name="Title 1">
+            <a:extLst>
+              <a:ext uri="{FF2B5EF4-FFF2-40B4-BE49-F238E27FC236}">
+                <a16:creationId xmlns:a16="http://schemas.microsoft.com/office/drawing/2014/main" id="{D810EB7C-7959-4A01-8F69-4398E107BEFA}"/>
+              </a:ext>
+            </a:extLst>
+          </p:cNvPr>
+          <p:cNvSpPr>
+            <a:spLocks noGrp="1"/>
+          </p:cNvSpPr>
+          <p:nvPr>
+            <p:ph type="title"/>
+          </p:nvPr>
+        </p:nvSpPr>
+        <p:spPr/>
+        <p:txBody>
+          <a:bodyPr/>
+          <a:lstStyle/>
+          <a:p>
+            <a:pPr algn="ctr"/>
+            <a:r>
+              <a:rPr lang="en-US" dirty="0"/>
+              <a:t>Digital display and connections</a:t>
+            </a:r>
+          </a:p>
+        </p:txBody>
+      </p:sp>
+      <p:sp>
+        <p:nvSpPr>
+          <p:cNvPr id="3" name="Content Placeholder 2">
+            <a:extLst>
+              <a:ext uri="{FF2B5EF4-FFF2-40B4-BE49-F238E27FC236}">
+                <a16:creationId xmlns:a16="http://schemas.microsoft.com/office/drawing/2014/main" id="{7CD809B7-5443-4D77-B705-3CF91F97D536}"/>
+              </a:ext>
+            </a:extLst>
+          </p:cNvPr>
+          <p:cNvSpPr>
+            <a:spLocks noGrp="1"/>
+          </p:cNvSpPr>
+          <p:nvPr>
+            <p:ph idx="1"/>
+          </p:nvPr>
+        </p:nvSpPr>
+        <p:spPr/>
+        <p:txBody>
+          <a:bodyPr/>
+          <a:lstStyle/>
+          <a:p>
+            <a:endParaRPr lang="en-US" dirty="0"/>
+          </a:p>
+        </p:txBody>
+      </p:sp>
+    </p:spTree>
+    <p:extLst>
+      <p:ext uri="{BB962C8B-B14F-4D97-AF65-F5344CB8AC3E}">
+        <p14:creationId xmlns:p14="http://schemas.microsoft.com/office/powerpoint/2010/main" val="3345635007"/>
+      </p:ext>
+    </p:extLst>
+  </p:cSld>
+  <p:clrMapOvr>
+    <a:masterClrMapping/>
+  </p:clrMapOvr>
+</p:sld>
+</file>
+
+<file path=ppt/slides/slide15.xml><?xml version="1.0" encoding="utf-8"?>
+<p:sld xmlns:a="http://schemas.openxmlformats.org/drawingml/2006/main" xmlns:r="http://schemas.openxmlformats.org/officeDocument/2006/relationships" xmlns:p="http://schemas.openxmlformats.org/presentationml/2006/main">
+  <p:cSld>
+    <p:spTree>
+      <p:nvGrpSpPr>
+        <p:cNvPr id="1" name=""/>
+        <p:cNvGrpSpPr/>
+        <p:nvPr/>
+      </p:nvGrpSpPr>
+      <p:grpSpPr>
+        <a:xfrm>
+          <a:off x="0" y="0"/>
+          <a:ext cx="0" cy="0"/>
+          <a:chOff x="0" y="0"/>
+          <a:chExt cx="0" cy="0"/>
+        </a:xfrm>
+      </p:grpSpPr>
+      <p:sp>
+        <p:nvSpPr>
+          <p:cNvPr id="2" name="Title 1">
+            <a:extLst>
+              <a:ext uri="{FF2B5EF4-FFF2-40B4-BE49-F238E27FC236}">
+                <a16:creationId xmlns:a16="http://schemas.microsoft.com/office/drawing/2014/main" id="{12172B58-F854-40EC-BFC0-7A8871EE7E43}"/>
+              </a:ext>
+            </a:extLst>
+          </p:cNvPr>
+          <p:cNvSpPr>
+            <a:spLocks noGrp="1"/>
+          </p:cNvSpPr>
+          <p:nvPr>
+            <p:ph type="title"/>
+          </p:nvPr>
+        </p:nvSpPr>
+        <p:spPr/>
+        <p:txBody>
+          <a:bodyPr/>
+          <a:lstStyle/>
+          <a:p>
+            <a:pPr algn="ctr"/>
+            <a:r>
+              <a:rPr lang="en-US" dirty="0"/>
+              <a:t>Output LED and managing with 1 PWM</a:t>
+            </a:r>
+          </a:p>
+        </p:txBody>
+      </p:sp>
+      <p:sp>
+        <p:nvSpPr>
+          <p:cNvPr id="3" name="Content Placeholder 2">
+            <a:extLst>
+              <a:ext uri="{FF2B5EF4-FFF2-40B4-BE49-F238E27FC236}">
+                <a16:creationId xmlns:a16="http://schemas.microsoft.com/office/drawing/2014/main" id="{21F02FED-3C33-4AE3-8985-4E22FA95E1B3}"/>
+              </a:ext>
+            </a:extLst>
+          </p:cNvPr>
+          <p:cNvSpPr>
+            <a:spLocks noGrp="1"/>
+          </p:cNvSpPr>
+          <p:nvPr>
+            <p:ph idx="1"/>
+          </p:nvPr>
+        </p:nvSpPr>
+        <p:spPr/>
+        <p:txBody>
+          <a:bodyPr/>
+          <a:lstStyle/>
+          <a:p>
+            <a:endParaRPr lang="en-US" dirty="0"/>
+          </a:p>
+        </p:txBody>
+      </p:sp>
+    </p:spTree>
+    <p:extLst>
+      <p:ext uri="{BB962C8B-B14F-4D97-AF65-F5344CB8AC3E}">
+        <p14:creationId xmlns:p14="http://schemas.microsoft.com/office/powerpoint/2010/main" val="231301543"/>
+      </p:ext>
+    </p:extLst>
+  </p:cSld>
+  <p:clrMapOvr>
+    <a:masterClrMapping/>
+  </p:clrMapOvr>
+</p:sld>
+</file>
+
 <file path=ppt/slides/slide2.xml><?xml version="1.0" encoding="utf-8"?>
 <p:sld xmlns:a="http://schemas.openxmlformats.org/drawingml/2006/main" xmlns:r="http://schemas.openxmlformats.org/officeDocument/2006/relationships" xmlns:p="http://schemas.openxmlformats.org/presentationml/2006/main">
   <p:cSld>
@@ -5384,7 +8396,147 @@
           <p:cNvPr id="2" name="Title 1">
             <a:extLst>
               <a:ext uri="{FF2B5EF4-FFF2-40B4-BE49-F238E27FC236}">
-                <a16:creationId xmlns:a16="http://schemas.microsoft.com/office/drawing/2014/main" id="{2EACDCC9-02BE-474C-9959-A7FEF1CDDC48}"/>
+                <a16:creationId xmlns:a16="http://schemas.microsoft.com/office/drawing/2014/main" id="{45E597E8-D58C-47FD-A53B-2654BD5EC774}"/>
+              </a:ext>
+            </a:extLst>
+          </p:cNvPr>
+          <p:cNvSpPr>
+            <a:spLocks noGrp="1"/>
+          </p:cNvSpPr>
+          <p:nvPr>
+            <p:ph type="ctrTitle"/>
+          </p:nvPr>
+        </p:nvSpPr>
+        <p:spPr>
+          <a:xfrm>
+            <a:off x="1524000" y="390525"/>
+            <a:ext cx="9144000" cy="2387600"/>
+          </a:xfrm>
+        </p:spPr>
+        <p:txBody>
+          <a:bodyPr>
+            <a:normAutofit/>
+          </a:bodyPr>
+          <a:lstStyle/>
+          <a:p>
+            <a:r>
+              <a:rPr lang="en-US" sz="4000" b="1" dirty="0">
+                <a:solidFill>
+                  <a:schemeClr val="tx2">
+                    <a:lumMod val="50000"/>
+                  </a:schemeClr>
+                </a:solidFill>
+                <a:latin typeface="Helvetica" panose="020B0604020202020204" pitchFamily="34" charset="0"/>
+                <a:cs typeface="Helvetica" panose="020B0604020202020204" pitchFamily="34" charset="0"/>
+              </a:rPr>
+              <a:t>RGB COLOR SENSOR PROJECT</a:t>
+            </a:r>
+            <a:br>
+              <a:rPr lang="en-US" b="1" dirty="0">
+                <a:solidFill>
+                  <a:schemeClr val="accent1">
+                    <a:lumMod val="75000"/>
+                  </a:schemeClr>
+                </a:solidFill>
+                <a:latin typeface="Helvetica" panose="020B0604020202020204" pitchFamily="34" charset="0"/>
+                <a:cs typeface="Helvetica" panose="020B0604020202020204" pitchFamily="34" charset="0"/>
+              </a:rPr>
+            </a:br>
+            <a:r>
+              <a:rPr lang="en-US" sz="3600" b="1" dirty="0">
+                <a:solidFill>
+                  <a:schemeClr val="tx2">
+                    <a:lumMod val="75000"/>
+                  </a:schemeClr>
+                </a:solidFill>
+                <a:latin typeface="Helvetica" panose="020B0604020202020204" pitchFamily="34" charset="0"/>
+                <a:cs typeface="Helvetica" panose="020B0604020202020204" pitchFamily="34" charset="0"/>
+              </a:rPr>
+              <a:t>Team Sagittarius </a:t>
+            </a:r>
+            <a:endParaRPr lang="en-US" sz="4400" b="1" dirty="0">
+              <a:solidFill>
+                <a:schemeClr val="tx2">
+                  <a:lumMod val="75000"/>
+                </a:schemeClr>
+              </a:solidFill>
+              <a:latin typeface="Helvetica" panose="020B0604020202020204" pitchFamily="34" charset="0"/>
+              <a:cs typeface="Helvetica" panose="020B0604020202020204" pitchFamily="34" charset="0"/>
+            </a:endParaRPr>
+          </a:p>
+        </p:txBody>
+      </p:sp>
+      <p:sp>
+        <p:nvSpPr>
+          <p:cNvPr id="3" name="Subtitle 2">
+            <a:extLst>
+              <a:ext uri="{FF2B5EF4-FFF2-40B4-BE49-F238E27FC236}">
+                <a16:creationId xmlns:a16="http://schemas.microsoft.com/office/drawing/2014/main" id="{CF2871BA-69E4-4C7A-A1CB-35C50615E4AD}"/>
+              </a:ext>
+            </a:extLst>
+          </p:cNvPr>
+          <p:cNvSpPr>
+            <a:spLocks noGrp="1"/>
+          </p:cNvSpPr>
+          <p:nvPr>
+            <p:ph type="subTitle" idx="1"/>
+          </p:nvPr>
+        </p:nvSpPr>
+        <p:spPr>
+          <a:xfrm>
+            <a:off x="1524000" y="4079875"/>
+            <a:ext cx="9144000" cy="1655762"/>
+          </a:xfrm>
+        </p:spPr>
+        <p:txBody>
+          <a:bodyPr>
+            <a:normAutofit/>
+          </a:bodyPr>
+          <a:lstStyle/>
+          <a:p>
+            <a:r>
+              <a:rPr lang="en-US" sz="3200" dirty="0"/>
+              <a:t>Progress and summary – Week 04</a:t>
+            </a:r>
+          </a:p>
+        </p:txBody>
+      </p:sp>
+    </p:spTree>
+    <p:extLst>
+      <p:ext uri="{BB962C8B-B14F-4D97-AF65-F5344CB8AC3E}">
+        <p14:creationId xmlns:p14="http://schemas.microsoft.com/office/powerpoint/2010/main" val="966933099"/>
+      </p:ext>
+    </p:extLst>
+  </p:cSld>
+  <p:clrMapOvr>
+    <a:masterClrMapping/>
+  </p:clrMapOvr>
+</p:sld>
+</file>
+
+<file path=ppt/slides/slide9.xml><?xml version="1.0" encoding="utf-8"?>
+<p:sld xmlns:a="http://schemas.openxmlformats.org/drawingml/2006/main" xmlns:r="http://schemas.openxmlformats.org/officeDocument/2006/relationships" xmlns:p="http://schemas.openxmlformats.org/presentationml/2006/main">
+  <p:cSld>
+    <p:spTree>
+      <p:nvGrpSpPr>
+        <p:cNvPr id="1" name=""/>
+        <p:cNvGrpSpPr/>
+        <p:nvPr/>
+      </p:nvGrpSpPr>
+      <p:grpSpPr>
+        <a:xfrm>
+          <a:off x="0" y="0"/>
+          <a:ext cx="0" cy="0"/>
+          <a:chOff x="0" y="0"/>
+          <a:chExt cx="0" cy="0"/>
+        </a:xfrm>
+      </p:grpSpPr>
+      <p:sp>
+        <p:nvSpPr>
+          <p:cNvPr id="2" name="Title 1">
+            <a:extLst>
+              <a:ext uri="{FF2B5EF4-FFF2-40B4-BE49-F238E27FC236}">
+                <a16:creationId xmlns:a16="http://schemas.microsoft.com/office/drawing/2014/main" id="{087AF734-8C00-4C24-96AB-E9F877F44699}"/>
               </a:ext>
             </a:extLst>
           </p:cNvPr>
@@ -5397,7 +8549,7 @@
         </p:nvSpPr>
         <p:spPr>
           <a:xfrm>
-            <a:off x="838200" y="2865729"/>
+            <a:off x="825252" y="18255"/>
             <a:ext cx="10515600" cy="1325563"/>
           </a:xfrm>
         </p:spPr>
@@ -5408,21 +8560,475 @@
             <a:pPr algn="ctr"/>
             <a:r>
               <a:rPr lang="en-US" dirty="0"/>
-              <a:t>Thank You!</a:t>
-            </a:r>
-          </a:p>
-        </p:txBody>
-      </p:sp>
+              <a:t>Calibration of the Sensor</a:t>
+            </a:r>
+          </a:p>
+        </p:txBody>
+      </p:sp>
+      <p:sp>
+        <p:nvSpPr>
+          <p:cNvPr id="3" name="Content Placeholder 2">
+            <a:extLst>
+              <a:ext uri="{FF2B5EF4-FFF2-40B4-BE49-F238E27FC236}">
+                <a16:creationId xmlns:a16="http://schemas.microsoft.com/office/drawing/2014/main" id="{3D82ADD9-2C4B-4937-9FE4-54B201EAA9E5}"/>
+              </a:ext>
+            </a:extLst>
+          </p:cNvPr>
+          <p:cNvSpPr>
+            <a:spLocks noGrp="1"/>
+          </p:cNvSpPr>
+          <p:nvPr>
+            <p:ph idx="1"/>
+          </p:nvPr>
+        </p:nvSpPr>
+        <p:spPr>
+          <a:xfrm>
+            <a:off x="207884" y="1343818"/>
+            <a:ext cx="11412985" cy="4351338"/>
+          </a:xfrm>
+        </p:spPr>
+        <p:txBody>
+          <a:bodyPr/>
+          <a:lstStyle/>
+          <a:p>
+            <a:r>
+              <a:rPr lang="en-US" sz="2000" dirty="0"/>
+              <a:t>Calibration was essential because each of the filters did not response to white light equally.</a:t>
+            </a:r>
+          </a:p>
+          <a:p>
+            <a:pPr marL="0" indent="0">
+              <a:buNone/>
+            </a:pPr>
+            <a:r>
+              <a:rPr lang="en-US" sz="2000" dirty="0"/>
+              <a:t>      </a:t>
+            </a:r>
+            <a:r>
+              <a:rPr lang="en-US" sz="2000" dirty="0">
+                <a:solidFill>
+                  <a:schemeClr val="accent1">
+                    <a:lumMod val="75000"/>
+                  </a:schemeClr>
+                </a:solidFill>
+              </a:rPr>
+              <a:t>Therefore, non-linear regression methods were used to transform RGB values to a common ground.</a:t>
+            </a:r>
+          </a:p>
+          <a:p>
+            <a:endParaRPr lang="en-US" sz="2400" dirty="0"/>
+          </a:p>
+          <a:p>
+            <a:endParaRPr lang="en-US" dirty="0"/>
+          </a:p>
+        </p:txBody>
+      </p:sp>
+      <p:pic>
+        <p:nvPicPr>
+          <p:cNvPr id="5" name="Picture 4" descr="Chart, line chart, histogram&#10;&#10;Description automatically generated">
+            <a:extLst>
+              <a:ext uri="{FF2B5EF4-FFF2-40B4-BE49-F238E27FC236}">
+                <a16:creationId xmlns:a16="http://schemas.microsoft.com/office/drawing/2014/main" id="{B62CF67E-D21B-4234-A1D2-58E0F649CEBB}"/>
+              </a:ext>
+            </a:extLst>
+          </p:cNvPr>
+          <p:cNvPicPr>
+            <a:picLocks noChangeAspect="1"/>
+          </p:cNvPicPr>
+          <p:nvPr/>
+        </p:nvPicPr>
+        <p:blipFill rotWithShape="1">
+          <a:blip r:embed="rId2">
+            <a:extLst>
+              <a:ext uri="{28A0092B-C50C-407E-A947-70E740481C1C}">
+                <a14:useLocalDpi xmlns:a14="http://schemas.microsoft.com/office/drawing/2010/main" val="0"/>
+              </a:ext>
+            </a:extLst>
+          </a:blip>
+          <a:srcRect l="-462" t="734" r="462" b="50542"/>
+          <a:stretch/>
+        </p:blipFill>
+        <p:spPr>
+          <a:xfrm>
+            <a:off x="392545" y="3083374"/>
+            <a:ext cx="5318644" cy="3534929"/>
+          </a:xfrm>
+          <a:prstGeom prst="rect">
+            <a:avLst/>
+          </a:prstGeom>
+        </p:spPr>
+      </p:pic>
+      <p:pic>
+        <p:nvPicPr>
+          <p:cNvPr id="7" name="Picture 6" descr="Chart, line chart, histogram&#10;&#10;Description automatically generated">
+            <a:extLst>
+              <a:ext uri="{FF2B5EF4-FFF2-40B4-BE49-F238E27FC236}">
+                <a16:creationId xmlns:a16="http://schemas.microsoft.com/office/drawing/2014/main" id="{BD0DF4D6-74F3-4F61-BF4F-FC6FE5699000}"/>
+              </a:ext>
+            </a:extLst>
+          </p:cNvPr>
+          <p:cNvPicPr>
+            <a:picLocks noChangeAspect="1"/>
+          </p:cNvPicPr>
+          <p:nvPr/>
+        </p:nvPicPr>
+        <p:blipFill rotWithShape="1">
+          <a:blip r:embed="rId2">
+            <a:extLst>
+              <a:ext uri="{28A0092B-C50C-407E-A947-70E740481C1C}">
+                <a14:useLocalDpi xmlns:a14="http://schemas.microsoft.com/office/drawing/2010/main" val="0"/>
+              </a:ext>
+            </a:extLst>
+          </a:blip>
+          <a:srcRect t="50000"/>
+          <a:stretch/>
+        </p:blipFill>
+        <p:spPr>
+          <a:xfrm>
+            <a:off x="6060489" y="3008328"/>
+            <a:ext cx="5394036" cy="3609975"/>
+          </a:xfrm>
+          <a:prstGeom prst="rect">
+            <a:avLst/>
+          </a:prstGeom>
+        </p:spPr>
+      </p:pic>
+      <p:sp>
+        <p:nvSpPr>
+          <p:cNvPr id="8" name="TextBox 7">
+            <a:extLst>
+              <a:ext uri="{FF2B5EF4-FFF2-40B4-BE49-F238E27FC236}">
+                <a16:creationId xmlns:a16="http://schemas.microsoft.com/office/drawing/2014/main" id="{EA967195-97F1-4C4C-94BB-7F032CE35969}"/>
+              </a:ext>
+            </a:extLst>
+          </p:cNvPr>
+          <p:cNvSpPr txBox="1"/>
+          <p:nvPr/>
+        </p:nvSpPr>
+        <p:spPr>
+          <a:xfrm>
+            <a:off x="2006981" y="2475624"/>
+            <a:ext cx="8481874" cy="369332"/>
+          </a:xfrm>
+          <a:prstGeom prst="rect">
+            <a:avLst/>
+          </a:prstGeom>
+          <a:noFill/>
+        </p:spPr>
+        <p:txBody>
+          <a:bodyPr wrap="none" rtlCol="0">
+            <a:spAutoFit/>
+          </a:bodyPr>
+          <a:lstStyle/>
+          <a:p>
+            <a:r>
+              <a:rPr lang="en-US" b="1" dirty="0"/>
+              <a:t>For white light  -  Changing the distance between sensor and object (hence the ripples) </a:t>
+            </a:r>
+          </a:p>
+        </p:txBody>
+      </p:sp>
+      <p:sp>
+        <p:nvSpPr>
+          <p:cNvPr id="12" name="TextBox 11">
+            <a:extLst>
+              <a:ext uri="{FF2B5EF4-FFF2-40B4-BE49-F238E27FC236}">
+                <a16:creationId xmlns:a16="http://schemas.microsoft.com/office/drawing/2014/main" id="{05530F17-718D-4528-A4EB-A78A5503BEDA}"/>
+              </a:ext>
+            </a:extLst>
+          </p:cNvPr>
+          <p:cNvSpPr txBox="1"/>
+          <p:nvPr/>
+        </p:nvSpPr>
+        <p:spPr>
+          <a:xfrm>
+            <a:off x="207884" y="2372644"/>
+            <a:ext cx="3175248" cy="369332"/>
+          </a:xfrm>
+          <a:prstGeom prst="rect">
+            <a:avLst/>
+          </a:prstGeom>
+          <a:noFill/>
+        </p:spPr>
+        <p:txBody>
+          <a:bodyPr wrap="square" rtlCol="0">
+            <a:spAutoFit/>
+          </a:bodyPr>
+          <a:lstStyle/>
+          <a:p>
+            <a:r>
+              <a:rPr lang="en-US" b="1" dirty="0">
+                <a:solidFill>
+                  <a:srgbClr val="FF0000"/>
+                </a:solidFill>
+              </a:rPr>
+              <a:t>Hyperactive RED</a:t>
+            </a:r>
+          </a:p>
+        </p:txBody>
+      </p:sp>
+      <p:cxnSp>
+        <p:nvCxnSpPr>
+          <p:cNvPr id="14" name="Straight Arrow Connector 13">
+            <a:extLst>
+              <a:ext uri="{FF2B5EF4-FFF2-40B4-BE49-F238E27FC236}">
+                <a16:creationId xmlns:a16="http://schemas.microsoft.com/office/drawing/2014/main" id="{E0AFE95D-ECE0-49C8-B9C9-F77EC50A0CF6}"/>
+              </a:ext>
+            </a:extLst>
+          </p:cNvPr>
+          <p:cNvCxnSpPr/>
+          <p:nvPr/>
+        </p:nvCxnSpPr>
+        <p:spPr>
+          <a:xfrm>
+            <a:off x="1074198" y="2665326"/>
+            <a:ext cx="932783" cy="947886"/>
+          </a:xfrm>
+          <a:prstGeom prst="straightConnector1">
+            <a:avLst/>
+          </a:prstGeom>
+          <a:ln w="38100">
+            <a:solidFill>
+              <a:srgbClr val="FF0000"/>
+            </a:solidFill>
+            <a:tailEnd type="triangle"/>
+          </a:ln>
+        </p:spPr>
+        <p:style>
+          <a:lnRef idx="1">
+            <a:schemeClr val="accent1"/>
+          </a:lnRef>
+          <a:fillRef idx="0">
+            <a:schemeClr val="accent1"/>
+          </a:fillRef>
+          <a:effectRef idx="0">
+            <a:schemeClr val="accent1"/>
+          </a:effectRef>
+          <a:fontRef idx="minor">
+            <a:schemeClr val="tx1"/>
+          </a:fontRef>
+        </p:style>
+      </p:cxnSp>
     </p:spTree>
     <p:extLst>
       <p:ext uri="{BB962C8B-B14F-4D97-AF65-F5344CB8AC3E}">
-        <p14:creationId xmlns:p14="http://schemas.microsoft.com/office/powerpoint/2010/main" val="1733494640"/>
+        <p14:creationId xmlns:p14="http://schemas.microsoft.com/office/powerpoint/2010/main" val="566068459"/>
       </p:ext>
     </p:extLst>
   </p:cSld>
   <p:clrMapOvr>
     <a:masterClrMapping/>
   </p:clrMapOvr>
+  <p:timing>
+    <p:tnLst>
+      <p:par>
+        <p:cTn id="1" dur="indefinite" restart="never" nodeType="tmRoot">
+          <p:childTnLst>
+            <p:seq concurrent="1" nextAc="seek">
+              <p:cTn id="2" dur="indefinite" nodeType="mainSeq">
+                <p:childTnLst>
+                  <p:par>
+                    <p:cTn id="3" fill="hold">
+                      <p:stCondLst>
+                        <p:cond delay="indefinite"/>
+                      </p:stCondLst>
+                      <p:childTnLst>
+                        <p:par>
+                          <p:cTn id="4" fill="hold">
+                            <p:stCondLst>
+                              <p:cond delay="0"/>
+                            </p:stCondLst>
+                            <p:childTnLst>
+                              <p:par>
+                                <p:cTn id="5" presetID="10" presetClass="entr" presetSubtype="0" fill="hold" grpId="0" nodeType="clickEffect">
+                                  <p:stCondLst>
+                                    <p:cond delay="0"/>
+                                  </p:stCondLst>
+                                  <p:childTnLst>
+                                    <p:set>
+                                      <p:cBhvr>
+                                        <p:cTn id="6" dur="1" fill="hold">
+                                          <p:stCondLst>
+                                            <p:cond delay="0"/>
+                                          </p:stCondLst>
+                                        </p:cTn>
+                                        <p:tgtEl>
+                                          <p:spTgt spid="8"/>
+                                        </p:tgtEl>
+                                        <p:attrNameLst>
+                                          <p:attrName>style.visibility</p:attrName>
+                                        </p:attrNameLst>
+                                      </p:cBhvr>
+                                      <p:to>
+                                        <p:strVal val="visible"/>
+                                      </p:to>
+                                    </p:set>
+                                    <p:animEffect transition="in" filter="fade">
+                                      <p:cBhvr>
+                                        <p:cTn id="7" dur="2250"/>
+                                        <p:tgtEl>
+                                          <p:spTgt spid="8"/>
+                                        </p:tgtEl>
+                                      </p:cBhvr>
+                                    </p:animEffect>
+                                  </p:childTnLst>
+                                </p:cTn>
+                              </p:par>
+                              <p:par>
+                                <p:cTn id="8" presetID="10" presetClass="entr" presetSubtype="0" fill="hold" nodeType="withEffect">
+                                  <p:stCondLst>
+                                    <p:cond delay="0"/>
+                                  </p:stCondLst>
+                                  <p:childTnLst>
+                                    <p:set>
+                                      <p:cBhvr>
+                                        <p:cTn id="9" dur="1" fill="hold">
+                                          <p:stCondLst>
+                                            <p:cond delay="0"/>
+                                          </p:stCondLst>
+                                        </p:cTn>
+                                        <p:tgtEl>
+                                          <p:spTgt spid="5"/>
+                                        </p:tgtEl>
+                                        <p:attrNameLst>
+                                          <p:attrName>style.visibility</p:attrName>
+                                        </p:attrNameLst>
+                                      </p:cBhvr>
+                                      <p:to>
+                                        <p:strVal val="visible"/>
+                                      </p:to>
+                                    </p:set>
+                                    <p:animEffect transition="in" filter="fade">
+                                      <p:cBhvr>
+                                        <p:cTn id="10" dur="2250"/>
+                                        <p:tgtEl>
+                                          <p:spTgt spid="5"/>
+                                        </p:tgtEl>
+                                      </p:cBhvr>
+                                    </p:animEffect>
+                                  </p:childTnLst>
+                                </p:cTn>
+                              </p:par>
+                            </p:childTnLst>
+                          </p:cTn>
+                        </p:par>
+                      </p:childTnLst>
+                    </p:cTn>
+                  </p:par>
+                  <p:par>
+                    <p:cTn id="11" fill="hold">
+                      <p:stCondLst>
+                        <p:cond delay="indefinite"/>
+                      </p:stCondLst>
+                      <p:childTnLst>
+                        <p:par>
+                          <p:cTn id="12" fill="hold">
+                            <p:stCondLst>
+                              <p:cond delay="0"/>
+                            </p:stCondLst>
+                            <p:childTnLst>
+                              <p:par>
+                                <p:cTn id="13" presetID="10" presetClass="entr" presetSubtype="0" fill="hold" nodeType="clickEffect">
+                                  <p:stCondLst>
+                                    <p:cond delay="0"/>
+                                  </p:stCondLst>
+                                  <p:childTnLst>
+                                    <p:set>
+                                      <p:cBhvr>
+                                        <p:cTn id="14" dur="1" fill="hold">
+                                          <p:stCondLst>
+                                            <p:cond delay="0"/>
+                                          </p:stCondLst>
+                                        </p:cTn>
+                                        <p:tgtEl>
+                                          <p:spTgt spid="14"/>
+                                        </p:tgtEl>
+                                        <p:attrNameLst>
+                                          <p:attrName>style.visibility</p:attrName>
+                                        </p:attrNameLst>
+                                      </p:cBhvr>
+                                      <p:to>
+                                        <p:strVal val="visible"/>
+                                      </p:to>
+                                    </p:set>
+                                    <p:animEffect transition="in" filter="fade">
+                                      <p:cBhvr>
+                                        <p:cTn id="15" dur="1750"/>
+                                        <p:tgtEl>
+                                          <p:spTgt spid="14"/>
+                                        </p:tgtEl>
+                                      </p:cBhvr>
+                                    </p:animEffect>
+                                  </p:childTnLst>
+                                </p:cTn>
+                              </p:par>
+                              <p:par>
+                                <p:cTn id="16" presetID="10" presetClass="entr" presetSubtype="0" fill="hold" grpId="0" nodeType="withEffect">
+                                  <p:stCondLst>
+                                    <p:cond delay="0"/>
+                                  </p:stCondLst>
+                                  <p:childTnLst>
+                                    <p:set>
+                                      <p:cBhvr>
+                                        <p:cTn id="17" dur="1" fill="hold">
+                                          <p:stCondLst>
+                                            <p:cond delay="0"/>
+                                          </p:stCondLst>
+                                        </p:cTn>
+                                        <p:tgtEl>
+                                          <p:spTgt spid="12"/>
+                                        </p:tgtEl>
+                                        <p:attrNameLst>
+                                          <p:attrName>style.visibility</p:attrName>
+                                        </p:attrNameLst>
+                                      </p:cBhvr>
+                                      <p:to>
+                                        <p:strVal val="visible"/>
+                                      </p:to>
+                                    </p:set>
+                                    <p:animEffect transition="in" filter="fade">
+                                      <p:cBhvr>
+                                        <p:cTn id="18" dur="1750"/>
+                                        <p:tgtEl>
+                                          <p:spTgt spid="12"/>
+                                        </p:tgtEl>
+                                      </p:cBhvr>
+                                    </p:animEffect>
+                                  </p:childTnLst>
+                                </p:cTn>
+                              </p:par>
+                            </p:childTnLst>
+                          </p:cTn>
+                        </p:par>
+                      </p:childTnLst>
+                    </p:cTn>
+                  </p:par>
+                </p:childTnLst>
+              </p:cTn>
+              <p:prevCondLst>
+                <p:cond evt="onPrev" delay="0">
+                  <p:tgtEl>
+                    <p:sldTgt/>
+                  </p:tgtEl>
+                </p:cond>
+              </p:prevCondLst>
+              <p:nextCondLst>
+                <p:cond evt="onNext" delay="0">
+                  <p:tgtEl>
+                    <p:sldTgt/>
+                  </p:tgtEl>
+                </p:cond>
+              </p:nextCondLst>
+            </p:seq>
+          </p:childTnLst>
+        </p:cTn>
+      </p:par>
+    </p:tnLst>
+    <p:bldLst>
+      <p:bldP spid="8" grpId="0"/>
+      <p:bldP spid="12" grpId="0"/>
+    </p:bldLst>
+  </p:timing>
 </p:sld>
 </file>
 
@@ -5719,4 +9325,299 @@
     </a:ext>
   </a:extLst>
 </a:theme>
+</file>
+
+<file path=ppt/theme/theme2.xml><?xml version="1.0" encoding="utf-8"?>
+<a:theme xmlns:a="http://schemas.openxmlformats.org/drawingml/2006/main" name="Office Theme">
+  <a:themeElements>
+    <a:clrScheme name="Office">
+      <a:dk1>
+        <a:sysClr val="windowText" lastClr="000000"/>
+      </a:dk1>
+      <a:lt1>
+        <a:sysClr val="window" lastClr="FFFFFF"/>
+      </a:lt1>
+      <a:dk2>
+        <a:srgbClr val="44546A"/>
+      </a:dk2>
+      <a:lt2>
+        <a:srgbClr val="E7E6E6"/>
+      </a:lt2>
+      <a:accent1>
+        <a:srgbClr val="4472C4"/>
+      </a:accent1>
+      <a:accent2>
+        <a:srgbClr val="ED7D31"/>
+      </a:accent2>
+      <a:accent3>
+        <a:srgbClr val="A5A5A5"/>
+      </a:accent3>
+      <a:accent4>
+        <a:srgbClr val="FFC000"/>
+      </a:accent4>
+      <a:accent5>
+        <a:srgbClr val="5B9BD5"/>
+      </a:accent5>
+      <a:accent6>
+        <a:srgbClr val="70AD47"/>
+      </a:accent6>
+      <a:hlink>
+        <a:srgbClr val="0563C1"/>
+      </a:hlink>
+      <a:folHlink>
+        <a:srgbClr val="954F72"/>
+      </a:folHlink>
+    </a:clrScheme>
+    <a:fontScheme name="Office">
+      <a:majorFont>
+        <a:latin typeface="Calibri Light" panose="020F0302020204030204"/>
+        <a:ea typeface=""/>
+        <a:cs typeface=""/>
+        <a:font script="Jpan" typeface="游ゴシック Light"/>
+        <a:font script="Hang" typeface="맑은 고딕"/>
+        <a:font script="Hans" typeface="等线 Light"/>
+        <a:font script="Hant" typeface="新細明體"/>
+        <a:font script="Arab" typeface="Times New Roman"/>
+        <a:font script="Hebr" typeface="Times New Roman"/>
+        <a:font script="Thai" typeface="Angsana New"/>
+        <a:font script="Ethi" typeface="Nyala"/>
+        <a:font script="Beng" typeface="Vrinda"/>
+        <a:font script="Gujr" typeface="Shruti"/>
+        <a:font script="Khmr" typeface="MoolBoran"/>
+        <a:font script="Knda" typeface="Tunga"/>
+        <a:font script="Guru" typeface="Raavi"/>
+        <a:font script="Cans" typeface="Euphemia"/>
+        <a:font script="Cher" typeface="Plantagenet Cherokee"/>
+        <a:font script="Yiii" typeface="Microsoft Yi Baiti"/>
+        <a:font script="Tibt" typeface="Microsoft Himalaya"/>
+        <a:font script="Thaa" typeface="MV Boli"/>
+        <a:font script="Deva" typeface="Mangal"/>
+        <a:font script="Telu" typeface="Gautami"/>
+        <a:font script="Taml" typeface="Latha"/>
+        <a:font script="Syrc" typeface="Estrangelo Edessa"/>
+        <a:font script="Orya" typeface="Kalinga"/>
+        <a:font script="Mlym" typeface="Kartika"/>
+        <a:font script="Laoo" typeface="DokChampa"/>
+        <a:font script="Sinh" typeface="Iskoola Pota"/>
+        <a:font script="Mong" typeface="Mongolian Baiti"/>
+        <a:font script="Viet" typeface="Times New Roman"/>
+        <a:font script="Uigh" typeface="Microsoft Uighur"/>
+        <a:font script="Geor" typeface="Sylfaen"/>
+        <a:font script="Armn" typeface="Arial"/>
+        <a:font script="Bugi" typeface="Leelawadee UI"/>
+        <a:font script="Bopo" typeface="Microsoft JhengHei"/>
+        <a:font script="Java" typeface="Javanese Text"/>
+        <a:font script="Lisu" typeface="Segoe UI"/>
+        <a:font script="Mymr" typeface="Myanmar Text"/>
+        <a:font script="Nkoo" typeface="Ebrima"/>
+        <a:font script="Olck" typeface="Nirmala UI"/>
+        <a:font script="Osma" typeface="Ebrima"/>
+        <a:font script="Phag" typeface="Phagspa"/>
+        <a:font script="Syrn" typeface="Estrangelo Edessa"/>
+        <a:font script="Syrj" typeface="Estrangelo Edessa"/>
+        <a:font script="Syre" typeface="Estrangelo Edessa"/>
+        <a:font script="Sora" typeface="Nirmala UI"/>
+        <a:font script="Tale" typeface="Microsoft Tai Le"/>
+        <a:font script="Talu" typeface="Microsoft New Tai Lue"/>
+        <a:font script="Tfng" typeface="Ebrima"/>
+      </a:majorFont>
+      <a:minorFont>
+        <a:latin typeface="Calibri" panose="020F0502020204030204"/>
+        <a:ea typeface=""/>
+        <a:cs typeface=""/>
+        <a:font script="Jpan" typeface="游ゴシック"/>
+        <a:font script="Hang" typeface="맑은 고딕"/>
+        <a:font script="Hans" typeface="等线"/>
+        <a:font script="Hant" typeface="新細明體"/>
+        <a:font script="Arab" typeface="Arial"/>
+        <a:font script="Hebr" typeface="Arial"/>
+        <a:font script="Thai" typeface="Cordia New"/>
+        <a:font script="Ethi" typeface="Nyala"/>
+        <a:font script="Beng" typeface="Vrinda"/>
+        <a:font script="Gujr" typeface="Shruti"/>
+        <a:font script="Khmr" typeface="DaunPenh"/>
+        <a:font script="Knda" typeface="Tunga"/>
+        <a:font script="Guru" typeface="Raavi"/>
+        <a:font script="Cans" typeface="Euphemia"/>
+        <a:font script="Cher" typeface="Plantagenet Cherokee"/>
+        <a:font script="Yiii" typeface="Microsoft Yi Baiti"/>
+        <a:font script="Tibt" typeface="Microsoft Himalaya"/>
+        <a:font script="Thaa" typeface="MV Boli"/>
+        <a:font script="Deva" typeface="Mangal"/>
+        <a:font script="Telu" typeface="Gautami"/>
+        <a:font script="Taml" typeface="Latha"/>
+        <a:font script="Syrc" typeface="Estrangelo Edessa"/>
+        <a:font script="Orya" typeface="Kalinga"/>
+        <a:font script="Mlym" typeface="Kartika"/>
+        <a:font script="Laoo" typeface="DokChampa"/>
+        <a:font script="Sinh" typeface="Iskoola Pota"/>
+        <a:font script="Mong" typeface="Mongolian Baiti"/>
+        <a:font script="Viet" typeface="Arial"/>
+        <a:font script="Uigh" typeface="Microsoft Uighur"/>
+        <a:font script="Geor" typeface="Sylfaen"/>
+        <a:font script="Armn" typeface="Arial"/>
+        <a:font script="Bugi" typeface="Leelawadee UI"/>
+        <a:font script="Bopo" typeface="Microsoft JhengHei"/>
+        <a:font script="Java" typeface="Javanese Text"/>
+        <a:font script="Lisu" typeface="Segoe UI"/>
+        <a:font script="Mymr" typeface="Myanmar Text"/>
+        <a:font script="Nkoo" typeface="Ebrima"/>
+        <a:font script="Olck" typeface="Nirmala UI"/>
+        <a:font script="Osma" typeface="Ebrima"/>
+        <a:font script="Phag" typeface="Phagspa"/>
+        <a:font script="Syrn" typeface="Estrangelo Edessa"/>
+        <a:font script="Syrj" typeface="Estrangelo Edessa"/>
+        <a:font script="Syre" typeface="Estrangelo Edessa"/>
+        <a:font script="Sora" typeface="Nirmala UI"/>
+        <a:font script="Tale" typeface="Microsoft Tai Le"/>
+        <a:font script="Talu" typeface="Microsoft New Tai Lue"/>
+        <a:font script="Tfng" typeface="Ebrima"/>
+      </a:minorFont>
+    </a:fontScheme>
+    <a:fmtScheme name="Office">
+      <a:fillStyleLst>
+        <a:solidFill>
+          <a:schemeClr val="phClr"/>
+        </a:solidFill>
+        <a:gradFill rotWithShape="1">
+          <a:gsLst>
+            <a:gs pos="0">
+              <a:schemeClr val="phClr">
+                <a:lumMod val="110000"/>
+                <a:satMod val="105000"/>
+                <a:tint val="67000"/>
+              </a:schemeClr>
+            </a:gs>
+            <a:gs pos="50000">
+              <a:schemeClr val="phClr">
+                <a:lumMod val="105000"/>
+                <a:satMod val="103000"/>
+                <a:tint val="73000"/>
+              </a:schemeClr>
+            </a:gs>
+            <a:gs pos="100000">
+              <a:schemeClr val="phClr">
+                <a:lumMod val="105000"/>
+                <a:satMod val="109000"/>
+                <a:tint val="81000"/>
+              </a:schemeClr>
+            </a:gs>
+          </a:gsLst>
+          <a:lin ang="5400000" scaled="0"/>
+        </a:gradFill>
+        <a:gradFill rotWithShape="1">
+          <a:gsLst>
+            <a:gs pos="0">
+              <a:schemeClr val="phClr">
+                <a:satMod val="103000"/>
+                <a:lumMod val="102000"/>
+                <a:tint val="94000"/>
+              </a:schemeClr>
+            </a:gs>
+            <a:gs pos="50000">
+              <a:schemeClr val="phClr">
+                <a:satMod val="110000"/>
+                <a:lumMod val="100000"/>
+                <a:shade val="100000"/>
+              </a:schemeClr>
+            </a:gs>
+            <a:gs pos="100000">
+              <a:schemeClr val="phClr">
+                <a:lumMod val="99000"/>
+                <a:satMod val="120000"/>
+                <a:shade val="78000"/>
+              </a:schemeClr>
+            </a:gs>
+          </a:gsLst>
+          <a:lin ang="5400000" scaled="0"/>
+        </a:gradFill>
+      </a:fillStyleLst>
+      <a:lnStyleLst>
+        <a:ln w="6350" cap="flat" cmpd="sng" algn="ctr">
+          <a:solidFill>
+            <a:schemeClr val="phClr"/>
+          </a:solidFill>
+          <a:prstDash val="solid"/>
+          <a:miter lim="800000"/>
+        </a:ln>
+        <a:ln w="12700" cap="flat" cmpd="sng" algn="ctr">
+          <a:solidFill>
+            <a:schemeClr val="phClr"/>
+          </a:solidFill>
+          <a:prstDash val="solid"/>
+          <a:miter lim="800000"/>
+        </a:ln>
+        <a:ln w="19050" cap="flat" cmpd="sng" algn="ctr">
+          <a:solidFill>
+            <a:schemeClr val="phClr"/>
+          </a:solidFill>
+          <a:prstDash val="solid"/>
+          <a:miter lim="800000"/>
+        </a:ln>
+      </a:lnStyleLst>
+      <a:effectStyleLst>
+        <a:effectStyle>
+          <a:effectLst/>
+        </a:effectStyle>
+        <a:effectStyle>
+          <a:effectLst/>
+        </a:effectStyle>
+        <a:effectStyle>
+          <a:effectLst>
+            <a:outerShdw blurRad="57150" dist="19050" dir="5400000" algn="ctr" rotWithShape="0">
+              <a:srgbClr val="000000">
+                <a:alpha val="63000"/>
+              </a:srgbClr>
+            </a:outerShdw>
+          </a:effectLst>
+        </a:effectStyle>
+      </a:effectStyleLst>
+      <a:bgFillStyleLst>
+        <a:solidFill>
+          <a:schemeClr val="phClr"/>
+        </a:solidFill>
+        <a:solidFill>
+          <a:schemeClr val="phClr">
+            <a:tint val="95000"/>
+            <a:satMod val="170000"/>
+          </a:schemeClr>
+        </a:solidFill>
+        <a:gradFill rotWithShape="1">
+          <a:gsLst>
+            <a:gs pos="0">
+              <a:schemeClr val="phClr">
+                <a:tint val="93000"/>
+                <a:satMod val="150000"/>
+                <a:shade val="98000"/>
+                <a:lumMod val="102000"/>
+              </a:schemeClr>
+            </a:gs>
+            <a:gs pos="50000">
+              <a:schemeClr val="phClr">
+                <a:tint val="98000"/>
+                <a:satMod val="130000"/>
+                <a:shade val="90000"/>
+                <a:lumMod val="103000"/>
+              </a:schemeClr>
+            </a:gs>
+            <a:gs pos="100000">
+              <a:schemeClr val="phClr">
+                <a:shade val="63000"/>
+                <a:satMod val="120000"/>
+              </a:schemeClr>
+            </a:gs>
+          </a:gsLst>
+          <a:lin ang="5400000" scaled="0"/>
+        </a:gradFill>
+      </a:bgFillStyleLst>
+    </a:fmtScheme>
+  </a:themeElements>
+  <a:objectDefaults/>
+  <a:extraClrSchemeLst/>
+  <a:extLst>
+    <a:ext uri="{05A4C25C-085E-4340-85A3-A5531E510DB2}">
+      <thm15:themeFamily xmlns:thm15="http://schemas.microsoft.com/office/thememl/2012/main" name="Office Theme" id="{62F939B6-93AF-4DB8-9C6B-D6C7DFDC589F}" vid="{4A3C46E8-61CC-4603-A589-7422A47A8E4A}"/>
+    </a:ext>
+  </a:extLst>
+</a:theme>
 </file>
</xml_diff>

<commit_message>
small change in slides
</commit_message>
<xml_diff>
--- a/prabhashwara/PROGRESS AND SUMMARY.pptx
+++ b/prabhashwara/PROGRESS AND SUMMARY.pptx
@@ -211,7 +211,7 @@
           <a:p>
             <a:fld id="{CCB5ECA5-1104-4B05-8F1F-CD4FEDAB6D0D}" type="datetimeFigureOut">
               <a:rPr lang="en-US" smtClean="0"/>
-              <a:t>2021-05-11</a:t>
+              <a:t>2021-05-14</a:t>
             </a:fld>
             <a:endParaRPr lang="en-US"/>
           </a:p>
@@ -625,7 +625,7 @@
           <a:p>
             <a:fld id="{BA55A736-0673-4DCE-ABF9-C67D5500DA64}" type="datetimeFigureOut">
               <a:rPr lang="en-US" smtClean="0"/>
-              <a:t>2021-05-11</a:t>
+              <a:t>2021-05-14</a:t>
             </a:fld>
             <a:endParaRPr lang="en-US"/>
           </a:p>
@@ -823,7 +823,7 @@
           <a:p>
             <a:fld id="{BA55A736-0673-4DCE-ABF9-C67D5500DA64}" type="datetimeFigureOut">
               <a:rPr lang="en-US" smtClean="0"/>
-              <a:t>2021-05-11</a:t>
+              <a:t>2021-05-14</a:t>
             </a:fld>
             <a:endParaRPr lang="en-US"/>
           </a:p>
@@ -1031,7 +1031,7 @@
           <a:p>
             <a:fld id="{BA55A736-0673-4DCE-ABF9-C67D5500DA64}" type="datetimeFigureOut">
               <a:rPr lang="en-US" smtClean="0"/>
-              <a:t>2021-05-11</a:t>
+              <a:t>2021-05-14</a:t>
             </a:fld>
             <a:endParaRPr lang="en-US"/>
           </a:p>
@@ -1229,7 +1229,7 @@
           <a:p>
             <a:fld id="{BA55A736-0673-4DCE-ABF9-C67D5500DA64}" type="datetimeFigureOut">
               <a:rPr lang="en-US" smtClean="0"/>
-              <a:t>2021-05-11</a:t>
+              <a:t>2021-05-14</a:t>
             </a:fld>
             <a:endParaRPr lang="en-US"/>
           </a:p>
@@ -1504,7 +1504,7 @@
           <a:p>
             <a:fld id="{BA55A736-0673-4DCE-ABF9-C67D5500DA64}" type="datetimeFigureOut">
               <a:rPr lang="en-US" smtClean="0"/>
-              <a:t>2021-05-11</a:t>
+              <a:t>2021-05-14</a:t>
             </a:fld>
             <a:endParaRPr lang="en-US"/>
           </a:p>
@@ -1769,7 +1769,7 @@
           <a:p>
             <a:fld id="{BA55A736-0673-4DCE-ABF9-C67D5500DA64}" type="datetimeFigureOut">
               <a:rPr lang="en-US" smtClean="0"/>
-              <a:t>2021-05-11</a:t>
+              <a:t>2021-05-14</a:t>
             </a:fld>
             <a:endParaRPr lang="en-US"/>
           </a:p>
@@ -2181,7 +2181,7 @@
           <a:p>
             <a:fld id="{BA55A736-0673-4DCE-ABF9-C67D5500DA64}" type="datetimeFigureOut">
               <a:rPr lang="en-US" smtClean="0"/>
-              <a:t>2021-05-11</a:t>
+              <a:t>2021-05-14</a:t>
             </a:fld>
             <a:endParaRPr lang="en-US"/>
           </a:p>
@@ -2322,7 +2322,7 @@
           <a:p>
             <a:fld id="{BA55A736-0673-4DCE-ABF9-C67D5500DA64}" type="datetimeFigureOut">
               <a:rPr lang="en-US" smtClean="0"/>
-              <a:t>2021-05-11</a:t>
+              <a:t>2021-05-14</a:t>
             </a:fld>
             <a:endParaRPr lang="en-US"/>
           </a:p>
@@ -2435,7 +2435,7 @@
           <a:p>
             <a:fld id="{BA55A736-0673-4DCE-ABF9-C67D5500DA64}" type="datetimeFigureOut">
               <a:rPr lang="en-US" smtClean="0"/>
-              <a:t>2021-05-11</a:t>
+              <a:t>2021-05-14</a:t>
             </a:fld>
             <a:endParaRPr lang="en-US"/>
           </a:p>
@@ -2746,7 +2746,7 @@
           <a:p>
             <a:fld id="{BA55A736-0673-4DCE-ABF9-C67D5500DA64}" type="datetimeFigureOut">
               <a:rPr lang="en-US" smtClean="0"/>
-              <a:t>2021-05-11</a:t>
+              <a:t>2021-05-14</a:t>
             </a:fld>
             <a:endParaRPr lang="en-US"/>
           </a:p>
@@ -3034,7 +3034,7 @@
           <a:p>
             <a:fld id="{BA55A736-0673-4DCE-ABF9-C67D5500DA64}" type="datetimeFigureOut">
               <a:rPr lang="en-US" smtClean="0"/>
-              <a:t>2021-05-11</a:t>
+              <a:t>2021-05-14</a:t>
             </a:fld>
             <a:endParaRPr lang="en-US"/>
           </a:p>
@@ -3275,7 +3275,7 @@
           <a:p>
             <a:fld id="{BA55A736-0673-4DCE-ABF9-C67D5500DA64}" type="datetimeFigureOut">
               <a:rPr lang="en-US" smtClean="0"/>
-              <a:t>2021-05-11</a:t>
+              <a:t>2021-05-14</a:t>
             </a:fld>
             <a:endParaRPr lang="en-US"/>
           </a:p>
@@ -3866,8 +3866,8 @@
           </a:xfrm>
         </p:spPr>
       </p:pic>
-      <mc:AlternateContent xmlns:mc="http://schemas.openxmlformats.org/markup-compatibility/2006" xmlns:a14="http://schemas.microsoft.com/office/drawing/2010/main">
-        <mc:Choice Requires="a14">
+      <mc:AlternateContent xmlns:mc="http://schemas.openxmlformats.org/markup-compatibility/2006">
+        <mc:Choice xmlns:a14="http://schemas.microsoft.com/office/drawing/2010/main" Requires="a14">
           <p:sp>
             <p:nvSpPr>
               <p:cNvPr id="7" name="TextBox 6">
@@ -4014,21 +4014,20 @@
                 </a:r>
                 <a:r>
                   <a:rPr lang="en-US" b="1" dirty="0"/>
-                  <a:t>   &lt;</a:t>
+                  <a:t>   </a:t>
                 </a:r>
                 <a:r>
-                  <a:rPr lang="en-US" b="1" dirty="0" err="1"/>
-                  <a:t>desmos</a:t>
+                  <a:rPr lang="en-US" b="1" dirty="0">
+                    <a:hlinkClick r:id="rId3"/>
+                  </a:rPr>
+                  <a:t>https://www.desmos.com/calculator/lbnz0wmogb</a:t>
                 </a:r>
-                <a:r>
-                  <a:rPr lang="en-US" b="1" dirty="0"/>
-                  <a:t> link&gt;</a:t>
-                </a:r>
+                <a:endParaRPr lang="en-US" b="1" dirty="0"/>
               </a:p>
             </p:txBody>
           </p:sp>
         </mc:Choice>
-        <mc:Fallback xmlns="">
+        <mc:Fallback>
           <p:sp>
             <p:nvSpPr>
               <p:cNvPr id="7" name="TextBox 6">
@@ -4052,7 +4051,7 @@
                 <a:avLst/>
               </a:prstGeom>
               <a:blipFill>
-                <a:blip r:embed="rId3"/>
+                <a:blip r:embed="rId4"/>
                 <a:stretch>
                   <a:fillRect l="-501" t="-3636" r="-612" b="-11818"/>
                 </a:stretch>

</xml_diff>

<commit_message>
RGB LED - 1 pwm Class cretated ... & presentation
</commit_message>
<xml_diff>
--- a/prabhashwara/PROGRESS AND SUMMARY.pptx
+++ b/prabhashwara/PROGRESS AND SUMMARY.pptx
@@ -5,7 +5,7 @@
     <p:sldMasterId id="2147483648" r:id="rId1"/>
   </p:sldMasterIdLst>
   <p:notesMasterIdLst>
-    <p:notesMasterId r:id="rId17"/>
+    <p:notesMasterId r:id="rId19"/>
   </p:notesMasterIdLst>
   <p:sldIdLst>
     <p:sldId id="256" r:id="rId2"/>
@@ -23,6 +23,8 @@
     <p:sldId id="269" r:id="rId14"/>
     <p:sldId id="270" r:id="rId15"/>
     <p:sldId id="271" r:id="rId16"/>
+    <p:sldId id="272" r:id="rId17"/>
+    <p:sldId id="273" r:id="rId18"/>
   </p:sldIdLst>
   <p:sldSz cx="12192000" cy="6858000"/>
   <p:notesSz cx="6858000" cy="9144000"/>
@@ -129,6 +131,18 @@
 </p:presentation>
 </file>
 
+<file path=ppt/commentAuthors.xml><?xml version="1.0" encoding="utf-8"?>
+<p:cmAuthorLst xmlns:a="http://schemas.openxmlformats.org/drawingml/2006/main" xmlns:r="http://schemas.openxmlformats.org/officeDocument/2006/relationships" xmlns:p="http://schemas.openxmlformats.org/presentationml/2006/main">
+  <p:cmAuthor id="1" name="Pasindu Prabhashwara" initials="PP" lastIdx="1" clrIdx="0">
+    <p:extLst>
+      <p:ext uri="{19B8F6BF-5375-455C-9EA6-DF929625EA0E}">
+        <p15:presenceInfo xmlns:p15="http://schemas.microsoft.com/office/powerpoint/2012/main" userId="S::kahawalageapp.19@uom.lk::1c99b9ef-f0ed-4a96-b83c-de0040046485" providerId="AD"/>
+      </p:ext>
+    </p:extLst>
+  </p:cmAuthor>
+</p:cmAuthorLst>
+</file>
+
 <file path=ppt/notesMasters/notesMaster1.xml><?xml version="1.0" encoding="utf-8"?>
 <p:notesMaster xmlns:a="http://schemas.openxmlformats.org/drawingml/2006/main" xmlns:r="http://schemas.openxmlformats.org/officeDocument/2006/relationships" xmlns:p="http://schemas.openxmlformats.org/presentationml/2006/main">
   <p:cSld>
@@ -211,7 +225,7 @@
           <a:p>
             <a:fld id="{CCB5ECA5-1104-4B05-8F1F-CD4FEDAB6D0D}" type="datetimeFigureOut">
               <a:rPr lang="en-US" smtClean="0"/>
-              <a:t>2021-05-14</a:t>
+              <a:t>2021-05-18</a:t>
             </a:fld>
             <a:endParaRPr lang="en-US"/>
           </a:p>
@@ -625,7 +639,7 @@
           <a:p>
             <a:fld id="{BA55A736-0673-4DCE-ABF9-C67D5500DA64}" type="datetimeFigureOut">
               <a:rPr lang="en-US" smtClean="0"/>
-              <a:t>2021-05-14</a:t>
+              <a:t>2021-05-18</a:t>
             </a:fld>
             <a:endParaRPr lang="en-US"/>
           </a:p>
@@ -823,7 +837,7 @@
           <a:p>
             <a:fld id="{BA55A736-0673-4DCE-ABF9-C67D5500DA64}" type="datetimeFigureOut">
               <a:rPr lang="en-US" smtClean="0"/>
-              <a:t>2021-05-14</a:t>
+              <a:t>2021-05-18</a:t>
             </a:fld>
             <a:endParaRPr lang="en-US"/>
           </a:p>
@@ -1031,7 +1045,7 @@
           <a:p>
             <a:fld id="{BA55A736-0673-4DCE-ABF9-C67D5500DA64}" type="datetimeFigureOut">
               <a:rPr lang="en-US" smtClean="0"/>
-              <a:t>2021-05-14</a:t>
+              <a:t>2021-05-18</a:t>
             </a:fld>
             <a:endParaRPr lang="en-US"/>
           </a:p>
@@ -1229,7 +1243,7 @@
           <a:p>
             <a:fld id="{BA55A736-0673-4DCE-ABF9-C67D5500DA64}" type="datetimeFigureOut">
               <a:rPr lang="en-US" smtClean="0"/>
-              <a:t>2021-05-14</a:t>
+              <a:t>2021-05-18</a:t>
             </a:fld>
             <a:endParaRPr lang="en-US"/>
           </a:p>
@@ -1504,7 +1518,7 @@
           <a:p>
             <a:fld id="{BA55A736-0673-4DCE-ABF9-C67D5500DA64}" type="datetimeFigureOut">
               <a:rPr lang="en-US" smtClean="0"/>
-              <a:t>2021-05-14</a:t>
+              <a:t>2021-05-18</a:t>
             </a:fld>
             <a:endParaRPr lang="en-US"/>
           </a:p>
@@ -1769,7 +1783,7 @@
           <a:p>
             <a:fld id="{BA55A736-0673-4DCE-ABF9-C67D5500DA64}" type="datetimeFigureOut">
               <a:rPr lang="en-US" smtClean="0"/>
-              <a:t>2021-05-14</a:t>
+              <a:t>2021-05-18</a:t>
             </a:fld>
             <a:endParaRPr lang="en-US"/>
           </a:p>
@@ -2181,7 +2195,7 @@
           <a:p>
             <a:fld id="{BA55A736-0673-4DCE-ABF9-C67D5500DA64}" type="datetimeFigureOut">
               <a:rPr lang="en-US" smtClean="0"/>
-              <a:t>2021-05-14</a:t>
+              <a:t>2021-05-18</a:t>
             </a:fld>
             <a:endParaRPr lang="en-US"/>
           </a:p>
@@ -2322,7 +2336,7 @@
           <a:p>
             <a:fld id="{BA55A736-0673-4DCE-ABF9-C67D5500DA64}" type="datetimeFigureOut">
               <a:rPr lang="en-US" smtClean="0"/>
-              <a:t>2021-05-14</a:t>
+              <a:t>2021-05-18</a:t>
             </a:fld>
             <a:endParaRPr lang="en-US"/>
           </a:p>
@@ -2435,7 +2449,7 @@
           <a:p>
             <a:fld id="{BA55A736-0673-4DCE-ABF9-C67D5500DA64}" type="datetimeFigureOut">
               <a:rPr lang="en-US" smtClean="0"/>
-              <a:t>2021-05-14</a:t>
+              <a:t>2021-05-18</a:t>
             </a:fld>
             <a:endParaRPr lang="en-US"/>
           </a:p>
@@ -2746,7 +2760,7 @@
           <a:p>
             <a:fld id="{BA55A736-0673-4DCE-ABF9-C67D5500DA64}" type="datetimeFigureOut">
               <a:rPr lang="en-US" smtClean="0"/>
-              <a:t>2021-05-14</a:t>
+              <a:t>2021-05-18</a:t>
             </a:fld>
             <a:endParaRPr lang="en-US"/>
           </a:p>
@@ -3034,7 +3048,7 @@
           <a:p>
             <a:fld id="{BA55A736-0673-4DCE-ABF9-C67D5500DA64}" type="datetimeFigureOut">
               <a:rPr lang="en-US" smtClean="0"/>
-              <a:t>2021-05-14</a:t>
+              <a:t>2021-05-18</a:t>
             </a:fld>
             <a:endParaRPr lang="en-US"/>
           </a:p>
@@ -3275,7 +3289,7 @@
           <a:p>
             <a:fld id="{BA55A736-0673-4DCE-ABF9-C67D5500DA64}" type="datetimeFigureOut">
               <a:rPr lang="en-US" smtClean="0"/>
-              <a:t>2021-05-14</a:t>
+              <a:t>2021-05-18</a:t>
             </a:fld>
             <a:endParaRPr lang="en-US"/>
           </a:p>
@@ -3866,8 +3880,8 @@
           </a:xfrm>
         </p:spPr>
       </p:pic>
-      <mc:AlternateContent xmlns:mc="http://schemas.openxmlformats.org/markup-compatibility/2006">
-        <mc:Choice xmlns:a14="http://schemas.microsoft.com/office/drawing/2010/main" Requires="a14">
+      <mc:AlternateContent xmlns:mc="http://schemas.openxmlformats.org/markup-compatibility/2006" xmlns:a14="http://schemas.microsoft.com/office/drawing/2010/main">
+        <mc:Choice Requires="a14">
           <p:sp>
             <p:nvSpPr>
               <p:cNvPr id="7" name="TextBox 6">
@@ -4027,7 +4041,7 @@
             </p:txBody>
           </p:sp>
         </mc:Choice>
-        <mc:Fallback>
+        <mc:Fallback xmlns="">
           <p:sp>
             <p:nvSpPr>
               <p:cNvPr id="7" name="TextBox 6">
@@ -6410,14 +6424,21 @@
             <p:ph type="title"/>
           </p:nvPr>
         </p:nvSpPr>
-        <p:spPr/>
-        <p:txBody>
-          <a:bodyPr/>
+        <p:spPr>
+          <a:xfrm>
+            <a:off x="838200" y="-36999"/>
+            <a:ext cx="10515600" cy="1325563"/>
+          </a:xfrm>
+        </p:spPr>
+        <p:txBody>
+          <a:bodyPr>
+            <a:normAutofit/>
+          </a:bodyPr>
           <a:lstStyle/>
           <a:p>
             <a:pPr algn="ctr"/>
             <a:r>
-              <a:rPr lang="en-US" dirty="0"/>
+              <a:rPr lang="en-US" sz="3600" dirty="0"/>
               <a:t>Output LED and managing with 1 PWM</a:t>
             </a:r>
           </a:p>
@@ -6439,12 +6460,1131 @@
             <p:ph idx="1"/>
           </p:nvPr>
         </p:nvSpPr>
-        <p:spPr/>
+        <p:spPr>
+          <a:xfrm>
+            <a:off x="864894" y="1387887"/>
+            <a:ext cx="10515600" cy="4351338"/>
+          </a:xfrm>
+        </p:spPr>
         <p:txBody>
           <a:bodyPr/>
           <a:lstStyle/>
           <a:p>
-            <a:endParaRPr lang="en-US" dirty="0"/>
+            <a:r>
+              <a:rPr lang="en-US" sz="2000" dirty="0"/>
+              <a:t>Our idea is to use 1 PWM and 2 digital output pins.</a:t>
+            </a:r>
+          </a:p>
+          <a:p>
+            <a:pPr marL="0" indent="0">
+              <a:buNone/>
+            </a:pPr>
+            <a:r>
+              <a:rPr lang="en-US" dirty="0"/>
+              <a:t>     </a:t>
+            </a:r>
+          </a:p>
+        </p:txBody>
+      </p:sp>
+      <p:graphicFrame>
+        <p:nvGraphicFramePr>
+          <p:cNvPr id="5" name="Table 5">
+            <a:extLst>
+              <a:ext uri="{FF2B5EF4-FFF2-40B4-BE49-F238E27FC236}">
+                <a16:creationId xmlns:a16="http://schemas.microsoft.com/office/drawing/2014/main" id="{2CF70108-D51E-40C0-838C-98DD4A62D56B}"/>
+              </a:ext>
+            </a:extLst>
+          </p:cNvPr>
+          <p:cNvGraphicFramePr>
+            <a:graphicFrameLocks noGrp="1"/>
+          </p:cNvGraphicFramePr>
+          <p:nvPr>
+            <p:extLst>
+              <p:ext uri="{D42A27DB-BD31-4B8C-83A1-F6EECF244321}">
+                <p14:modId xmlns:p14="http://schemas.microsoft.com/office/powerpoint/2010/main" val="1375648125"/>
+              </p:ext>
+            </p:extLst>
+          </p:nvPr>
+        </p:nvGraphicFramePr>
+        <p:xfrm>
+          <a:off x="2070963" y="1937723"/>
+          <a:ext cx="8128000" cy="1473117"/>
+        </p:xfrm>
+        <a:graphic>
+          <a:graphicData uri="http://schemas.openxmlformats.org/drawingml/2006/table">
+            <a:tbl>
+              <a:tblPr firstRow="1" bandRow="1">
+                <a:tableStyleId>{5C22544A-7EE6-4342-B048-85BDC9FD1C3A}</a:tableStyleId>
+              </a:tblPr>
+              <a:tblGrid>
+                <a:gridCol w="2903985">
+                  <a:extLst>
+                    <a:ext uri="{9D8B030D-6E8A-4147-A177-3AD203B41FA5}">
+                      <a16:colId xmlns:a16="http://schemas.microsoft.com/office/drawing/2014/main" val="2352075291"/>
+                    </a:ext>
+                  </a:extLst>
+                </a:gridCol>
+                <a:gridCol w="5224015">
+                  <a:extLst>
+                    <a:ext uri="{9D8B030D-6E8A-4147-A177-3AD203B41FA5}">
+                      <a16:colId xmlns:a16="http://schemas.microsoft.com/office/drawing/2014/main" val="3243534496"/>
+                    </a:ext>
+                  </a:extLst>
+                </a:gridCol>
+              </a:tblGrid>
+              <a:tr h="491039">
+                <a:tc>
+                  <a:txBody>
+                    <a:bodyPr/>
+                    <a:lstStyle/>
+                    <a:p>
+                      <a:pPr algn="ctr"/>
+                      <a:r>
+                        <a:rPr lang="en-US" dirty="0"/>
+                        <a:t>Pin</a:t>
+                      </a:r>
+                    </a:p>
+                  </a:txBody>
+                  <a:tcPr/>
+                </a:tc>
+                <a:tc>
+                  <a:txBody>
+                    <a:bodyPr/>
+                    <a:lstStyle/>
+                    <a:p>
+                      <a:pPr algn="ctr"/>
+                      <a:r>
+                        <a:rPr lang="en-US" dirty="0"/>
+                        <a:t>Task</a:t>
+                      </a:r>
+                    </a:p>
+                  </a:txBody>
+                  <a:tcPr/>
+                </a:tc>
+                <a:extLst>
+                  <a:ext uri="{0D108BD9-81ED-4DB2-BD59-A6C34878D82A}">
+                    <a16:rowId xmlns:a16="http://schemas.microsoft.com/office/drawing/2014/main" val="2326069406"/>
+                  </a:ext>
+                </a:extLst>
+              </a:tr>
+              <a:tr h="491039">
+                <a:tc>
+                  <a:txBody>
+                    <a:bodyPr/>
+                    <a:lstStyle/>
+                    <a:p>
+                      <a:pPr algn="ctr"/>
+                      <a:r>
+                        <a:rPr lang="en-US" dirty="0"/>
+                        <a:t>1  PWM</a:t>
+                      </a:r>
+                    </a:p>
+                  </a:txBody>
+                  <a:tcPr/>
+                </a:tc>
+                <a:tc>
+                  <a:txBody>
+                    <a:bodyPr/>
+                    <a:lstStyle/>
+                    <a:p>
+                      <a:pPr algn="ctr"/>
+                      <a:r>
+                        <a:rPr lang="en-US" dirty="0"/>
+                        <a:t>Setting the corresponding intensity of each color</a:t>
+                      </a:r>
+                    </a:p>
+                  </a:txBody>
+                  <a:tcPr/>
+                </a:tc>
+                <a:extLst>
+                  <a:ext uri="{0D108BD9-81ED-4DB2-BD59-A6C34878D82A}">
+                    <a16:rowId xmlns:a16="http://schemas.microsoft.com/office/drawing/2014/main" val="3576353590"/>
+                  </a:ext>
+                </a:extLst>
+              </a:tr>
+              <a:tr h="491039">
+                <a:tc>
+                  <a:txBody>
+                    <a:bodyPr/>
+                    <a:lstStyle/>
+                    <a:p>
+                      <a:pPr algn="ctr"/>
+                      <a:r>
+                        <a:rPr lang="en-US" dirty="0"/>
+                        <a:t>2 Digital Output Pins</a:t>
+                      </a:r>
+                    </a:p>
+                  </a:txBody>
+                  <a:tcPr/>
+                </a:tc>
+                <a:tc>
+                  <a:txBody>
+                    <a:bodyPr/>
+                    <a:lstStyle/>
+                    <a:p>
+                      <a:pPr algn="ctr"/>
+                      <a:r>
+                        <a:rPr lang="en-US" dirty="0"/>
+                        <a:t>Switching to the right color at the right moment</a:t>
+                      </a:r>
+                    </a:p>
+                  </a:txBody>
+                  <a:tcPr/>
+                </a:tc>
+                <a:extLst>
+                  <a:ext uri="{0D108BD9-81ED-4DB2-BD59-A6C34878D82A}">
+                    <a16:rowId xmlns:a16="http://schemas.microsoft.com/office/drawing/2014/main" val="1507975830"/>
+                  </a:ext>
+                </a:extLst>
+              </a:tr>
+            </a:tbl>
+          </a:graphicData>
+        </a:graphic>
+      </p:graphicFrame>
+      <p:sp>
+        <p:nvSpPr>
+          <p:cNvPr id="6" name="Rectangle 5">
+            <a:extLst>
+              <a:ext uri="{FF2B5EF4-FFF2-40B4-BE49-F238E27FC236}">
+                <a16:creationId xmlns:a16="http://schemas.microsoft.com/office/drawing/2014/main" id="{A7AA08A7-855C-46C6-A0CC-8FFB871E905A}"/>
+              </a:ext>
+            </a:extLst>
+          </p:cNvPr>
+          <p:cNvSpPr/>
+          <p:nvPr/>
+        </p:nvSpPr>
+        <p:spPr>
+          <a:xfrm>
+            <a:off x="1936812" y="4134567"/>
+            <a:ext cx="2095130" cy="1225119"/>
+          </a:xfrm>
+          <a:prstGeom prst="rect">
+            <a:avLst/>
+          </a:prstGeom>
+          <a:ln w="28575">
+            <a:solidFill>
+              <a:schemeClr val="bg1">
+                <a:lumMod val="65000"/>
+              </a:schemeClr>
+            </a:solidFill>
+          </a:ln>
+        </p:spPr>
+        <p:style>
+          <a:lnRef idx="2">
+            <a:schemeClr val="accent1">
+              <a:shade val="50000"/>
+            </a:schemeClr>
+          </a:lnRef>
+          <a:fillRef idx="1">
+            <a:schemeClr val="accent1"/>
+          </a:fillRef>
+          <a:effectRef idx="0">
+            <a:schemeClr val="accent1"/>
+          </a:effectRef>
+          <a:fontRef idx="minor">
+            <a:schemeClr val="lt1"/>
+          </a:fontRef>
+        </p:style>
+        <p:txBody>
+          <a:bodyPr rtlCol="0" anchor="ctr"/>
+          <a:lstStyle/>
+          <a:p>
+            <a:pPr algn="ctr"/>
+            <a:r>
+              <a:rPr lang="en-US" dirty="0"/>
+              <a:t>ATMega 328p</a:t>
+            </a:r>
+          </a:p>
+        </p:txBody>
+      </p:sp>
+      <p:sp>
+        <p:nvSpPr>
+          <p:cNvPr id="7" name="Rectangle 6">
+            <a:extLst>
+              <a:ext uri="{FF2B5EF4-FFF2-40B4-BE49-F238E27FC236}">
+                <a16:creationId xmlns:a16="http://schemas.microsoft.com/office/drawing/2014/main" id="{706A68A0-854B-4475-9EB2-F17B497F89F1}"/>
+              </a:ext>
+            </a:extLst>
+          </p:cNvPr>
+          <p:cNvSpPr/>
+          <p:nvPr/>
+        </p:nvSpPr>
+        <p:spPr>
+          <a:xfrm>
+            <a:off x="5745332" y="4038808"/>
+            <a:ext cx="1890944" cy="1416637"/>
+          </a:xfrm>
+          <a:prstGeom prst="rect">
+            <a:avLst/>
+          </a:prstGeom>
+        </p:spPr>
+        <p:style>
+          <a:lnRef idx="2">
+            <a:schemeClr val="accent1">
+              <a:shade val="50000"/>
+            </a:schemeClr>
+          </a:lnRef>
+          <a:fillRef idx="1">
+            <a:schemeClr val="accent1"/>
+          </a:fillRef>
+          <a:effectRef idx="0">
+            <a:schemeClr val="accent1"/>
+          </a:effectRef>
+          <a:fontRef idx="minor">
+            <a:schemeClr val="lt1"/>
+          </a:fontRef>
+        </p:style>
+        <p:txBody>
+          <a:bodyPr rtlCol="0" anchor="ctr"/>
+          <a:lstStyle/>
+          <a:p>
+            <a:pPr algn="ctr"/>
+            <a:r>
+              <a:rPr lang="en-US" dirty="0"/>
+              <a:t>Demux</a:t>
+            </a:r>
+          </a:p>
+        </p:txBody>
+      </p:sp>
+      <p:sp>
+        <p:nvSpPr>
+          <p:cNvPr id="8" name="Oval 7">
+            <a:extLst>
+              <a:ext uri="{FF2B5EF4-FFF2-40B4-BE49-F238E27FC236}">
+                <a16:creationId xmlns:a16="http://schemas.microsoft.com/office/drawing/2014/main" id="{8C041A73-C041-4650-8986-986256423204}"/>
+              </a:ext>
+            </a:extLst>
+          </p:cNvPr>
+          <p:cNvSpPr/>
+          <p:nvPr/>
+        </p:nvSpPr>
+        <p:spPr>
+          <a:xfrm>
+            <a:off x="9442882" y="4283061"/>
+            <a:ext cx="1083076" cy="1020932"/>
+          </a:xfrm>
+          <a:prstGeom prst="ellipse">
+            <a:avLst/>
+          </a:prstGeom>
+        </p:spPr>
+        <p:style>
+          <a:lnRef idx="2">
+            <a:schemeClr val="accent1">
+              <a:shade val="50000"/>
+            </a:schemeClr>
+          </a:lnRef>
+          <a:fillRef idx="1">
+            <a:schemeClr val="accent1"/>
+          </a:fillRef>
+          <a:effectRef idx="0">
+            <a:schemeClr val="accent1"/>
+          </a:effectRef>
+          <a:fontRef idx="minor">
+            <a:schemeClr val="lt1"/>
+          </a:fontRef>
+        </p:style>
+        <p:txBody>
+          <a:bodyPr rtlCol="0" anchor="ctr"/>
+          <a:lstStyle/>
+          <a:p>
+            <a:pPr algn="ctr"/>
+            <a:r>
+              <a:rPr lang="en-US" dirty="0"/>
+              <a:t>RGB</a:t>
+            </a:r>
+          </a:p>
+          <a:p>
+            <a:pPr algn="ctr"/>
+            <a:r>
+              <a:rPr lang="en-US" dirty="0"/>
+              <a:t>LED</a:t>
+            </a:r>
+          </a:p>
+        </p:txBody>
+      </p:sp>
+      <p:cxnSp>
+        <p:nvCxnSpPr>
+          <p:cNvPr id="10" name="Straight Connector 9">
+            <a:extLst>
+              <a:ext uri="{FF2B5EF4-FFF2-40B4-BE49-F238E27FC236}">
+                <a16:creationId xmlns:a16="http://schemas.microsoft.com/office/drawing/2014/main" id="{17462DC9-1725-48C5-92E7-E48038FE4585}"/>
+              </a:ext>
+            </a:extLst>
+          </p:cNvPr>
+          <p:cNvCxnSpPr/>
+          <p:nvPr/>
+        </p:nvCxnSpPr>
+        <p:spPr>
+          <a:xfrm>
+            <a:off x="4031942" y="4374265"/>
+            <a:ext cx="1762217" cy="0"/>
+          </a:xfrm>
+          <a:prstGeom prst="line">
+            <a:avLst/>
+          </a:prstGeom>
+          <a:ln w="38100" cap="flat" cmpd="sng" algn="ctr">
+            <a:solidFill>
+              <a:schemeClr val="dk1"/>
+            </a:solidFill>
+            <a:prstDash val="solid"/>
+            <a:round/>
+            <a:headEnd type="none" w="med" len="med"/>
+            <a:tailEnd type="arrow" w="med" len="med"/>
+          </a:ln>
+        </p:spPr>
+        <p:style>
+          <a:lnRef idx="0">
+            <a:scrgbClr r="0" g="0" b="0"/>
+          </a:lnRef>
+          <a:fillRef idx="0">
+            <a:scrgbClr r="0" g="0" b="0"/>
+          </a:fillRef>
+          <a:effectRef idx="0">
+            <a:scrgbClr r="0" g="0" b="0"/>
+          </a:effectRef>
+          <a:fontRef idx="minor">
+            <a:schemeClr val="tx1"/>
+          </a:fontRef>
+        </p:style>
+      </p:cxnSp>
+      <p:cxnSp>
+        <p:nvCxnSpPr>
+          <p:cNvPr id="11" name="Straight Connector 10">
+            <a:extLst>
+              <a:ext uri="{FF2B5EF4-FFF2-40B4-BE49-F238E27FC236}">
+                <a16:creationId xmlns:a16="http://schemas.microsoft.com/office/drawing/2014/main" id="{71753C1B-01EF-484B-A699-F7F575D47771}"/>
+              </a:ext>
+            </a:extLst>
+          </p:cNvPr>
+          <p:cNvCxnSpPr/>
+          <p:nvPr/>
+        </p:nvCxnSpPr>
+        <p:spPr>
+          <a:xfrm>
+            <a:off x="4031942" y="4899527"/>
+            <a:ext cx="1762217" cy="0"/>
+          </a:xfrm>
+          <a:prstGeom prst="line">
+            <a:avLst/>
+          </a:prstGeom>
+          <a:ln w="38100" cap="flat" cmpd="sng" algn="ctr">
+            <a:solidFill>
+              <a:schemeClr val="dk1"/>
+            </a:solidFill>
+            <a:prstDash val="solid"/>
+            <a:round/>
+            <a:headEnd type="none" w="med" len="med"/>
+            <a:tailEnd type="arrow" w="med" len="med"/>
+          </a:ln>
+        </p:spPr>
+        <p:style>
+          <a:lnRef idx="0">
+            <a:scrgbClr r="0" g="0" b="0"/>
+          </a:lnRef>
+          <a:fillRef idx="0">
+            <a:scrgbClr r="0" g="0" b="0"/>
+          </a:fillRef>
+          <a:effectRef idx="0">
+            <a:scrgbClr r="0" g="0" b="0"/>
+          </a:effectRef>
+          <a:fontRef idx="minor">
+            <a:schemeClr val="tx1"/>
+          </a:fontRef>
+        </p:style>
+      </p:cxnSp>
+      <p:cxnSp>
+        <p:nvCxnSpPr>
+          <p:cNvPr id="12" name="Straight Connector 11">
+            <a:extLst>
+              <a:ext uri="{FF2B5EF4-FFF2-40B4-BE49-F238E27FC236}">
+                <a16:creationId xmlns:a16="http://schemas.microsoft.com/office/drawing/2014/main" id="{88CB112D-204C-44A6-9510-7DEEEC030A45}"/>
+              </a:ext>
+            </a:extLst>
+          </p:cNvPr>
+          <p:cNvCxnSpPr/>
+          <p:nvPr/>
+        </p:nvCxnSpPr>
+        <p:spPr>
+          <a:xfrm>
+            <a:off x="4031942" y="5131826"/>
+            <a:ext cx="1762217" cy="0"/>
+          </a:xfrm>
+          <a:prstGeom prst="line">
+            <a:avLst/>
+          </a:prstGeom>
+          <a:ln w="38100" cap="flat" cmpd="sng" algn="ctr">
+            <a:solidFill>
+              <a:schemeClr val="dk1"/>
+            </a:solidFill>
+            <a:prstDash val="solid"/>
+            <a:round/>
+            <a:headEnd type="none" w="med" len="med"/>
+            <a:tailEnd type="arrow" w="med" len="med"/>
+          </a:ln>
+        </p:spPr>
+        <p:style>
+          <a:lnRef idx="0">
+            <a:scrgbClr r="0" g="0" b="0"/>
+          </a:lnRef>
+          <a:fillRef idx="0">
+            <a:scrgbClr r="0" g="0" b="0"/>
+          </a:fillRef>
+          <a:effectRef idx="0">
+            <a:scrgbClr r="0" g="0" b="0"/>
+          </a:effectRef>
+          <a:fontRef idx="minor">
+            <a:schemeClr val="tx1"/>
+          </a:fontRef>
+        </p:style>
+      </p:cxnSp>
+      <p:cxnSp>
+        <p:nvCxnSpPr>
+          <p:cNvPr id="13" name="Straight Connector 12">
+            <a:extLst>
+              <a:ext uri="{FF2B5EF4-FFF2-40B4-BE49-F238E27FC236}">
+                <a16:creationId xmlns:a16="http://schemas.microsoft.com/office/drawing/2014/main" id="{A6DF60BE-E871-44D8-8F4D-E48CD81641A6}"/>
+              </a:ext>
+            </a:extLst>
+          </p:cNvPr>
+          <p:cNvCxnSpPr/>
+          <p:nvPr/>
+        </p:nvCxnSpPr>
+        <p:spPr>
+          <a:xfrm>
+            <a:off x="7649224" y="4568626"/>
+            <a:ext cx="1762217" cy="0"/>
+          </a:xfrm>
+          <a:prstGeom prst="line">
+            <a:avLst/>
+          </a:prstGeom>
+          <a:ln w="38100" cap="flat" cmpd="sng" algn="ctr">
+            <a:solidFill>
+              <a:schemeClr val="dk1"/>
+            </a:solidFill>
+            <a:prstDash val="solid"/>
+            <a:round/>
+            <a:headEnd type="none" w="med" len="med"/>
+            <a:tailEnd type="arrow" w="med" len="med"/>
+          </a:ln>
+        </p:spPr>
+        <p:style>
+          <a:lnRef idx="0">
+            <a:scrgbClr r="0" g="0" b="0"/>
+          </a:lnRef>
+          <a:fillRef idx="0">
+            <a:scrgbClr r="0" g="0" b="0"/>
+          </a:fillRef>
+          <a:effectRef idx="0">
+            <a:scrgbClr r="0" g="0" b="0"/>
+          </a:effectRef>
+          <a:fontRef idx="minor">
+            <a:schemeClr val="tx1"/>
+          </a:fontRef>
+        </p:style>
+      </p:cxnSp>
+      <p:cxnSp>
+        <p:nvCxnSpPr>
+          <p:cNvPr id="14" name="Straight Connector 13">
+            <a:extLst>
+              <a:ext uri="{FF2B5EF4-FFF2-40B4-BE49-F238E27FC236}">
+                <a16:creationId xmlns:a16="http://schemas.microsoft.com/office/drawing/2014/main" id="{6185F3E7-4536-4C5E-BED9-112721174C97}"/>
+              </a:ext>
+            </a:extLst>
+          </p:cNvPr>
+          <p:cNvCxnSpPr/>
+          <p:nvPr/>
+        </p:nvCxnSpPr>
+        <p:spPr>
+          <a:xfrm>
+            <a:off x="7649223" y="4800925"/>
+            <a:ext cx="1762217" cy="0"/>
+          </a:xfrm>
+          <a:prstGeom prst="line">
+            <a:avLst/>
+          </a:prstGeom>
+          <a:ln w="38100" cap="flat" cmpd="sng" algn="ctr">
+            <a:solidFill>
+              <a:schemeClr val="dk1"/>
+            </a:solidFill>
+            <a:prstDash val="solid"/>
+            <a:round/>
+            <a:headEnd type="none" w="med" len="med"/>
+            <a:tailEnd type="arrow" w="med" len="med"/>
+          </a:ln>
+        </p:spPr>
+        <p:style>
+          <a:lnRef idx="0">
+            <a:scrgbClr r="0" g="0" b="0"/>
+          </a:lnRef>
+          <a:fillRef idx="0">
+            <a:scrgbClr r="0" g="0" b="0"/>
+          </a:fillRef>
+          <a:effectRef idx="0">
+            <a:scrgbClr r="0" g="0" b="0"/>
+          </a:effectRef>
+          <a:fontRef idx="minor">
+            <a:schemeClr val="tx1"/>
+          </a:fontRef>
+        </p:style>
+      </p:cxnSp>
+      <p:cxnSp>
+        <p:nvCxnSpPr>
+          <p:cNvPr id="15" name="Straight Connector 14">
+            <a:extLst>
+              <a:ext uri="{FF2B5EF4-FFF2-40B4-BE49-F238E27FC236}">
+                <a16:creationId xmlns:a16="http://schemas.microsoft.com/office/drawing/2014/main" id="{219F8204-126F-45F0-A6CC-FBEC8FCFA8FA}"/>
+              </a:ext>
+            </a:extLst>
+          </p:cNvPr>
+          <p:cNvCxnSpPr/>
+          <p:nvPr/>
+        </p:nvCxnSpPr>
+        <p:spPr>
+          <a:xfrm>
+            <a:off x="7649223" y="5040622"/>
+            <a:ext cx="1762217" cy="0"/>
+          </a:xfrm>
+          <a:prstGeom prst="line">
+            <a:avLst/>
+          </a:prstGeom>
+          <a:ln w="38100" cap="flat" cmpd="sng" algn="ctr">
+            <a:solidFill>
+              <a:schemeClr val="dk1"/>
+            </a:solidFill>
+            <a:prstDash val="solid"/>
+            <a:round/>
+            <a:headEnd type="none" w="med" len="med"/>
+            <a:tailEnd type="arrow" w="med" len="med"/>
+          </a:ln>
+        </p:spPr>
+        <p:style>
+          <a:lnRef idx="0">
+            <a:scrgbClr r="0" g="0" b="0"/>
+          </a:lnRef>
+          <a:fillRef idx="0">
+            <a:scrgbClr r="0" g="0" b="0"/>
+          </a:fillRef>
+          <a:effectRef idx="0">
+            <a:scrgbClr r="0" g="0" b="0"/>
+          </a:effectRef>
+          <a:fontRef idx="minor">
+            <a:schemeClr val="tx1"/>
+          </a:fontRef>
+        </p:style>
+      </p:cxnSp>
+      <p:sp>
+        <p:nvSpPr>
+          <p:cNvPr id="16" name="TextBox 15">
+            <a:extLst>
+              <a:ext uri="{FF2B5EF4-FFF2-40B4-BE49-F238E27FC236}">
+                <a16:creationId xmlns:a16="http://schemas.microsoft.com/office/drawing/2014/main" id="{9D85A929-6973-4668-8A62-AAE0B6AB3931}"/>
+              </a:ext>
+            </a:extLst>
+          </p:cNvPr>
+          <p:cNvSpPr txBox="1"/>
+          <p:nvPr/>
+        </p:nvSpPr>
+        <p:spPr>
+          <a:xfrm>
+            <a:off x="4387079" y="4095271"/>
+            <a:ext cx="647934" cy="338554"/>
+          </a:xfrm>
+          <a:prstGeom prst="rect">
+            <a:avLst/>
+          </a:prstGeom>
+          <a:noFill/>
+        </p:spPr>
+        <p:txBody>
+          <a:bodyPr wrap="none" rtlCol="0">
+            <a:spAutoFit/>
+          </a:bodyPr>
+          <a:lstStyle/>
+          <a:p>
+            <a:r>
+              <a:rPr lang="en-US" sz="1600" dirty="0">
+                <a:solidFill>
+                  <a:schemeClr val="tx1">
+                    <a:lumMod val="75000"/>
+                    <a:lumOff val="25000"/>
+                  </a:schemeClr>
+                </a:solidFill>
+              </a:rPr>
+              <a:t>PWM</a:t>
+            </a:r>
+          </a:p>
+        </p:txBody>
+      </p:sp>
+      <p:sp>
+        <p:nvSpPr>
+          <p:cNvPr id="17" name="TextBox 16">
+            <a:extLst>
+              <a:ext uri="{FF2B5EF4-FFF2-40B4-BE49-F238E27FC236}">
+                <a16:creationId xmlns:a16="http://schemas.microsoft.com/office/drawing/2014/main" id="{EF1CA3BF-0BE2-4FEE-8A84-2FD2CD3454AC}"/>
+              </a:ext>
+            </a:extLst>
+          </p:cNvPr>
+          <p:cNvSpPr txBox="1"/>
+          <p:nvPr/>
+        </p:nvSpPr>
+        <p:spPr>
+          <a:xfrm>
+            <a:off x="4138599" y="4831937"/>
+            <a:ext cx="1406860" cy="338554"/>
+          </a:xfrm>
+          <a:prstGeom prst="rect">
+            <a:avLst/>
+          </a:prstGeom>
+          <a:noFill/>
+        </p:spPr>
+        <p:txBody>
+          <a:bodyPr wrap="none" rtlCol="0">
+            <a:spAutoFit/>
+          </a:bodyPr>
+          <a:lstStyle/>
+          <a:p>
+            <a:r>
+              <a:rPr lang="en-US" sz="1600" dirty="0">
+                <a:solidFill>
+                  <a:schemeClr val="tx1">
+                    <a:lumMod val="75000"/>
+                    <a:lumOff val="25000"/>
+                  </a:schemeClr>
+                </a:solidFill>
+              </a:rPr>
+              <a:t>Digital outputs</a:t>
+            </a:r>
+          </a:p>
+        </p:txBody>
+      </p:sp>
+      <p:sp>
+        <p:nvSpPr>
+          <p:cNvPr id="18" name="TextBox 17">
+            <a:extLst>
+              <a:ext uri="{FF2B5EF4-FFF2-40B4-BE49-F238E27FC236}">
+                <a16:creationId xmlns:a16="http://schemas.microsoft.com/office/drawing/2014/main" id="{AA605A1E-B703-4F24-8696-35C9989B932A}"/>
+              </a:ext>
+            </a:extLst>
+          </p:cNvPr>
+          <p:cNvSpPr txBox="1"/>
+          <p:nvPr/>
+        </p:nvSpPr>
+        <p:spPr>
+          <a:xfrm>
+            <a:off x="6260237" y="5555774"/>
+            <a:ext cx="1105248" cy="738664"/>
+          </a:xfrm>
+          <a:prstGeom prst="rect">
+            <a:avLst/>
+          </a:prstGeom>
+          <a:noFill/>
+        </p:spPr>
+        <p:txBody>
+          <a:bodyPr wrap="square" rtlCol="0">
+            <a:spAutoFit/>
+          </a:bodyPr>
+          <a:lstStyle/>
+          <a:p>
+            <a:r>
+              <a:rPr lang="en-US" sz="1400" dirty="0"/>
+              <a:t>00 </a:t>
+            </a:r>
+            <a:r>
+              <a:rPr lang="en-US" sz="1400" dirty="0">
+                <a:sym typeface="Wingdings" panose="05000000000000000000" pitchFamily="2" charset="2"/>
+              </a:rPr>
+              <a:t></a:t>
+            </a:r>
+            <a:r>
+              <a:rPr lang="en-US" sz="1400" dirty="0"/>
+              <a:t> Red</a:t>
+            </a:r>
+          </a:p>
+          <a:p>
+            <a:r>
+              <a:rPr lang="en-US" sz="1400" dirty="0"/>
+              <a:t>01 </a:t>
+            </a:r>
+            <a:r>
+              <a:rPr lang="en-US" sz="1400" dirty="0">
+                <a:sym typeface="Wingdings" panose="05000000000000000000" pitchFamily="2" charset="2"/>
+              </a:rPr>
+              <a:t></a:t>
+            </a:r>
+            <a:r>
+              <a:rPr lang="en-US" sz="1400" dirty="0"/>
+              <a:t> Green</a:t>
+            </a:r>
+          </a:p>
+          <a:p>
+            <a:r>
+              <a:rPr lang="en-US" sz="1400" dirty="0"/>
+              <a:t>10 </a:t>
+            </a:r>
+            <a:r>
+              <a:rPr lang="en-US" sz="1400" dirty="0">
+                <a:sym typeface="Wingdings" panose="05000000000000000000" pitchFamily="2" charset="2"/>
+              </a:rPr>
+              <a:t></a:t>
+            </a:r>
+            <a:r>
+              <a:rPr lang="en-US" sz="1400" dirty="0"/>
+              <a:t> Blue</a:t>
+            </a:r>
+          </a:p>
+        </p:txBody>
+      </p:sp>
+      <p:cxnSp>
+        <p:nvCxnSpPr>
+          <p:cNvPr id="20" name="Straight Connector 19">
+            <a:extLst>
+              <a:ext uri="{FF2B5EF4-FFF2-40B4-BE49-F238E27FC236}">
+                <a16:creationId xmlns:a16="http://schemas.microsoft.com/office/drawing/2014/main" id="{241599CB-3B84-4FAB-BFF8-002574E7BE7C}"/>
+              </a:ext>
+            </a:extLst>
+          </p:cNvPr>
+          <p:cNvCxnSpPr>
+            <a:cxnSpLocks/>
+            <a:stCxn id="8" idx="6"/>
+          </p:cNvCxnSpPr>
+          <p:nvPr/>
+        </p:nvCxnSpPr>
+        <p:spPr>
+          <a:xfrm>
+            <a:off x="10525958" y="4793527"/>
+            <a:ext cx="535619" cy="0"/>
+          </a:xfrm>
+          <a:prstGeom prst="line">
+            <a:avLst/>
+          </a:prstGeom>
+          <a:ln w="28575"/>
+        </p:spPr>
+        <p:style>
+          <a:lnRef idx="3">
+            <a:schemeClr val="dk1"/>
+          </a:lnRef>
+          <a:fillRef idx="0">
+            <a:schemeClr val="dk1"/>
+          </a:fillRef>
+          <a:effectRef idx="2">
+            <a:schemeClr val="dk1"/>
+          </a:effectRef>
+          <a:fontRef idx="minor">
+            <a:schemeClr val="tx1"/>
+          </a:fontRef>
+        </p:style>
+      </p:cxnSp>
+      <p:cxnSp>
+        <p:nvCxnSpPr>
+          <p:cNvPr id="22" name="Straight Connector 21">
+            <a:extLst>
+              <a:ext uri="{FF2B5EF4-FFF2-40B4-BE49-F238E27FC236}">
+                <a16:creationId xmlns:a16="http://schemas.microsoft.com/office/drawing/2014/main" id="{55A5A11C-2FF7-4A7F-B211-F09D39DFABF2}"/>
+              </a:ext>
+            </a:extLst>
+          </p:cNvPr>
+          <p:cNvCxnSpPr>
+            <a:cxnSpLocks/>
+          </p:cNvCxnSpPr>
+          <p:nvPr/>
+        </p:nvCxnSpPr>
+        <p:spPr>
+          <a:xfrm>
+            <a:off x="11050851" y="4780743"/>
+            <a:ext cx="0" cy="447945"/>
+          </a:xfrm>
+          <a:prstGeom prst="line">
+            <a:avLst/>
+          </a:prstGeom>
+          <a:ln w="38100" cap="flat" cmpd="sng" algn="ctr">
+            <a:solidFill>
+              <a:schemeClr val="dk1"/>
+            </a:solidFill>
+            <a:prstDash val="solid"/>
+            <a:round/>
+            <a:headEnd type="none" w="med" len="med"/>
+            <a:tailEnd type="arrow" w="med" len="med"/>
+          </a:ln>
+        </p:spPr>
+        <p:style>
+          <a:lnRef idx="0">
+            <a:scrgbClr r="0" g="0" b="0"/>
+          </a:lnRef>
+          <a:fillRef idx="0">
+            <a:scrgbClr r="0" g="0" b="0"/>
+          </a:fillRef>
+          <a:effectRef idx="0">
+            <a:scrgbClr r="0" g="0" b="0"/>
+          </a:effectRef>
+          <a:fontRef idx="minor">
+            <a:schemeClr val="tx1"/>
+          </a:fontRef>
+        </p:style>
+      </p:cxnSp>
+      <p:sp>
+        <p:nvSpPr>
+          <p:cNvPr id="26" name="TextBox 25">
+            <a:extLst>
+              <a:ext uri="{FF2B5EF4-FFF2-40B4-BE49-F238E27FC236}">
+                <a16:creationId xmlns:a16="http://schemas.microsoft.com/office/drawing/2014/main" id="{9235815F-8E77-4184-9361-8FF544974138}"/>
+              </a:ext>
+            </a:extLst>
+          </p:cNvPr>
+          <p:cNvSpPr txBox="1"/>
+          <p:nvPr/>
+        </p:nvSpPr>
+        <p:spPr>
+          <a:xfrm>
+            <a:off x="8353415" y="4539107"/>
+            <a:ext cx="314510" cy="338554"/>
+          </a:xfrm>
+          <a:prstGeom prst="rect">
+            <a:avLst/>
+          </a:prstGeom>
+          <a:noFill/>
+        </p:spPr>
+        <p:txBody>
+          <a:bodyPr wrap="none" rtlCol="0">
+            <a:spAutoFit/>
+          </a:bodyPr>
+          <a:lstStyle/>
+          <a:p>
+            <a:r>
+              <a:rPr lang="en-US" sz="1600" dirty="0">
+                <a:solidFill>
+                  <a:schemeClr val="tx1">
+                    <a:lumMod val="75000"/>
+                    <a:lumOff val="25000"/>
+                  </a:schemeClr>
+                </a:solidFill>
+              </a:rPr>
+              <a:t>G</a:t>
+            </a:r>
+          </a:p>
+        </p:txBody>
+      </p:sp>
+      <p:sp>
+        <p:nvSpPr>
+          <p:cNvPr id="28" name="TextBox 27">
+            <a:extLst>
+              <a:ext uri="{FF2B5EF4-FFF2-40B4-BE49-F238E27FC236}">
+                <a16:creationId xmlns:a16="http://schemas.microsoft.com/office/drawing/2014/main" id="{49EDDC61-D76B-49CC-A533-245565C7C62A}"/>
+              </a:ext>
+            </a:extLst>
+          </p:cNvPr>
+          <p:cNvSpPr txBox="1"/>
+          <p:nvPr/>
+        </p:nvSpPr>
+        <p:spPr>
+          <a:xfrm>
+            <a:off x="8335736" y="5026653"/>
+            <a:ext cx="296876" cy="338554"/>
+          </a:xfrm>
+          <a:prstGeom prst="rect">
+            <a:avLst/>
+          </a:prstGeom>
+          <a:noFill/>
+        </p:spPr>
+        <p:txBody>
+          <a:bodyPr wrap="none" rtlCol="0">
+            <a:spAutoFit/>
+          </a:bodyPr>
+          <a:lstStyle/>
+          <a:p>
+            <a:r>
+              <a:rPr lang="en-US" sz="1600" dirty="0">
+                <a:solidFill>
+                  <a:schemeClr val="tx1">
+                    <a:lumMod val="75000"/>
+                    <a:lumOff val="25000"/>
+                  </a:schemeClr>
+                </a:solidFill>
+              </a:rPr>
+              <a:t>B</a:t>
+            </a:r>
+          </a:p>
+        </p:txBody>
+      </p:sp>
+      <p:sp>
+        <p:nvSpPr>
+          <p:cNvPr id="29" name="TextBox 28">
+            <a:extLst>
+              <a:ext uri="{FF2B5EF4-FFF2-40B4-BE49-F238E27FC236}">
+                <a16:creationId xmlns:a16="http://schemas.microsoft.com/office/drawing/2014/main" id="{C6D80B6E-58A9-41B4-8976-ECACDCBA02A6}"/>
+              </a:ext>
+            </a:extLst>
+          </p:cNvPr>
+          <p:cNvSpPr txBox="1"/>
+          <p:nvPr/>
+        </p:nvSpPr>
+        <p:spPr>
+          <a:xfrm>
+            <a:off x="8353415" y="4216686"/>
+            <a:ext cx="296876" cy="338554"/>
+          </a:xfrm>
+          <a:prstGeom prst="rect">
+            <a:avLst/>
+          </a:prstGeom>
+          <a:noFill/>
+        </p:spPr>
+        <p:txBody>
+          <a:bodyPr wrap="none" rtlCol="0">
+            <a:spAutoFit/>
+          </a:bodyPr>
+          <a:lstStyle/>
+          <a:p>
+            <a:r>
+              <a:rPr lang="en-US" sz="1600" dirty="0">
+                <a:solidFill>
+                  <a:schemeClr val="tx1">
+                    <a:lumMod val="75000"/>
+                    <a:lumOff val="25000"/>
+                  </a:schemeClr>
+                </a:solidFill>
+              </a:rPr>
+              <a:t>R</a:t>
+            </a:r>
+          </a:p>
+        </p:txBody>
+      </p:sp>
+      <p:sp>
+        <p:nvSpPr>
+          <p:cNvPr id="30" name="TextBox 29">
+            <a:extLst>
+              <a:ext uri="{FF2B5EF4-FFF2-40B4-BE49-F238E27FC236}">
+                <a16:creationId xmlns:a16="http://schemas.microsoft.com/office/drawing/2014/main" id="{DF0A5415-4D91-42BF-A5C1-983445709447}"/>
+              </a:ext>
+            </a:extLst>
+          </p:cNvPr>
+          <p:cNvSpPr txBox="1"/>
+          <p:nvPr/>
+        </p:nvSpPr>
+        <p:spPr>
+          <a:xfrm>
+            <a:off x="11093396" y="5001214"/>
+            <a:ext cx="574196" cy="338554"/>
+          </a:xfrm>
+          <a:prstGeom prst="rect">
+            <a:avLst/>
+          </a:prstGeom>
+          <a:noFill/>
+        </p:spPr>
+        <p:txBody>
+          <a:bodyPr wrap="none" rtlCol="0">
+            <a:spAutoFit/>
+          </a:bodyPr>
+          <a:lstStyle/>
+          <a:p>
+            <a:r>
+              <a:rPr lang="en-US" sz="1600" dirty="0">
+                <a:solidFill>
+                  <a:schemeClr val="tx1">
+                    <a:lumMod val="75000"/>
+                    <a:lumOff val="25000"/>
+                  </a:schemeClr>
+                </a:solidFill>
+              </a:rPr>
+              <a:t>GND</a:t>
+            </a:r>
+          </a:p>
+        </p:txBody>
+      </p:sp>
+      <p:sp>
+        <p:nvSpPr>
+          <p:cNvPr id="31" name="Arrow: Curved Right 30">
+            <a:extLst>
+              <a:ext uri="{FF2B5EF4-FFF2-40B4-BE49-F238E27FC236}">
+                <a16:creationId xmlns:a16="http://schemas.microsoft.com/office/drawing/2014/main" id="{E044ABA1-8BAE-4116-B8C7-897B43EC7B48}"/>
+              </a:ext>
+            </a:extLst>
+          </p:cNvPr>
+          <p:cNvSpPr/>
+          <p:nvPr/>
+        </p:nvSpPr>
+        <p:spPr>
+          <a:xfrm rot="10516256">
+            <a:off x="7350672" y="5699610"/>
+            <a:ext cx="200815" cy="484938"/>
+          </a:xfrm>
+          <a:prstGeom prst="curvedRightArrow">
+            <a:avLst/>
+          </a:prstGeom>
+        </p:spPr>
+        <p:style>
+          <a:lnRef idx="2">
+            <a:schemeClr val="accent1">
+              <a:shade val="50000"/>
+            </a:schemeClr>
+          </a:lnRef>
+          <a:fillRef idx="1">
+            <a:schemeClr val="accent1"/>
+          </a:fillRef>
+          <a:effectRef idx="0">
+            <a:schemeClr val="accent1"/>
+          </a:effectRef>
+          <a:fontRef idx="minor">
+            <a:schemeClr val="lt1"/>
+          </a:fontRef>
+        </p:style>
+        <p:txBody>
+          <a:bodyPr rtlCol="0" anchor="ctr"/>
+          <a:lstStyle/>
+          <a:p>
+            <a:pPr algn="ctr"/>
+            <a:endParaRPr lang="en-US">
+              <a:solidFill>
+                <a:schemeClr val="tx1"/>
+              </a:solidFill>
+            </a:endParaRPr>
+          </a:p>
+        </p:txBody>
+      </p:sp>
+      <p:sp>
+        <p:nvSpPr>
+          <p:cNvPr id="32" name="Arrow: Curved Right 31">
+            <a:extLst>
+              <a:ext uri="{FF2B5EF4-FFF2-40B4-BE49-F238E27FC236}">
+                <a16:creationId xmlns:a16="http://schemas.microsoft.com/office/drawing/2014/main" id="{0560F1B6-D142-47EF-9D7E-31B3925BA4D6}"/>
+              </a:ext>
+            </a:extLst>
+          </p:cNvPr>
+          <p:cNvSpPr/>
+          <p:nvPr/>
+        </p:nvSpPr>
+        <p:spPr>
+          <a:xfrm rot="21396345">
+            <a:off x="5942682" y="5721617"/>
+            <a:ext cx="217902" cy="481329"/>
+          </a:xfrm>
+          <a:prstGeom prst="curvedRightArrow">
+            <a:avLst/>
+          </a:prstGeom>
+        </p:spPr>
+        <p:style>
+          <a:lnRef idx="2">
+            <a:schemeClr val="accent1">
+              <a:shade val="50000"/>
+            </a:schemeClr>
+          </a:lnRef>
+          <a:fillRef idx="1">
+            <a:schemeClr val="accent1"/>
+          </a:fillRef>
+          <a:effectRef idx="0">
+            <a:schemeClr val="accent1"/>
+          </a:effectRef>
+          <a:fontRef idx="minor">
+            <a:schemeClr val="lt1"/>
+          </a:fontRef>
+        </p:style>
+        <p:txBody>
+          <a:bodyPr rtlCol="0" anchor="ctr"/>
+          <a:lstStyle/>
+          <a:p>
+            <a:pPr algn="ctr"/>
+            <a:endParaRPr lang="en-US">
+              <a:solidFill>
+                <a:schemeClr val="tx1"/>
+              </a:solidFill>
+            </a:endParaRPr>
           </a:p>
         </p:txBody>
       </p:sp>
@@ -6452,6 +7592,2292 @@
     <p:extLst>
       <p:ext uri="{BB962C8B-B14F-4D97-AF65-F5344CB8AC3E}">
         <p14:creationId xmlns:p14="http://schemas.microsoft.com/office/powerpoint/2010/main" val="231301543"/>
+      </p:ext>
+    </p:extLst>
+  </p:cSld>
+  <p:clrMapOvr>
+    <a:masterClrMapping/>
+  </p:clrMapOvr>
+  <p:timing>
+    <p:tnLst>
+      <p:par>
+        <p:cTn id="1" dur="indefinite" restart="never" nodeType="tmRoot">
+          <p:childTnLst>
+            <p:seq concurrent="1" nextAc="seek">
+              <p:cTn id="2" dur="indefinite" nodeType="mainSeq">
+                <p:childTnLst>
+                  <p:par>
+                    <p:cTn id="3" fill="hold">
+                      <p:stCondLst>
+                        <p:cond delay="indefinite"/>
+                      </p:stCondLst>
+                      <p:childTnLst>
+                        <p:par>
+                          <p:cTn id="4" fill="hold">
+                            <p:stCondLst>
+                              <p:cond delay="0"/>
+                            </p:stCondLst>
+                            <p:childTnLst>
+                              <p:par>
+                                <p:cTn id="5" presetID="10" presetClass="entr" presetSubtype="0" fill="hold" grpId="0" nodeType="clickEffect">
+                                  <p:stCondLst>
+                                    <p:cond delay="0"/>
+                                  </p:stCondLst>
+                                  <p:childTnLst>
+                                    <p:set>
+                                      <p:cBhvr>
+                                        <p:cTn id="6" dur="1" fill="hold">
+                                          <p:stCondLst>
+                                            <p:cond delay="0"/>
+                                          </p:stCondLst>
+                                        </p:cTn>
+                                        <p:tgtEl>
+                                          <p:spTgt spid="6"/>
+                                        </p:tgtEl>
+                                        <p:attrNameLst>
+                                          <p:attrName>style.visibility</p:attrName>
+                                        </p:attrNameLst>
+                                      </p:cBhvr>
+                                      <p:to>
+                                        <p:strVal val="visible"/>
+                                      </p:to>
+                                    </p:set>
+                                    <p:animEffect transition="in" filter="fade">
+                                      <p:cBhvr>
+                                        <p:cTn id="7" dur="2000"/>
+                                        <p:tgtEl>
+                                          <p:spTgt spid="6"/>
+                                        </p:tgtEl>
+                                      </p:cBhvr>
+                                    </p:animEffect>
+                                  </p:childTnLst>
+                                </p:cTn>
+                              </p:par>
+                              <p:par>
+                                <p:cTn id="8" presetID="10" presetClass="entr" presetSubtype="0" fill="hold" grpId="0" nodeType="withEffect">
+                                  <p:stCondLst>
+                                    <p:cond delay="0"/>
+                                  </p:stCondLst>
+                                  <p:childTnLst>
+                                    <p:set>
+                                      <p:cBhvr>
+                                        <p:cTn id="9" dur="1" fill="hold">
+                                          <p:stCondLst>
+                                            <p:cond delay="0"/>
+                                          </p:stCondLst>
+                                        </p:cTn>
+                                        <p:tgtEl>
+                                          <p:spTgt spid="7"/>
+                                        </p:tgtEl>
+                                        <p:attrNameLst>
+                                          <p:attrName>style.visibility</p:attrName>
+                                        </p:attrNameLst>
+                                      </p:cBhvr>
+                                      <p:to>
+                                        <p:strVal val="visible"/>
+                                      </p:to>
+                                    </p:set>
+                                    <p:animEffect transition="in" filter="fade">
+                                      <p:cBhvr>
+                                        <p:cTn id="10" dur="2000"/>
+                                        <p:tgtEl>
+                                          <p:spTgt spid="7"/>
+                                        </p:tgtEl>
+                                      </p:cBhvr>
+                                    </p:animEffect>
+                                  </p:childTnLst>
+                                </p:cTn>
+                              </p:par>
+                              <p:par>
+                                <p:cTn id="11" presetID="10" presetClass="entr" presetSubtype="0" fill="hold" grpId="0" nodeType="withEffect">
+                                  <p:stCondLst>
+                                    <p:cond delay="0"/>
+                                  </p:stCondLst>
+                                  <p:childTnLst>
+                                    <p:set>
+                                      <p:cBhvr>
+                                        <p:cTn id="12" dur="1" fill="hold">
+                                          <p:stCondLst>
+                                            <p:cond delay="0"/>
+                                          </p:stCondLst>
+                                        </p:cTn>
+                                        <p:tgtEl>
+                                          <p:spTgt spid="8"/>
+                                        </p:tgtEl>
+                                        <p:attrNameLst>
+                                          <p:attrName>style.visibility</p:attrName>
+                                        </p:attrNameLst>
+                                      </p:cBhvr>
+                                      <p:to>
+                                        <p:strVal val="visible"/>
+                                      </p:to>
+                                    </p:set>
+                                    <p:animEffect transition="in" filter="fade">
+                                      <p:cBhvr>
+                                        <p:cTn id="13" dur="2000"/>
+                                        <p:tgtEl>
+                                          <p:spTgt spid="8"/>
+                                        </p:tgtEl>
+                                      </p:cBhvr>
+                                    </p:animEffect>
+                                  </p:childTnLst>
+                                </p:cTn>
+                              </p:par>
+                            </p:childTnLst>
+                          </p:cTn>
+                        </p:par>
+                      </p:childTnLst>
+                    </p:cTn>
+                  </p:par>
+                  <p:par>
+                    <p:cTn id="14" fill="hold">
+                      <p:stCondLst>
+                        <p:cond delay="indefinite"/>
+                      </p:stCondLst>
+                      <p:childTnLst>
+                        <p:par>
+                          <p:cTn id="15" fill="hold">
+                            <p:stCondLst>
+                              <p:cond delay="0"/>
+                            </p:stCondLst>
+                            <p:childTnLst>
+                              <p:par>
+                                <p:cTn id="16" presetID="10" presetClass="entr" presetSubtype="0" fill="hold" grpId="0" nodeType="clickEffect">
+                                  <p:stCondLst>
+                                    <p:cond delay="0"/>
+                                  </p:stCondLst>
+                                  <p:childTnLst>
+                                    <p:set>
+                                      <p:cBhvr>
+                                        <p:cTn id="17" dur="1" fill="hold">
+                                          <p:stCondLst>
+                                            <p:cond delay="0"/>
+                                          </p:stCondLst>
+                                        </p:cTn>
+                                        <p:tgtEl>
+                                          <p:spTgt spid="16"/>
+                                        </p:tgtEl>
+                                        <p:attrNameLst>
+                                          <p:attrName>style.visibility</p:attrName>
+                                        </p:attrNameLst>
+                                      </p:cBhvr>
+                                      <p:to>
+                                        <p:strVal val="visible"/>
+                                      </p:to>
+                                    </p:set>
+                                    <p:animEffect transition="in" filter="fade">
+                                      <p:cBhvr>
+                                        <p:cTn id="18" dur="2500"/>
+                                        <p:tgtEl>
+                                          <p:spTgt spid="16"/>
+                                        </p:tgtEl>
+                                      </p:cBhvr>
+                                    </p:animEffect>
+                                  </p:childTnLst>
+                                </p:cTn>
+                              </p:par>
+                              <p:par>
+                                <p:cTn id="19" presetID="10" presetClass="entr" presetSubtype="0" fill="hold" nodeType="withEffect">
+                                  <p:stCondLst>
+                                    <p:cond delay="0"/>
+                                  </p:stCondLst>
+                                  <p:childTnLst>
+                                    <p:set>
+                                      <p:cBhvr>
+                                        <p:cTn id="20" dur="1" fill="hold">
+                                          <p:stCondLst>
+                                            <p:cond delay="0"/>
+                                          </p:stCondLst>
+                                        </p:cTn>
+                                        <p:tgtEl>
+                                          <p:spTgt spid="10"/>
+                                        </p:tgtEl>
+                                        <p:attrNameLst>
+                                          <p:attrName>style.visibility</p:attrName>
+                                        </p:attrNameLst>
+                                      </p:cBhvr>
+                                      <p:to>
+                                        <p:strVal val="visible"/>
+                                      </p:to>
+                                    </p:set>
+                                    <p:animEffect transition="in" filter="fade">
+                                      <p:cBhvr>
+                                        <p:cTn id="21" dur="2500"/>
+                                        <p:tgtEl>
+                                          <p:spTgt spid="10"/>
+                                        </p:tgtEl>
+                                      </p:cBhvr>
+                                    </p:animEffect>
+                                  </p:childTnLst>
+                                </p:cTn>
+                              </p:par>
+                              <p:par>
+                                <p:cTn id="22" presetID="10" presetClass="entr" presetSubtype="0" fill="hold" grpId="0" nodeType="withEffect">
+                                  <p:stCondLst>
+                                    <p:cond delay="0"/>
+                                  </p:stCondLst>
+                                  <p:childTnLst>
+                                    <p:set>
+                                      <p:cBhvr>
+                                        <p:cTn id="23" dur="1" fill="hold">
+                                          <p:stCondLst>
+                                            <p:cond delay="0"/>
+                                          </p:stCondLst>
+                                        </p:cTn>
+                                        <p:tgtEl>
+                                          <p:spTgt spid="17"/>
+                                        </p:tgtEl>
+                                        <p:attrNameLst>
+                                          <p:attrName>style.visibility</p:attrName>
+                                        </p:attrNameLst>
+                                      </p:cBhvr>
+                                      <p:to>
+                                        <p:strVal val="visible"/>
+                                      </p:to>
+                                    </p:set>
+                                    <p:animEffect transition="in" filter="fade">
+                                      <p:cBhvr>
+                                        <p:cTn id="24" dur="2500"/>
+                                        <p:tgtEl>
+                                          <p:spTgt spid="17"/>
+                                        </p:tgtEl>
+                                      </p:cBhvr>
+                                    </p:animEffect>
+                                  </p:childTnLst>
+                                </p:cTn>
+                              </p:par>
+                              <p:par>
+                                <p:cTn id="25" presetID="10" presetClass="entr" presetSubtype="0" fill="hold" nodeType="withEffect">
+                                  <p:stCondLst>
+                                    <p:cond delay="0"/>
+                                  </p:stCondLst>
+                                  <p:childTnLst>
+                                    <p:set>
+                                      <p:cBhvr>
+                                        <p:cTn id="26" dur="1" fill="hold">
+                                          <p:stCondLst>
+                                            <p:cond delay="0"/>
+                                          </p:stCondLst>
+                                        </p:cTn>
+                                        <p:tgtEl>
+                                          <p:spTgt spid="11"/>
+                                        </p:tgtEl>
+                                        <p:attrNameLst>
+                                          <p:attrName>style.visibility</p:attrName>
+                                        </p:attrNameLst>
+                                      </p:cBhvr>
+                                      <p:to>
+                                        <p:strVal val="visible"/>
+                                      </p:to>
+                                    </p:set>
+                                    <p:animEffect transition="in" filter="fade">
+                                      <p:cBhvr>
+                                        <p:cTn id="27" dur="2500"/>
+                                        <p:tgtEl>
+                                          <p:spTgt spid="11"/>
+                                        </p:tgtEl>
+                                      </p:cBhvr>
+                                    </p:animEffect>
+                                  </p:childTnLst>
+                                </p:cTn>
+                              </p:par>
+                              <p:par>
+                                <p:cTn id="28" presetID="10" presetClass="entr" presetSubtype="0" fill="hold" nodeType="withEffect">
+                                  <p:stCondLst>
+                                    <p:cond delay="0"/>
+                                  </p:stCondLst>
+                                  <p:childTnLst>
+                                    <p:set>
+                                      <p:cBhvr>
+                                        <p:cTn id="29" dur="1" fill="hold">
+                                          <p:stCondLst>
+                                            <p:cond delay="0"/>
+                                          </p:stCondLst>
+                                        </p:cTn>
+                                        <p:tgtEl>
+                                          <p:spTgt spid="12"/>
+                                        </p:tgtEl>
+                                        <p:attrNameLst>
+                                          <p:attrName>style.visibility</p:attrName>
+                                        </p:attrNameLst>
+                                      </p:cBhvr>
+                                      <p:to>
+                                        <p:strVal val="visible"/>
+                                      </p:to>
+                                    </p:set>
+                                    <p:animEffect transition="in" filter="fade">
+                                      <p:cBhvr>
+                                        <p:cTn id="30" dur="2500"/>
+                                        <p:tgtEl>
+                                          <p:spTgt spid="12"/>
+                                        </p:tgtEl>
+                                      </p:cBhvr>
+                                    </p:animEffect>
+                                  </p:childTnLst>
+                                </p:cTn>
+                              </p:par>
+                              <p:par>
+                                <p:cTn id="31" presetID="10" presetClass="entr" presetSubtype="0" fill="hold" grpId="0" nodeType="withEffect">
+                                  <p:stCondLst>
+                                    <p:cond delay="0"/>
+                                  </p:stCondLst>
+                                  <p:childTnLst>
+                                    <p:set>
+                                      <p:cBhvr>
+                                        <p:cTn id="32" dur="1" fill="hold">
+                                          <p:stCondLst>
+                                            <p:cond delay="0"/>
+                                          </p:stCondLst>
+                                        </p:cTn>
+                                        <p:tgtEl>
+                                          <p:spTgt spid="28"/>
+                                        </p:tgtEl>
+                                        <p:attrNameLst>
+                                          <p:attrName>style.visibility</p:attrName>
+                                        </p:attrNameLst>
+                                      </p:cBhvr>
+                                      <p:to>
+                                        <p:strVal val="visible"/>
+                                      </p:to>
+                                    </p:set>
+                                    <p:animEffect transition="in" filter="fade">
+                                      <p:cBhvr>
+                                        <p:cTn id="33" dur="2500"/>
+                                        <p:tgtEl>
+                                          <p:spTgt spid="28"/>
+                                        </p:tgtEl>
+                                      </p:cBhvr>
+                                    </p:animEffect>
+                                  </p:childTnLst>
+                                </p:cTn>
+                              </p:par>
+                              <p:par>
+                                <p:cTn id="34" presetID="10" presetClass="entr" presetSubtype="0" fill="hold" grpId="0" nodeType="withEffect">
+                                  <p:stCondLst>
+                                    <p:cond delay="0"/>
+                                  </p:stCondLst>
+                                  <p:childTnLst>
+                                    <p:set>
+                                      <p:cBhvr>
+                                        <p:cTn id="35" dur="1" fill="hold">
+                                          <p:stCondLst>
+                                            <p:cond delay="0"/>
+                                          </p:stCondLst>
+                                        </p:cTn>
+                                        <p:tgtEl>
+                                          <p:spTgt spid="26"/>
+                                        </p:tgtEl>
+                                        <p:attrNameLst>
+                                          <p:attrName>style.visibility</p:attrName>
+                                        </p:attrNameLst>
+                                      </p:cBhvr>
+                                      <p:to>
+                                        <p:strVal val="visible"/>
+                                      </p:to>
+                                    </p:set>
+                                    <p:animEffect transition="in" filter="fade">
+                                      <p:cBhvr>
+                                        <p:cTn id="36" dur="2500"/>
+                                        <p:tgtEl>
+                                          <p:spTgt spid="26"/>
+                                        </p:tgtEl>
+                                      </p:cBhvr>
+                                    </p:animEffect>
+                                  </p:childTnLst>
+                                </p:cTn>
+                              </p:par>
+                              <p:par>
+                                <p:cTn id="37" presetID="10" presetClass="entr" presetSubtype="0" fill="hold" grpId="0" nodeType="withEffect">
+                                  <p:stCondLst>
+                                    <p:cond delay="0"/>
+                                  </p:stCondLst>
+                                  <p:childTnLst>
+                                    <p:set>
+                                      <p:cBhvr>
+                                        <p:cTn id="38" dur="1" fill="hold">
+                                          <p:stCondLst>
+                                            <p:cond delay="0"/>
+                                          </p:stCondLst>
+                                        </p:cTn>
+                                        <p:tgtEl>
+                                          <p:spTgt spid="29"/>
+                                        </p:tgtEl>
+                                        <p:attrNameLst>
+                                          <p:attrName>style.visibility</p:attrName>
+                                        </p:attrNameLst>
+                                      </p:cBhvr>
+                                      <p:to>
+                                        <p:strVal val="visible"/>
+                                      </p:to>
+                                    </p:set>
+                                    <p:animEffect transition="in" filter="fade">
+                                      <p:cBhvr>
+                                        <p:cTn id="39" dur="2500"/>
+                                        <p:tgtEl>
+                                          <p:spTgt spid="29"/>
+                                        </p:tgtEl>
+                                      </p:cBhvr>
+                                    </p:animEffect>
+                                  </p:childTnLst>
+                                </p:cTn>
+                              </p:par>
+                              <p:par>
+                                <p:cTn id="40" presetID="10" presetClass="entr" presetSubtype="0" fill="hold" nodeType="withEffect">
+                                  <p:stCondLst>
+                                    <p:cond delay="0"/>
+                                  </p:stCondLst>
+                                  <p:childTnLst>
+                                    <p:set>
+                                      <p:cBhvr>
+                                        <p:cTn id="41" dur="1" fill="hold">
+                                          <p:stCondLst>
+                                            <p:cond delay="0"/>
+                                          </p:stCondLst>
+                                        </p:cTn>
+                                        <p:tgtEl>
+                                          <p:spTgt spid="13"/>
+                                        </p:tgtEl>
+                                        <p:attrNameLst>
+                                          <p:attrName>style.visibility</p:attrName>
+                                        </p:attrNameLst>
+                                      </p:cBhvr>
+                                      <p:to>
+                                        <p:strVal val="visible"/>
+                                      </p:to>
+                                    </p:set>
+                                    <p:animEffect transition="in" filter="fade">
+                                      <p:cBhvr>
+                                        <p:cTn id="42" dur="2500"/>
+                                        <p:tgtEl>
+                                          <p:spTgt spid="13"/>
+                                        </p:tgtEl>
+                                      </p:cBhvr>
+                                    </p:animEffect>
+                                  </p:childTnLst>
+                                </p:cTn>
+                              </p:par>
+                              <p:par>
+                                <p:cTn id="43" presetID="10" presetClass="entr" presetSubtype="0" fill="hold" nodeType="withEffect">
+                                  <p:stCondLst>
+                                    <p:cond delay="0"/>
+                                  </p:stCondLst>
+                                  <p:childTnLst>
+                                    <p:set>
+                                      <p:cBhvr>
+                                        <p:cTn id="44" dur="1" fill="hold">
+                                          <p:stCondLst>
+                                            <p:cond delay="0"/>
+                                          </p:stCondLst>
+                                        </p:cTn>
+                                        <p:tgtEl>
+                                          <p:spTgt spid="14"/>
+                                        </p:tgtEl>
+                                        <p:attrNameLst>
+                                          <p:attrName>style.visibility</p:attrName>
+                                        </p:attrNameLst>
+                                      </p:cBhvr>
+                                      <p:to>
+                                        <p:strVal val="visible"/>
+                                      </p:to>
+                                    </p:set>
+                                    <p:animEffect transition="in" filter="fade">
+                                      <p:cBhvr>
+                                        <p:cTn id="45" dur="2500"/>
+                                        <p:tgtEl>
+                                          <p:spTgt spid="14"/>
+                                        </p:tgtEl>
+                                      </p:cBhvr>
+                                    </p:animEffect>
+                                  </p:childTnLst>
+                                </p:cTn>
+                              </p:par>
+                              <p:par>
+                                <p:cTn id="46" presetID="10" presetClass="entr" presetSubtype="0" fill="hold" nodeType="withEffect">
+                                  <p:stCondLst>
+                                    <p:cond delay="0"/>
+                                  </p:stCondLst>
+                                  <p:childTnLst>
+                                    <p:set>
+                                      <p:cBhvr>
+                                        <p:cTn id="47" dur="1" fill="hold">
+                                          <p:stCondLst>
+                                            <p:cond delay="0"/>
+                                          </p:stCondLst>
+                                        </p:cTn>
+                                        <p:tgtEl>
+                                          <p:spTgt spid="15"/>
+                                        </p:tgtEl>
+                                        <p:attrNameLst>
+                                          <p:attrName>style.visibility</p:attrName>
+                                        </p:attrNameLst>
+                                      </p:cBhvr>
+                                      <p:to>
+                                        <p:strVal val="visible"/>
+                                      </p:to>
+                                    </p:set>
+                                    <p:animEffect transition="in" filter="fade">
+                                      <p:cBhvr>
+                                        <p:cTn id="48" dur="2500"/>
+                                        <p:tgtEl>
+                                          <p:spTgt spid="15"/>
+                                        </p:tgtEl>
+                                      </p:cBhvr>
+                                    </p:animEffect>
+                                  </p:childTnLst>
+                                </p:cTn>
+                              </p:par>
+                              <p:par>
+                                <p:cTn id="49" presetID="10" presetClass="entr" presetSubtype="0" fill="hold" nodeType="withEffect">
+                                  <p:stCondLst>
+                                    <p:cond delay="0"/>
+                                  </p:stCondLst>
+                                  <p:childTnLst>
+                                    <p:set>
+                                      <p:cBhvr>
+                                        <p:cTn id="50" dur="1" fill="hold">
+                                          <p:stCondLst>
+                                            <p:cond delay="0"/>
+                                          </p:stCondLst>
+                                        </p:cTn>
+                                        <p:tgtEl>
+                                          <p:spTgt spid="20"/>
+                                        </p:tgtEl>
+                                        <p:attrNameLst>
+                                          <p:attrName>style.visibility</p:attrName>
+                                        </p:attrNameLst>
+                                      </p:cBhvr>
+                                      <p:to>
+                                        <p:strVal val="visible"/>
+                                      </p:to>
+                                    </p:set>
+                                    <p:animEffect transition="in" filter="fade">
+                                      <p:cBhvr>
+                                        <p:cTn id="51" dur="2500"/>
+                                        <p:tgtEl>
+                                          <p:spTgt spid="20"/>
+                                        </p:tgtEl>
+                                      </p:cBhvr>
+                                    </p:animEffect>
+                                  </p:childTnLst>
+                                </p:cTn>
+                              </p:par>
+                              <p:par>
+                                <p:cTn id="52" presetID="10" presetClass="entr" presetSubtype="0" fill="hold" nodeType="withEffect">
+                                  <p:stCondLst>
+                                    <p:cond delay="0"/>
+                                  </p:stCondLst>
+                                  <p:childTnLst>
+                                    <p:set>
+                                      <p:cBhvr>
+                                        <p:cTn id="53" dur="1" fill="hold">
+                                          <p:stCondLst>
+                                            <p:cond delay="0"/>
+                                          </p:stCondLst>
+                                        </p:cTn>
+                                        <p:tgtEl>
+                                          <p:spTgt spid="22"/>
+                                        </p:tgtEl>
+                                        <p:attrNameLst>
+                                          <p:attrName>style.visibility</p:attrName>
+                                        </p:attrNameLst>
+                                      </p:cBhvr>
+                                      <p:to>
+                                        <p:strVal val="visible"/>
+                                      </p:to>
+                                    </p:set>
+                                    <p:animEffect transition="in" filter="fade">
+                                      <p:cBhvr>
+                                        <p:cTn id="54" dur="2500"/>
+                                        <p:tgtEl>
+                                          <p:spTgt spid="22"/>
+                                        </p:tgtEl>
+                                      </p:cBhvr>
+                                    </p:animEffect>
+                                  </p:childTnLst>
+                                </p:cTn>
+                              </p:par>
+                              <p:par>
+                                <p:cTn id="55" presetID="10" presetClass="entr" presetSubtype="0" fill="hold" grpId="0" nodeType="withEffect">
+                                  <p:stCondLst>
+                                    <p:cond delay="0"/>
+                                  </p:stCondLst>
+                                  <p:childTnLst>
+                                    <p:set>
+                                      <p:cBhvr>
+                                        <p:cTn id="56" dur="1" fill="hold">
+                                          <p:stCondLst>
+                                            <p:cond delay="0"/>
+                                          </p:stCondLst>
+                                        </p:cTn>
+                                        <p:tgtEl>
+                                          <p:spTgt spid="30"/>
+                                        </p:tgtEl>
+                                        <p:attrNameLst>
+                                          <p:attrName>style.visibility</p:attrName>
+                                        </p:attrNameLst>
+                                      </p:cBhvr>
+                                      <p:to>
+                                        <p:strVal val="visible"/>
+                                      </p:to>
+                                    </p:set>
+                                    <p:animEffect transition="in" filter="fade">
+                                      <p:cBhvr>
+                                        <p:cTn id="57" dur="2500"/>
+                                        <p:tgtEl>
+                                          <p:spTgt spid="30"/>
+                                        </p:tgtEl>
+                                      </p:cBhvr>
+                                    </p:animEffect>
+                                  </p:childTnLst>
+                                </p:cTn>
+                              </p:par>
+                            </p:childTnLst>
+                          </p:cTn>
+                        </p:par>
+                      </p:childTnLst>
+                    </p:cTn>
+                  </p:par>
+                  <p:par>
+                    <p:cTn id="58" fill="hold">
+                      <p:stCondLst>
+                        <p:cond delay="indefinite"/>
+                      </p:stCondLst>
+                      <p:childTnLst>
+                        <p:par>
+                          <p:cTn id="59" fill="hold">
+                            <p:stCondLst>
+                              <p:cond delay="0"/>
+                            </p:stCondLst>
+                            <p:childTnLst>
+                              <p:par>
+                                <p:cTn id="60" presetID="10" presetClass="entr" presetSubtype="0" fill="hold" grpId="0" nodeType="clickEffect">
+                                  <p:stCondLst>
+                                    <p:cond delay="0"/>
+                                  </p:stCondLst>
+                                  <p:childTnLst>
+                                    <p:set>
+                                      <p:cBhvr>
+                                        <p:cTn id="61" dur="1" fill="hold">
+                                          <p:stCondLst>
+                                            <p:cond delay="0"/>
+                                          </p:stCondLst>
+                                        </p:cTn>
+                                        <p:tgtEl>
+                                          <p:spTgt spid="18"/>
+                                        </p:tgtEl>
+                                        <p:attrNameLst>
+                                          <p:attrName>style.visibility</p:attrName>
+                                        </p:attrNameLst>
+                                      </p:cBhvr>
+                                      <p:to>
+                                        <p:strVal val="visible"/>
+                                      </p:to>
+                                    </p:set>
+                                    <p:animEffect transition="in" filter="fade">
+                                      <p:cBhvr>
+                                        <p:cTn id="62" dur="750"/>
+                                        <p:tgtEl>
+                                          <p:spTgt spid="18"/>
+                                        </p:tgtEl>
+                                      </p:cBhvr>
+                                    </p:animEffect>
+                                  </p:childTnLst>
+                                </p:cTn>
+                              </p:par>
+                            </p:childTnLst>
+                          </p:cTn>
+                        </p:par>
+                      </p:childTnLst>
+                    </p:cTn>
+                  </p:par>
+                  <p:par>
+                    <p:cTn id="63" fill="hold">
+                      <p:stCondLst>
+                        <p:cond delay="indefinite"/>
+                      </p:stCondLst>
+                      <p:childTnLst>
+                        <p:par>
+                          <p:cTn id="64" fill="hold">
+                            <p:stCondLst>
+                              <p:cond delay="0"/>
+                            </p:stCondLst>
+                            <p:childTnLst>
+                              <p:par>
+                                <p:cTn id="65" presetID="10" presetClass="entr" presetSubtype="0" fill="hold" grpId="0" nodeType="clickEffect">
+                                  <p:stCondLst>
+                                    <p:cond delay="0"/>
+                                  </p:stCondLst>
+                                  <p:childTnLst>
+                                    <p:set>
+                                      <p:cBhvr>
+                                        <p:cTn id="66" dur="1" fill="hold">
+                                          <p:stCondLst>
+                                            <p:cond delay="0"/>
+                                          </p:stCondLst>
+                                        </p:cTn>
+                                        <p:tgtEl>
+                                          <p:spTgt spid="32"/>
+                                        </p:tgtEl>
+                                        <p:attrNameLst>
+                                          <p:attrName>style.visibility</p:attrName>
+                                        </p:attrNameLst>
+                                      </p:cBhvr>
+                                      <p:to>
+                                        <p:strVal val="visible"/>
+                                      </p:to>
+                                    </p:set>
+                                    <p:animEffect transition="in" filter="fade">
+                                      <p:cBhvr>
+                                        <p:cTn id="67" dur="1500"/>
+                                        <p:tgtEl>
+                                          <p:spTgt spid="32"/>
+                                        </p:tgtEl>
+                                      </p:cBhvr>
+                                    </p:animEffect>
+                                  </p:childTnLst>
+                                </p:cTn>
+                              </p:par>
+                              <p:par>
+                                <p:cTn id="68" presetID="10" presetClass="entr" presetSubtype="0" fill="hold" grpId="0" nodeType="withEffect">
+                                  <p:stCondLst>
+                                    <p:cond delay="0"/>
+                                  </p:stCondLst>
+                                  <p:childTnLst>
+                                    <p:set>
+                                      <p:cBhvr>
+                                        <p:cTn id="69" dur="1" fill="hold">
+                                          <p:stCondLst>
+                                            <p:cond delay="0"/>
+                                          </p:stCondLst>
+                                        </p:cTn>
+                                        <p:tgtEl>
+                                          <p:spTgt spid="31"/>
+                                        </p:tgtEl>
+                                        <p:attrNameLst>
+                                          <p:attrName>style.visibility</p:attrName>
+                                        </p:attrNameLst>
+                                      </p:cBhvr>
+                                      <p:to>
+                                        <p:strVal val="visible"/>
+                                      </p:to>
+                                    </p:set>
+                                    <p:animEffect transition="in" filter="fade">
+                                      <p:cBhvr>
+                                        <p:cTn id="70" dur="1500"/>
+                                        <p:tgtEl>
+                                          <p:spTgt spid="31"/>
+                                        </p:tgtEl>
+                                      </p:cBhvr>
+                                    </p:animEffect>
+                                  </p:childTnLst>
+                                </p:cTn>
+                              </p:par>
+                            </p:childTnLst>
+                          </p:cTn>
+                        </p:par>
+                      </p:childTnLst>
+                    </p:cTn>
+                  </p:par>
+                </p:childTnLst>
+              </p:cTn>
+              <p:prevCondLst>
+                <p:cond evt="onPrev" delay="0">
+                  <p:tgtEl>
+                    <p:sldTgt/>
+                  </p:tgtEl>
+                </p:cond>
+              </p:prevCondLst>
+              <p:nextCondLst>
+                <p:cond evt="onNext" delay="0">
+                  <p:tgtEl>
+                    <p:sldTgt/>
+                  </p:tgtEl>
+                </p:cond>
+              </p:nextCondLst>
+            </p:seq>
+          </p:childTnLst>
+        </p:cTn>
+      </p:par>
+    </p:tnLst>
+    <p:bldLst>
+      <p:bldP spid="6" grpId="0" animBg="1"/>
+      <p:bldP spid="7" grpId="0" animBg="1"/>
+      <p:bldP spid="8" grpId="0" animBg="1"/>
+      <p:bldP spid="16" grpId="0"/>
+      <p:bldP spid="17" grpId="0"/>
+      <p:bldP spid="18" grpId="0"/>
+      <p:bldP spid="26" grpId="0"/>
+      <p:bldP spid="28" grpId="0"/>
+      <p:bldP spid="29" grpId="0"/>
+      <p:bldP spid="30" grpId="0"/>
+      <p:bldP spid="31" grpId="0" animBg="1"/>
+      <p:bldP spid="32" grpId="0" animBg="1"/>
+    </p:bldLst>
+  </p:timing>
+</p:sld>
+</file>
+
+<file path=ppt/slides/slide16.xml><?xml version="1.0" encoding="utf-8"?>
+<p:sld xmlns:a="http://schemas.openxmlformats.org/drawingml/2006/main" xmlns:r="http://schemas.openxmlformats.org/officeDocument/2006/relationships" xmlns:p="http://schemas.openxmlformats.org/presentationml/2006/main">
+  <p:cSld>
+    <p:spTree>
+      <p:nvGrpSpPr>
+        <p:cNvPr id="1" name=""/>
+        <p:cNvGrpSpPr/>
+        <p:nvPr/>
+      </p:nvGrpSpPr>
+      <p:grpSpPr>
+        <a:xfrm>
+          <a:off x="0" y="0"/>
+          <a:ext cx="0" cy="0"/>
+          <a:chOff x="0" y="0"/>
+          <a:chExt cx="0" cy="0"/>
+        </a:xfrm>
+      </p:grpSpPr>
+      <p:sp>
+        <p:nvSpPr>
+          <p:cNvPr id="2" name="Title 1">
+            <a:extLst>
+              <a:ext uri="{FF2B5EF4-FFF2-40B4-BE49-F238E27FC236}">
+                <a16:creationId xmlns:a16="http://schemas.microsoft.com/office/drawing/2014/main" id="{2128B6E4-1B10-4285-8BB1-27A2C48A8736}"/>
+              </a:ext>
+            </a:extLst>
+          </p:cNvPr>
+          <p:cNvSpPr>
+            <a:spLocks noGrp="1"/>
+          </p:cNvSpPr>
+          <p:nvPr>
+            <p:ph type="title"/>
+          </p:nvPr>
+        </p:nvSpPr>
+        <p:spPr>
+          <a:xfrm>
+            <a:off x="838200" y="365126"/>
+            <a:ext cx="10445318" cy="591120"/>
+          </a:xfrm>
+        </p:spPr>
+        <p:txBody>
+          <a:bodyPr>
+            <a:normAutofit/>
+          </a:bodyPr>
+          <a:lstStyle/>
+          <a:p>
+            <a:r>
+              <a:rPr lang="en-US" sz="3200" dirty="0"/>
+              <a:t>1. Getting the maximum switching speed</a:t>
+            </a:r>
+          </a:p>
+        </p:txBody>
+      </p:sp>
+      <p:sp>
+        <p:nvSpPr>
+          <p:cNvPr id="3" name="Content Placeholder 2">
+            <a:extLst>
+              <a:ext uri="{FF2B5EF4-FFF2-40B4-BE49-F238E27FC236}">
+                <a16:creationId xmlns:a16="http://schemas.microsoft.com/office/drawing/2014/main" id="{14921694-79BC-4294-9629-6BFFF6BB425F}"/>
+              </a:ext>
+            </a:extLst>
+          </p:cNvPr>
+          <p:cNvSpPr>
+            <a:spLocks noGrp="1"/>
+          </p:cNvSpPr>
+          <p:nvPr>
+            <p:ph idx="1"/>
+          </p:nvPr>
+        </p:nvSpPr>
+        <p:spPr>
+          <a:xfrm>
+            <a:off x="838199" y="1097656"/>
+            <a:ext cx="10702771" cy="5760344"/>
+          </a:xfrm>
+        </p:spPr>
+        <p:txBody>
+          <a:bodyPr/>
+          <a:lstStyle/>
+          <a:p>
+            <a:r>
+              <a:rPr lang="en-US" sz="2000" dirty="0"/>
+              <a:t>With the 16MHz oscillator maximum counter with 256 states have the frequency 31.125kHz</a:t>
+            </a:r>
+          </a:p>
+          <a:p>
+            <a:endParaRPr lang="en-US" dirty="0"/>
+          </a:p>
+          <a:p>
+            <a:pPr marL="0" indent="0" algn="ctr">
+              <a:buNone/>
+            </a:pPr>
+            <a:r>
+              <a:rPr lang="en-US" dirty="0"/>
+              <a:t>   </a:t>
+            </a:r>
+            <a:endParaRPr lang="en-US" b="0" dirty="0"/>
+          </a:p>
+          <a:p>
+            <a:pPr marL="0" indent="0">
+              <a:buNone/>
+            </a:pPr>
+            <a:endParaRPr lang="en-US" b="0" dirty="0"/>
+          </a:p>
+          <a:p>
+            <a:pPr marL="0" indent="0">
+              <a:buNone/>
+            </a:pPr>
+            <a:endParaRPr lang="en-US" b="0" dirty="0"/>
+          </a:p>
+          <a:p>
+            <a:pPr marL="0" indent="0">
+              <a:buNone/>
+            </a:pPr>
+            <a:endParaRPr lang="en-US" dirty="0"/>
+          </a:p>
+        </p:txBody>
+      </p:sp>
+      <p:pic>
+        <p:nvPicPr>
+          <p:cNvPr id="5" name="Picture 4">
+            <a:extLst>
+              <a:ext uri="{FF2B5EF4-FFF2-40B4-BE49-F238E27FC236}">
+                <a16:creationId xmlns:a16="http://schemas.microsoft.com/office/drawing/2014/main" id="{18D7A972-12AF-40BF-85E9-5CF1E431E898}"/>
+              </a:ext>
+            </a:extLst>
+          </p:cNvPr>
+          <p:cNvPicPr>
+            <a:picLocks noChangeAspect="1"/>
+          </p:cNvPicPr>
+          <p:nvPr/>
+        </p:nvPicPr>
+        <p:blipFill rotWithShape="1">
+          <a:blip r:embed="rId2"/>
+          <a:srcRect l="27860" t="50000" r="26210" b="24310"/>
+          <a:stretch/>
+        </p:blipFill>
+        <p:spPr>
+          <a:xfrm>
+            <a:off x="739806" y="4287861"/>
+            <a:ext cx="8460420" cy="2472755"/>
+          </a:xfrm>
+          <a:prstGeom prst="rect">
+            <a:avLst/>
+          </a:prstGeom>
+        </p:spPr>
+      </p:pic>
+      <p:pic>
+        <p:nvPicPr>
+          <p:cNvPr id="7" name="Picture 6">
+            <a:extLst>
+              <a:ext uri="{FF2B5EF4-FFF2-40B4-BE49-F238E27FC236}">
+                <a16:creationId xmlns:a16="http://schemas.microsoft.com/office/drawing/2014/main" id="{2B68C790-B564-45BB-A496-31904BF63947}"/>
+              </a:ext>
+            </a:extLst>
+          </p:cNvPr>
+          <p:cNvPicPr>
+            <a:picLocks noChangeAspect="1"/>
+          </p:cNvPicPr>
+          <p:nvPr/>
+        </p:nvPicPr>
+        <p:blipFill rotWithShape="1">
+          <a:blip r:embed="rId3"/>
+          <a:srcRect l="28179" t="31074" r="26602" b="37734"/>
+          <a:stretch/>
+        </p:blipFill>
+        <p:spPr>
+          <a:xfrm>
+            <a:off x="739807" y="1365069"/>
+            <a:ext cx="8290637" cy="2855975"/>
+          </a:xfrm>
+          <a:prstGeom prst="rect">
+            <a:avLst/>
+          </a:prstGeom>
+        </p:spPr>
+      </p:pic>
+      <p:sp>
+        <p:nvSpPr>
+          <p:cNvPr id="8" name="Rectangle 7">
+            <a:extLst>
+              <a:ext uri="{FF2B5EF4-FFF2-40B4-BE49-F238E27FC236}">
+                <a16:creationId xmlns:a16="http://schemas.microsoft.com/office/drawing/2014/main" id="{6BEDA14F-B343-4CF4-8D33-F15CBAD6BCDF}"/>
+              </a:ext>
+            </a:extLst>
+          </p:cNvPr>
+          <p:cNvSpPr/>
+          <p:nvPr/>
+        </p:nvSpPr>
+        <p:spPr>
+          <a:xfrm>
+            <a:off x="1068282" y="5120629"/>
+            <a:ext cx="7874493" cy="257453"/>
+          </a:xfrm>
+          <a:prstGeom prst="rect">
+            <a:avLst/>
+          </a:prstGeom>
+          <a:noFill/>
+          <a:ln w="38100">
+            <a:solidFill>
+              <a:srgbClr val="FF0000"/>
+            </a:solidFill>
+          </a:ln>
+        </p:spPr>
+        <p:style>
+          <a:lnRef idx="2">
+            <a:schemeClr val="accent1">
+              <a:shade val="50000"/>
+            </a:schemeClr>
+          </a:lnRef>
+          <a:fillRef idx="1">
+            <a:schemeClr val="accent1"/>
+          </a:fillRef>
+          <a:effectRef idx="0">
+            <a:schemeClr val="accent1"/>
+          </a:effectRef>
+          <a:fontRef idx="minor">
+            <a:schemeClr val="lt1"/>
+          </a:fontRef>
+        </p:style>
+        <p:txBody>
+          <a:bodyPr rtlCol="0" anchor="ctr"/>
+          <a:lstStyle/>
+          <a:p>
+            <a:pPr algn="ctr"/>
+            <a:endParaRPr lang="en-US"/>
+          </a:p>
+        </p:txBody>
+      </p:sp>
+      <p:sp>
+        <p:nvSpPr>
+          <p:cNvPr id="9" name="Rectangle 8">
+            <a:extLst>
+              <a:ext uri="{FF2B5EF4-FFF2-40B4-BE49-F238E27FC236}">
+                <a16:creationId xmlns:a16="http://schemas.microsoft.com/office/drawing/2014/main" id="{8237F206-2EF8-46E4-9B98-3C106E224F6F}"/>
+              </a:ext>
+            </a:extLst>
+          </p:cNvPr>
+          <p:cNvSpPr/>
+          <p:nvPr/>
+        </p:nvSpPr>
+        <p:spPr>
+          <a:xfrm>
+            <a:off x="1032770" y="2754008"/>
+            <a:ext cx="7874493" cy="257453"/>
+          </a:xfrm>
+          <a:prstGeom prst="rect">
+            <a:avLst/>
+          </a:prstGeom>
+          <a:noFill/>
+          <a:ln w="38100">
+            <a:solidFill>
+              <a:srgbClr val="FF0000"/>
+            </a:solidFill>
+          </a:ln>
+        </p:spPr>
+        <p:style>
+          <a:lnRef idx="2">
+            <a:schemeClr val="accent1">
+              <a:shade val="50000"/>
+            </a:schemeClr>
+          </a:lnRef>
+          <a:fillRef idx="1">
+            <a:schemeClr val="accent1"/>
+          </a:fillRef>
+          <a:effectRef idx="0">
+            <a:schemeClr val="accent1"/>
+          </a:effectRef>
+          <a:fontRef idx="minor">
+            <a:schemeClr val="lt1"/>
+          </a:fontRef>
+        </p:style>
+        <p:txBody>
+          <a:bodyPr rtlCol="0" anchor="ctr"/>
+          <a:lstStyle/>
+          <a:p>
+            <a:pPr algn="ctr"/>
+            <a:endParaRPr lang="en-US"/>
+          </a:p>
+        </p:txBody>
+      </p:sp>
+      <p:sp>
+        <p:nvSpPr>
+          <p:cNvPr id="10" name="Oval 9">
+            <a:extLst>
+              <a:ext uri="{FF2B5EF4-FFF2-40B4-BE49-F238E27FC236}">
+                <a16:creationId xmlns:a16="http://schemas.microsoft.com/office/drawing/2014/main" id="{3543F20D-27FF-40C5-8C70-577931835BE5}"/>
+              </a:ext>
+            </a:extLst>
+          </p:cNvPr>
+          <p:cNvSpPr/>
+          <p:nvPr/>
+        </p:nvSpPr>
+        <p:spPr>
+          <a:xfrm>
+            <a:off x="5910435" y="2678548"/>
+            <a:ext cx="559293" cy="408372"/>
+          </a:xfrm>
+          <a:prstGeom prst="ellipse">
+            <a:avLst/>
+          </a:prstGeom>
+          <a:noFill/>
+          <a:ln w="38100">
+            <a:solidFill>
+              <a:srgbClr val="FF0000"/>
+            </a:solidFill>
+          </a:ln>
+        </p:spPr>
+        <p:style>
+          <a:lnRef idx="2">
+            <a:schemeClr val="accent1">
+              <a:shade val="50000"/>
+            </a:schemeClr>
+          </a:lnRef>
+          <a:fillRef idx="1">
+            <a:schemeClr val="accent1"/>
+          </a:fillRef>
+          <a:effectRef idx="0">
+            <a:schemeClr val="accent1"/>
+          </a:effectRef>
+          <a:fontRef idx="minor">
+            <a:schemeClr val="lt1"/>
+          </a:fontRef>
+        </p:style>
+        <p:txBody>
+          <a:bodyPr rtlCol="0" anchor="ctr"/>
+          <a:lstStyle/>
+          <a:p>
+            <a:pPr algn="ctr"/>
+            <a:endParaRPr lang="en-US"/>
+          </a:p>
+        </p:txBody>
+      </p:sp>
+      <p:cxnSp>
+        <p:nvCxnSpPr>
+          <p:cNvPr id="12" name="Straight Arrow Connector 11">
+            <a:extLst>
+              <a:ext uri="{FF2B5EF4-FFF2-40B4-BE49-F238E27FC236}">
+                <a16:creationId xmlns:a16="http://schemas.microsoft.com/office/drawing/2014/main" id="{63C83029-26F6-453A-B14C-5F45D3FBB877}"/>
+              </a:ext>
+            </a:extLst>
+          </p:cNvPr>
+          <p:cNvCxnSpPr>
+            <a:cxnSpLocks/>
+            <a:stCxn id="15" idx="1"/>
+          </p:cNvCxnSpPr>
+          <p:nvPr/>
+        </p:nvCxnSpPr>
+        <p:spPr>
+          <a:xfrm flipH="1">
+            <a:off x="6551601" y="1949217"/>
+            <a:ext cx="2995596" cy="662207"/>
+          </a:xfrm>
+          <a:prstGeom prst="straightConnector1">
+            <a:avLst/>
+          </a:prstGeom>
+          <a:ln w="38100">
+            <a:solidFill>
+              <a:srgbClr val="FF0000"/>
+            </a:solidFill>
+            <a:tailEnd type="triangle"/>
+          </a:ln>
+        </p:spPr>
+        <p:style>
+          <a:lnRef idx="1">
+            <a:schemeClr val="accent1"/>
+          </a:lnRef>
+          <a:fillRef idx="0">
+            <a:schemeClr val="accent1"/>
+          </a:fillRef>
+          <a:effectRef idx="0">
+            <a:schemeClr val="accent1"/>
+          </a:effectRef>
+          <a:fontRef idx="minor">
+            <a:schemeClr val="tx1"/>
+          </a:fontRef>
+        </p:style>
+      </p:cxnSp>
+      <p:sp>
+        <p:nvSpPr>
+          <p:cNvPr id="15" name="TextBox 14">
+            <a:extLst>
+              <a:ext uri="{FF2B5EF4-FFF2-40B4-BE49-F238E27FC236}">
+                <a16:creationId xmlns:a16="http://schemas.microsoft.com/office/drawing/2014/main" id="{0945626A-03EC-4BCD-8F2C-D6DFE1DCEFFF}"/>
+              </a:ext>
+            </a:extLst>
+          </p:cNvPr>
+          <p:cNvSpPr txBox="1"/>
+          <p:nvPr/>
+        </p:nvSpPr>
+        <p:spPr>
+          <a:xfrm>
+            <a:off x="9547197" y="1626051"/>
+            <a:ext cx="1125244" cy="646331"/>
+          </a:xfrm>
+          <a:prstGeom prst="rect">
+            <a:avLst/>
+          </a:prstGeom>
+          <a:noFill/>
+        </p:spPr>
+        <p:txBody>
+          <a:bodyPr wrap="none" rtlCol="0">
+            <a:spAutoFit/>
+          </a:bodyPr>
+          <a:lstStyle/>
+          <a:p>
+            <a:r>
+              <a:rPr lang="en-US" dirty="0">
+                <a:solidFill>
+                  <a:srgbClr val="FF0000"/>
+                </a:solidFill>
+              </a:rPr>
+              <a:t>   8-bit</a:t>
+            </a:r>
+            <a:br>
+              <a:rPr lang="en-US" dirty="0">
+                <a:solidFill>
+                  <a:srgbClr val="FF0000"/>
+                </a:solidFill>
+              </a:rPr>
+            </a:br>
+            <a:r>
+              <a:rPr lang="en-US" dirty="0">
+                <a:solidFill>
+                  <a:srgbClr val="FF0000"/>
+                </a:solidFill>
+              </a:rPr>
+              <a:t>256</a:t>
+            </a:r>
+            <a:r>
+              <a:rPr lang="en-US" sz="1400" dirty="0">
+                <a:solidFill>
+                  <a:srgbClr val="FF0000"/>
+                </a:solidFill>
+              </a:rPr>
+              <a:t> </a:t>
+            </a:r>
+            <a:r>
+              <a:rPr lang="en-US" dirty="0">
+                <a:solidFill>
+                  <a:srgbClr val="FF0000"/>
+                </a:solidFill>
+              </a:rPr>
+              <a:t>states</a:t>
+            </a:r>
+            <a:endParaRPr lang="en-US" sz="1400" dirty="0">
+              <a:solidFill>
+                <a:srgbClr val="FF0000"/>
+              </a:solidFill>
+            </a:endParaRPr>
+          </a:p>
+        </p:txBody>
+      </p:sp>
+      <p:sp>
+        <p:nvSpPr>
+          <p:cNvPr id="17" name="Oval 16">
+            <a:extLst>
+              <a:ext uri="{FF2B5EF4-FFF2-40B4-BE49-F238E27FC236}">
+                <a16:creationId xmlns:a16="http://schemas.microsoft.com/office/drawing/2014/main" id="{4E138E1C-3371-4536-8931-2E85A89D1EA9}"/>
+              </a:ext>
+            </a:extLst>
+          </p:cNvPr>
+          <p:cNvSpPr/>
+          <p:nvPr/>
+        </p:nvSpPr>
+        <p:spPr>
+          <a:xfrm>
+            <a:off x="4116036" y="2676039"/>
+            <a:ext cx="1538178" cy="408372"/>
+          </a:xfrm>
+          <a:prstGeom prst="ellipse">
+            <a:avLst/>
+          </a:prstGeom>
+          <a:noFill/>
+          <a:ln w="38100">
+            <a:solidFill>
+              <a:srgbClr val="FF0000"/>
+            </a:solidFill>
+          </a:ln>
+        </p:spPr>
+        <p:style>
+          <a:lnRef idx="2">
+            <a:schemeClr val="accent1">
+              <a:shade val="50000"/>
+            </a:schemeClr>
+          </a:lnRef>
+          <a:fillRef idx="1">
+            <a:schemeClr val="accent1"/>
+          </a:fillRef>
+          <a:effectRef idx="0">
+            <a:schemeClr val="accent1"/>
+          </a:effectRef>
+          <a:fontRef idx="minor">
+            <a:schemeClr val="lt1"/>
+          </a:fontRef>
+        </p:style>
+        <p:txBody>
+          <a:bodyPr rtlCol="0" anchor="ctr"/>
+          <a:lstStyle/>
+          <a:p>
+            <a:pPr algn="ctr"/>
+            <a:endParaRPr lang="en-US"/>
+          </a:p>
+        </p:txBody>
+      </p:sp>
+      <mc:AlternateContent xmlns:mc="http://schemas.openxmlformats.org/markup-compatibility/2006">
+        <mc:Choice xmlns:a14="http://schemas.microsoft.com/office/drawing/2010/main" Requires="a14">
+          <p:sp>
+            <p:nvSpPr>
+              <p:cNvPr id="21" name="TextBox 20">
+                <a:extLst>
+                  <a:ext uri="{FF2B5EF4-FFF2-40B4-BE49-F238E27FC236}">
+                    <a16:creationId xmlns:a16="http://schemas.microsoft.com/office/drawing/2014/main" id="{7470D871-A17C-4B71-B4BB-9D2FC858D80B}"/>
+                  </a:ext>
+                </a:extLst>
+              </p:cNvPr>
+              <p:cNvSpPr txBox="1"/>
+              <p:nvPr/>
+            </p:nvSpPr>
+            <p:spPr>
+              <a:xfrm>
+                <a:off x="9620967" y="3887142"/>
+                <a:ext cx="2338845" cy="890757"/>
+              </a:xfrm>
+              <a:prstGeom prst="rect">
+                <a:avLst/>
+              </a:prstGeom>
+              <a:noFill/>
+            </p:spPr>
+            <p:txBody>
+              <a:bodyPr wrap="none" rtlCol="0">
+                <a:spAutoFit/>
+              </a:bodyPr>
+              <a:lstStyle/>
+              <a:p>
+                <a14:m>
+                  <m:oMath xmlns:m="http://schemas.openxmlformats.org/officeDocument/2006/math">
+                    <m:f>
+                      <m:fPr>
+                        <m:ctrlPr>
+                          <a:rPr lang="en-US" sz="2000" b="1" i="1" smtClean="0">
+                            <a:solidFill>
+                              <a:srgbClr val="FF0000"/>
+                            </a:solidFill>
+                            <a:latin typeface="Cambria Math" panose="02040503050406030204" pitchFamily="18" charset="0"/>
+                          </a:rPr>
+                        </m:ctrlPr>
+                      </m:fPr>
+                      <m:num>
+                        <m:r>
+                          <a:rPr lang="en-US" sz="2000" b="1" i="1" smtClean="0">
+                            <a:solidFill>
+                              <a:srgbClr val="FF0000"/>
+                            </a:solidFill>
+                            <a:latin typeface="Cambria Math" panose="02040503050406030204" pitchFamily="18" charset="0"/>
+                          </a:rPr>
+                          <m:t>𝟏𝟔</m:t>
+                        </m:r>
+                        <m:r>
+                          <a:rPr lang="en-US" sz="2000" b="1" i="1" smtClean="0">
+                            <a:solidFill>
+                              <a:srgbClr val="FF0000"/>
+                            </a:solidFill>
+                            <a:latin typeface="Cambria Math" panose="02040503050406030204" pitchFamily="18" charset="0"/>
+                          </a:rPr>
+                          <m:t> </m:t>
+                        </m:r>
+                        <m:r>
+                          <a:rPr lang="en-US" sz="2000" b="1" i="1" smtClean="0">
+                            <a:solidFill>
+                              <a:srgbClr val="FF0000"/>
+                            </a:solidFill>
+                            <a:latin typeface="Cambria Math" panose="02040503050406030204" pitchFamily="18" charset="0"/>
+                          </a:rPr>
+                          <m:t>𝑿</m:t>
+                        </m:r>
+                        <m:sSup>
+                          <m:sSupPr>
+                            <m:ctrlPr>
+                              <a:rPr lang="en-US" sz="2000" b="1" i="1" smtClean="0">
+                                <a:solidFill>
+                                  <a:srgbClr val="FF0000"/>
+                                </a:solidFill>
+                                <a:latin typeface="Cambria Math" panose="02040503050406030204" pitchFamily="18" charset="0"/>
+                              </a:rPr>
+                            </m:ctrlPr>
+                          </m:sSupPr>
+                          <m:e>
+                            <m:r>
+                              <a:rPr lang="en-US" sz="2000" b="1" i="1" smtClean="0">
+                                <a:solidFill>
+                                  <a:srgbClr val="FF0000"/>
+                                </a:solidFill>
+                                <a:latin typeface="Cambria Math" panose="02040503050406030204" pitchFamily="18" charset="0"/>
+                              </a:rPr>
+                              <m:t> </m:t>
+                            </m:r>
+                            <m:r>
+                              <a:rPr lang="en-US" sz="2000" b="1" i="1" smtClean="0">
+                                <a:solidFill>
+                                  <a:srgbClr val="FF0000"/>
+                                </a:solidFill>
+                                <a:latin typeface="Cambria Math" panose="02040503050406030204" pitchFamily="18" charset="0"/>
+                              </a:rPr>
+                              <m:t>𝟏𝟎</m:t>
+                            </m:r>
+                          </m:e>
+                          <m:sup>
+                            <m:r>
+                              <a:rPr lang="en-US" sz="2000" b="1" i="1" smtClean="0">
+                                <a:solidFill>
+                                  <a:srgbClr val="FF0000"/>
+                                </a:solidFill>
+                                <a:latin typeface="Cambria Math" panose="02040503050406030204" pitchFamily="18" charset="0"/>
+                              </a:rPr>
+                              <m:t>𝟔</m:t>
+                            </m:r>
+                          </m:sup>
+                        </m:sSup>
+                      </m:num>
+                      <m:den>
+                        <m:r>
+                          <a:rPr lang="en-US" sz="2000" b="1" i="1" smtClean="0">
+                            <a:solidFill>
+                              <a:srgbClr val="FF0000"/>
+                            </a:solidFill>
+                            <a:latin typeface="Cambria Math" panose="02040503050406030204" pitchFamily="18" charset="0"/>
+                          </a:rPr>
+                          <m:t>𝟐𝟓𝟔</m:t>
+                        </m:r>
+                      </m:den>
+                    </m:f>
+                  </m:oMath>
+                </a14:m>
+                <a:r>
+                  <a:rPr lang="en-US" sz="2000" b="1" dirty="0">
+                    <a:solidFill>
+                      <a:srgbClr val="FF0000"/>
+                    </a:solidFill>
+                  </a:rPr>
+                  <a:t>   =  31.25kHz</a:t>
+                </a:r>
+              </a:p>
+              <a:p>
+                <a:endParaRPr lang="en-US" sz="2000" b="1" dirty="0">
+                  <a:solidFill>
+                    <a:srgbClr val="FF0000"/>
+                  </a:solidFill>
+                </a:endParaRPr>
+              </a:p>
+            </p:txBody>
+          </p:sp>
+        </mc:Choice>
+        <mc:Fallback>
+          <p:sp>
+            <p:nvSpPr>
+              <p:cNvPr id="21" name="TextBox 20">
+                <a:extLst>
+                  <a:ext uri="{FF2B5EF4-FFF2-40B4-BE49-F238E27FC236}">
+                    <a16:creationId xmlns:a16="http://schemas.microsoft.com/office/drawing/2014/main" id="{7470D871-A17C-4B71-B4BB-9D2FC858D80B}"/>
+                  </a:ext>
+                </a:extLst>
+              </p:cNvPr>
+              <p:cNvSpPr txBox="1">
+                <a:spLocks noRot="1" noChangeAspect="1" noMove="1" noResize="1" noEditPoints="1" noAdjustHandles="1" noChangeArrowheads="1" noChangeShapeType="1" noTextEdit="1"/>
+              </p:cNvSpPr>
+              <p:nvPr/>
+            </p:nvSpPr>
+            <p:spPr>
+              <a:xfrm>
+                <a:off x="9620967" y="3887142"/>
+                <a:ext cx="2338845" cy="890757"/>
+              </a:xfrm>
+              <a:prstGeom prst="rect">
+                <a:avLst/>
+              </a:prstGeom>
+              <a:blipFill>
+                <a:blip r:embed="rId4"/>
+                <a:stretch>
+                  <a:fillRect r="-2083"/>
+                </a:stretch>
+              </a:blipFill>
+            </p:spPr>
+            <p:txBody>
+              <a:bodyPr/>
+              <a:lstStyle/>
+              <a:p>
+                <a:r>
+                  <a:rPr lang="en-US">
+                    <a:noFill/>
+                  </a:rPr>
+                  <a:t> </a:t>
+                </a:r>
+              </a:p>
+            </p:txBody>
+          </p:sp>
+        </mc:Fallback>
+      </mc:AlternateContent>
+    </p:spTree>
+    <p:extLst>
+      <p:ext uri="{BB962C8B-B14F-4D97-AF65-F5344CB8AC3E}">
+        <p14:creationId xmlns:p14="http://schemas.microsoft.com/office/powerpoint/2010/main" val="906440188"/>
+      </p:ext>
+    </p:extLst>
+  </p:cSld>
+  <p:clrMapOvr>
+    <a:masterClrMapping/>
+  </p:clrMapOvr>
+  <p:timing>
+    <p:tnLst>
+      <p:par>
+        <p:cTn id="1" dur="indefinite" restart="never" nodeType="tmRoot">
+          <p:childTnLst>
+            <p:seq concurrent="1" nextAc="seek">
+              <p:cTn id="2" dur="indefinite" nodeType="mainSeq">
+                <p:childTnLst>
+                  <p:par>
+                    <p:cTn id="3" fill="hold">
+                      <p:stCondLst>
+                        <p:cond delay="indefinite"/>
+                      </p:stCondLst>
+                      <p:childTnLst>
+                        <p:par>
+                          <p:cTn id="4" fill="hold">
+                            <p:stCondLst>
+                              <p:cond delay="0"/>
+                            </p:stCondLst>
+                            <p:childTnLst>
+                              <p:par>
+                                <p:cTn id="5" presetID="10" presetClass="entr" presetSubtype="0" fill="hold" nodeType="clickEffect">
+                                  <p:stCondLst>
+                                    <p:cond delay="0"/>
+                                  </p:stCondLst>
+                                  <p:childTnLst>
+                                    <p:set>
+                                      <p:cBhvr>
+                                        <p:cTn id="6" dur="1" fill="hold">
+                                          <p:stCondLst>
+                                            <p:cond delay="0"/>
+                                          </p:stCondLst>
+                                        </p:cTn>
+                                        <p:tgtEl>
+                                          <p:spTgt spid="7"/>
+                                        </p:tgtEl>
+                                        <p:attrNameLst>
+                                          <p:attrName>style.visibility</p:attrName>
+                                        </p:attrNameLst>
+                                      </p:cBhvr>
+                                      <p:to>
+                                        <p:strVal val="visible"/>
+                                      </p:to>
+                                    </p:set>
+                                    <p:animEffect transition="in" filter="fade">
+                                      <p:cBhvr>
+                                        <p:cTn id="7" dur="2250"/>
+                                        <p:tgtEl>
+                                          <p:spTgt spid="7"/>
+                                        </p:tgtEl>
+                                      </p:cBhvr>
+                                    </p:animEffect>
+                                  </p:childTnLst>
+                                </p:cTn>
+                              </p:par>
+                              <p:par>
+                                <p:cTn id="8" presetID="10" presetClass="entr" presetSubtype="0" fill="hold" nodeType="withEffect">
+                                  <p:stCondLst>
+                                    <p:cond delay="0"/>
+                                  </p:stCondLst>
+                                  <p:childTnLst>
+                                    <p:set>
+                                      <p:cBhvr>
+                                        <p:cTn id="9" dur="1" fill="hold">
+                                          <p:stCondLst>
+                                            <p:cond delay="0"/>
+                                          </p:stCondLst>
+                                        </p:cTn>
+                                        <p:tgtEl>
+                                          <p:spTgt spid="5"/>
+                                        </p:tgtEl>
+                                        <p:attrNameLst>
+                                          <p:attrName>style.visibility</p:attrName>
+                                        </p:attrNameLst>
+                                      </p:cBhvr>
+                                      <p:to>
+                                        <p:strVal val="visible"/>
+                                      </p:to>
+                                    </p:set>
+                                    <p:animEffect transition="in" filter="fade">
+                                      <p:cBhvr>
+                                        <p:cTn id="10" dur="2250"/>
+                                        <p:tgtEl>
+                                          <p:spTgt spid="5"/>
+                                        </p:tgtEl>
+                                      </p:cBhvr>
+                                    </p:animEffect>
+                                  </p:childTnLst>
+                                </p:cTn>
+                              </p:par>
+                            </p:childTnLst>
+                          </p:cTn>
+                        </p:par>
+                      </p:childTnLst>
+                    </p:cTn>
+                  </p:par>
+                  <p:par>
+                    <p:cTn id="11" fill="hold">
+                      <p:stCondLst>
+                        <p:cond delay="indefinite"/>
+                      </p:stCondLst>
+                      <p:childTnLst>
+                        <p:par>
+                          <p:cTn id="12" fill="hold">
+                            <p:stCondLst>
+                              <p:cond delay="0"/>
+                            </p:stCondLst>
+                            <p:childTnLst>
+                              <p:par>
+                                <p:cTn id="13" presetID="10" presetClass="entr" presetSubtype="0" fill="hold" grpId="0" nodeType="clickEffect">
+                                  <p:stCondLst>
+                                    <p:cond delay="0"/>
+                                  </p:stCondLst>
+                                  <p:childTnLst>
+                                    <p:set>
+                                      <p:cBhvr>
+                                        <p:cTn id="14" dur="1" fill="hold">
+                                          <p:stCondLst>
+                                            <p:cond delay="0"/>
+                                          </p:stCondLst>
+                                        </p:cTn>
+                                        <p:tgtEl>
+                                          <p:spTgt spid="17"/>
+                                        </p:tgtEl>
+                                        <p:attrNameLst>
+                                          <p:attrName>style.visibility</p:attrName>
+                                        </p:attrNameLst>
+                                      </p:cBhvr>
+                                      <p:to>
+                                        <p:strVal val="visible"/>
+                                      </p:to>
+                                    </p:set>
+                                    <p:animEffect transition="in" filter="fade">
+                                      <p:cBhvr>
+                                        <p:cTn id="15" dur="2500"/>
+                                        <p:tgtEl>
+                                          <p:spTgt spid="17"/>
+                                        </p:tgtEl>
+                                      </p:cBhvr>
+                                    </p:animEffect>
+                                  </p:childTnLst>
+                                </p:cTn>
+                              </p:par>
+                              <p:par>
+                                <p:cTn id="16" presetID="10" presetClass="entr" presetSubtype="0" fill="hold" grpId="0" nodeType="withEffect">
+                                  <p:stCondLst>
+                                    <p:cond delay="0"/>
+                                  </p:stCondLst>
+                                  <p:childTnLst>
+                                    <p:set>
+                                      <p:cBhvr>
+                                        <p:cTn id="17" dur="1" fill="hold">
+                                          <p:stCondLst>
+                                            <p:cond delay="0"/>
+                                          </p:stCondLst>
+                                        </p:cTn>
+                                        <p:tgtEl>
+                                          <p:spTgt spid="10"/>
+                                        </p:tgtEl>
+                                        <p:attrNameLst>
+                                          <p:attrName>style.visibility</p:attrName>
+                                        </p:attrNameLst>
+                                      </p:cBhvr>
+                                      <p:to>
+                                        <p:strVal val="visible"/>
+                                      </p:to>
+                                    </p:set>
+                                    <p:animEffect transition="in" filter="fade">
+                                      <p:cBhvr>
+                                        <p:cTn id="18" dur="2500"/>
+                                        <p:tgtEl>
+                                          <p:spTgt spid="10"/>
+                                        </p:tgtEl>
+                                      </p:cBhvr>
+                                    </p:animEffect>
+                                  </p:childTnLst>
+                                </p:cTn>
+                              </p:par>
+                              <p:par>
+                                <p:cTn id="19" presetID="10" presetClass="entr" presetSubtype="0" fill="hold" nodeType="withEffect">
+                                  <p:stCondLst>
+                                    <p:cond delay="0"/>
+                                  </p:stCondLst>
+                                  <p:childTnLst>
+                                    <p:set>
+                                      <p:cBhvr>
+                                        <p:cTn id="20" dur="1" fill="hold">
+                                          <p:stCondLst>
+                                            <p:cond delay="0"/>
+                                          </p:stCondLst>
+                                        </p:cTn>
+                                        <p:tgtEl>
+                                          <p:spTgt spid="12"/>
+                                        </p:tgtEl>
+                                        <p:attrNameLst>
+                                          <p:attrName>style.visibility</p:attrName>
+                                        </p:attrNameLst>
+                                      </p:cBhvr>
+                                      <p:to>
+                                        <p:strVal val="visible"/>
+                                      </p:to>
+                                    </p:set>
+                                    <p:animEffect transition="in" filter="fade">
+                                      <p:cBhvr>
+                                        <p:cTn id="21" dur="2500"/>
+                                        <p:tgtEl>
+                                          <p:spTgt spid="12"/>
+                                        </p:tgtEl>
+                                      </p:cBhvr>
+                                    </p:animEffect>
+                                  </p:childTnLst>
+                                </p:cTn>
+                              </p:par>
+                              <p:par>
+                                <p:cTn id="22" presetID="10" presetClass="entr" presetSubtype="0" fill="hold" grpId="0" nodeType="withEffect">
+                                  <p:stCondLst>
+                                    <p:cond delay="0"/>
+                                  </p:stCondLst>
+                                  <p:childTnLst>
+                                    <p:set>
+                                      <p:cBhvr>
+                                        <p:cTn id="23" dur="1" fill="hold">
+                                          <p:stCondLst>
+                                            <p:cond delay="0"/>
+                                          </p:stCondLst>
+                                        </p:cTn>
+                                        <p:tgtEl>
+                                          <p:spTgt spid="15"/>
+                                        </p:tgtEl>
+                                        <p:attrNameLst>
+                                          <p:attrName>style.visibility</p:attrName>
+                                        </p:attrNameLst>
+                                      </p:cBhvr>
+                                      <p:to>
+                                        <p:strVal val="visible"/>
+                                      </p:to>
+                                    </p:set>
+                                    <p:animEffect transition="in" filter="fade">
+                                      <p:cBhvr>
+                                        <p:cTn id="24" dur="2500"/>
+                                        <p:tgtEl>
+                                          <p:spTgt spid="15"/>
+                                        </p:tgtEl>
+                                      </p:cBhvr>
+                                    </p:animEffect>
+                                  </p:childTnLst>
+                                </p:cTn>
+                              </p:par>
+                            </p:childTnLst>
+                          </p:cTn>
+                        </p:par>
+                      </p:childTnLst>
+                    </p:cTn>
+                  </p:par>
+                  <p:par>
+                    <p:cTn id="25" fill="hold">
+                      <p:stCondLst>
+                        <p:cond delay="indefinite"/>
+                      </p:stCondLst>
+                      <p:childTnLst>
+                        <p:par>
+                          <p:cTn id="26" fill="hold">
+                            <p:stCondLst>
+                              <p:cond delay="0"/>
+                            </p:stCondLst>
+                            <p:childTnLst>
+                              <p:par>
+                                <p:cTn id="27" presetID="10" presetClass="entr" presetSubtype="0" fill="hold" grpId="0" nodeType="clickEffect">
+                                  <p:stCondLst>
+                                    <p:cond delay="0"/>
+                                  </p:stCondLst>
+                                  <p:childTnLst>
+                                    <p:set>
+                                      <p:cBhvr>
+                                        <p:cTn id="28" dur="1" fill="hold">
+                                          <p:stCondLst>
+                                            <p:cond delay="0"/>
+                                          </p:stCondLst>
+                                        </p:cTn>
+                                        <p:tgtEl>
+                                          <p:spTgt spid="9"/>
+                                        </p:tgtEl>
+                                        <p:attrNameLst>
+                                          <p:attrName>style.visibility</p:attrName>
+                                        </p:attrNameLst>
+                                      </p:cBhvr>
+                                      <p:to>
+                                        <p:strVal val="visible"/>
+                                      </p:to>
+                                    </p:set>
+                                    <p:animEffect transition="in" filter="fade">
+                                      <p:cBhvr>
+                                        <p:cTn id="29" dur="2250"/>
+                                        <p:tgtEl>
+                                          <p:spTgt spid="9"/>
+                                        </p:tgtEl>
+                                      </p:cBhvr>
+                                    </p:animEffect>
+                                  </p:childTnLst>
+                                </p:cTn>
+                              </p:par>
+                              <p:par>
+                                <p:cTn id="30" presetID="10" presetClass="entr" presetSubtype="0" fill="hold" grpId="0" nodeType="withEffect">
+                                  <p:stCondLst>
+                                    <p:cond delay="0"/>
+                                  </p:stCondLst>
+                                  <p:childTnLst>
+                                    <p:set>
+                                      <p:cBhvr>
+                                        <p:cTn id="31" dur="1" fill="hold">
+                                          <p:stCondLst>
+                                            <p:cond delay="0"/>
+                                          </p:stCondLst>
+                                        </p:cTn>
+                                        <p:tgtEl>
+                                          <p:spTgt spid="8"/>
+                                        </p:tgtEl>
+                                        <p:attrNameLst>
+                                          <p:attrName>style.visibility</p:attrName>
+                                        </p:attrNameLst>
+                                      </p:cBhvr>
+                                      <p:to>
+                                        <p:strVal val="visible"/>
+                                      </p:to>
+                                    </p:set>
+                                    <p:animEffect transition="in" filter="fade">
+                                      <p:cBhvr>
+                                        <p:cTn id="32" dur="2250"/>
+                                        <p:tgtEl>
+                                          <p:spTgt spid="8"/>
+                                        </p:tgtEl>
+                                      </p:cBhvr>
+                                    </p:animEffect>
+                                  </p:childTnLst>
+                                </p:cTn>
+                              </p:par>
+                            </p:childTnLst>
+                          </p:cTn>
+                        </p:par>
+                      </p:childTnLst>
+                    </p:cTn>
+                  </p:par>
+                  <p:par>
+                    <p:cTn id="33" fill="hold">
+                      <p:stCondLst>
+                        <p:cond delay="indefinite"/>
+                      </p:stCondLst>
+                      <p:childTnLst>
+                        <p:par>
+                          <p:cTn id="34" fill="hold">
+                            <p:stCondLst>
+                              <p:cond delay="0"/>
+                            </p:stCondLst>
+                            <p:childTnLst>
+                              <p:par>
+                                <p:cTn id="35" presetID="10" presetClass="entr" presetSubtype="0" fill="hold" grpId="0" nodeType="clickEffect">
+                                  <p:stCondLst>
+                                    <p:cond delay="0"/>
+                                  </p:stCondLst>
+                                  <p:childTnLst>
+                                    <p:set>
+                                      <p:cBhvr>
+                                        <p:cTn id="36" dur="1" fill="hold">
+                                          <p:stCondLst>
+                                            <p:cond delay="0"/>
+                                          </p:stCondLst>
+                                        </p:cTn>
+                                        <p:tgtEl>
+                                          <p:spTgt spid="21"/>
+                                        </p:tgtEl>
+                                        <p:attrNameLst>
+                                          <p:attrName>style.visibility</p:attrName>
+                                        </p:attrNameLst>
+                                      </p:cBhvr>
+                                      <p:to>
+                                        <p:strVal val="visible"/>
+                                      </p:to>
+                                    </p:set>
+                                    <p:animEffect transition="in" filter="fade">
+                                      <p:cBhvr>
+                                        <p:cTn id="37" dur="1750"/>
+                                        <p:tgtEl>
+                                          <p:spTgt spid="21"/>
+                                        </p:tgtEl>
+                                      </p:cBhvr>
+                                    </p:animEffect>
+                                  </p:childTnLst>
+                                </p:cTn>
+                              </p:par>
+                            </p:childTnLst>
+                          </p:cTn>
+                        </p:par>
+                      </p:childTnLst>
+                    </p:cTn>
+                  </p:par>
+                </p:childTnLst>
+              </p:cTn>
+              <p:prevCondLst>
+                <p:cond evt="onPrev" delay="0">
+                  <p:tgtEl>
+                    <p:sldTgt/>
+                  </p:tgtEl>
+                </p:cond>
+              </p:prevCondLst>
+              <p:nextCondLst>
+                <p:cond evt="onNext" delay="0">
+                  <p:tgtEl>
+                    <p:sldTgt/>
+                  </p:tgtEl>
+                </p:cond>
+              </p:nextCondLst>
+            </p:seq>
+          </p:childTnLst>
+        </p:cTn>
+      </p:par>
+    </p:tnLst>
+    <p:bldLst>
+      <p:bldP spid="8" grpId="0" animBg="1"/>
+      <p:bldP spid="9" grpId="0" animBg="1"/>
+      <p:bldP spid="10" grpId="0" animBg="1"/>
+      <p:bldP spid="15" grpId="0"/>
+      <p:bldP spid="17" grpId="0" animBg="1"/>
+      <p:bldP spid="21" grpId="0"/>
+    </p:bldLst>
+  </p:timing>
+</p:sld>
+</file>
+
+<file path=ppt/slides/slide17.xml><?xml version="1.0" encoding="utf-8"?>
+<p:sld xmlns:a="http://schemas.openxmlformats.org/drawingml/2006/main" xmlns:r="http://schemas.openxmlformats.org/officeDocument/2006/relationships" xmlns:p="http://schemas.openxmlformats.org/presentationml/2006/main">
+  <p:cSld>
+    <p:spTree>
+      <p:nvGrpSpPr>
+        <p:cNvPr id="1" name=""/>
+        <p:cNvGrpSpPr/>
+        <p:nvPr/>
+      </p:nvGrpSpPr>
+      <p:grpSpPr>
+        <a:xfrm>
+          <a:off x="0" y="0"/>
+          <a:ext cx="0" cy="0"/>
+          <a:chOff x="0" y="0"/>
+          <a:chExt cx="0" cy="0"/>
+        </a:xfrm>
+      </p:grpSpPr>
+      <p:sp>
+        <p:nvSpPr>
+          <p:cNvPr id="3" name="Content Placeholder 2">
+            <a:extLst>
+              <a:ext uri="{FF2B5EF4-FFF2-40B4-BE49-F238E27FC236}">
+                <a16:creationId xmlns:a16="http://schemas.microsoft.com/office/drawing/2014/main" id="{6C925CEB-E793-4873-8DFE-00348118AE08}"/>
+              </a:ext>
+            </a:extLst>
+          </p:cNvPr>
+          <p:cNvSpPr>
+            <a:spLocks noGrp="1"/>
+          </p:cNvSpPr>
+          <p:nvPr>
+            <p:ph idx="1"/>
+          </p:nvPr>
+        </p:nvSpPr>
+        <p:spPr>
+          <a:xfrm>
+            <a:off x="838200" y="431831"/>
+            <a:ext cx="10515600" cy="1219415"/>
+          </a:xfrm>
+        </p:spPr>
+        <p:txBody>
+          <a:bodyPr/>
+          <a:lstStyle/>
+          <a:p>
+            <a:pPr marL="0" indent="0" algn="ctr">
+              <a:buNone/>
+            </a:pPr>
+            <a:endParaRPr lang="en-US" b="0" dirty="0"/>
+          </a:p>
+          <a:p>
+            <a:endParaRPr lang="en-US" dirty="0"/>
+          </a:p>
+        </p:txBody>
+      </p:sp>
+      <p:sp>
+        <p:nvSpPr>
+          <p:cNvPr id="4" name="TextBox 3">
+            <a:extLst>
+              <a:ext uri="{FF2B5EF4-FFF2-40B4-BE49-F238E27FC236}">
+                <a16:creationId xmlns:a16="http://schemas.microsoft.com/office/drawing/2014/main" id="{704BDD18-D010-4068-AF5F-644919A6FA67}"/>
+              </a:ext>
+            </a:extLst>
+          </p:cNvPr>
+          <p:cNvSpPr txBox="1"/>
+          <p:nvPr/>
+        </p:nvSpPr>
+        <p:spPr>
+          <a:xfrm>
+            <a:off x="1572768" y="2039112"/>
+            <a:ext cx="3744956" cy="369332"/>
+          </a:xfrm>
+          <a:prstGeom prst="rect">
+            <a:avLst/>
+          </a:prstGeom>
+          <a:noFill/>
+        </p:spPr>
+        <p:txBody>
+          <a:bodyPr wrap="square" rtlCol="0">
+            <a:spAutoFit/>
+          </a:bodyPr>
+          <a:lstStyle/>
+          <a:p>
+            <a:endParaRPr lang="en-US" dirty="0"/>
+          </a:p>
+        </p:txBody>
+      </p:sp>
+      <p:pic>
+        <p:nvPicPr>
+          <p:cNvPr id="8" name="Picture 7" descr="A screenshot of a computer&#10;&#10;Description automatically generated">
+            <a:extLst>
+              <a:ext uri="{FF2B5EF4-FFF2-40B4-BE49-F238E27FC236}">
+                <a16:creationId xmlns:a16="http://schemas.microsoft.com/office/drawing/2014/main" id="{E322A027-7E22-4942-9A70-093FC49A3331}"/>
+              </a:ext>
+            </a:extLst>
+          </p:cNvPr>
+          <p:cNvPicPr>
+            <a:picLocks noChangeAspect="1"/>
+          </p:cNvPicPr>
+          <p:nvPr/>
+        </p:nvPicPr>
+        <p:blipFill rotWithShape="1">
+          <a:blip r:embed="rId2">
+            <a:extLst>
+              <a:ext uri="{28A0092B-C50C-407E-A947-70E740481C1C}">
+                <a14:useLocalDpi xmlns:a14="http://schemas.microsoft.com/office/drawing/2010/main" val="0"/>
+              </a:ext>
+            </a:extLst>
+          </a:blip>
+          <a:srcRect l="12954" t="19965" r="4906" b="24547"/>
+          <a:stretch/>
+        </p:blipFill>
+        <p:spPr>
+          <a:xfrm>
+            <a:off x="1088736" y="1277008"/>
+            <a:ext cx="10014527" cy="3805382"/>
+          </a:xfrm>
+          <a:prstGeom prst="rect">
+            <a:avLst/>
+          </a:prstGeom>
+        </p:spPr>
+      </p:pic>
+      <p:sp>
+        <p:nvSpPr>
+          <p:cNvPr id="10" name="Left Bracket 9">
+            <a:extLst>
+              <a:ext uri="{FF2B5EF4-FFF2-40B4-BE49-F238E27FC236}">
+                <a16:creationId xmlns:a16="http://schemas.microsoft.com/office/drawing/2014/main" id="{F647BE04-6F80-4FB5-A0FA-E056E3084033}"/>
+              </a:ext>
+            </a:extLst>
+          </p:cNvPr>
+          <p:cNvSpPr/>
+          <p:nvPr/>
+        </p:nvSpPr>
+        <p:spPr>
+          <a:xfrm rot="16200000">
+            <a:off x="7066640" y="3900674"/>
+            <a:ext cx="88777" cy="763480"/>
+          </a:xfrm>
+          <a:prstGeom prst="leftBracket">
+            <a:avLst/>
+          </a:prstGeom>
+          <a:ln w="28575">
+            <a:solidFill>
+              <a:srgbClr val="FF0000"/>
+            </a:solidFill>
+          </a:ln>
+        </p:spPr>
+        <p:style>
+          <a:lnRef idx="1">
+            <a:schemeClr val="accent1"/>
+          </a:lnRef>
+          <a:fillRef idx="0">
+            <a:schemeClr val="accent1"/>
+          </a:fillRef>
+          <a:effectRef idx="0">
+            <a:schemeClr val="accent1"/>
+          </a:effectRef>
+          <a:fontRef idx="minor">
+            <a:schemeClr val="tx1"/>
+          </a:fontRef>
+        </p:style>
+        <p:txBody>
+          <a:bodyPr rtlCol="0" anchor="ctr"/>
+          <a:lstStyle/>
+          <a:p>
+            <a:pPr algn="ctr"/>
+            <a:endParaRPr lang="en-US"/>
+          </a:p>
+        </p:txBody>
+      </p:sp>
+      <p:sp>
+        <p:nvSpPr>
+          <p:cNvPr id="11" name="TextBox 10">
+            <a:extLst>
+              <a:ext uri="{FF2B5EF4-FFF2-40B4-BE49-F238E27FC236}">
+                <a16:creationId xmlns:a16="http://schemas.microsoft.com/office/drawing/2014/main" id="{33570005-570E-4DE7-9420-2FA54CBA171D}"/>
+              </a:ext>
+            </a:extLst>
+          </p:cNvPr>
+          <p:cNvSpPr txBox="1"/>
+          <p:nvPr/>
+        </p:nvSpPr>
+        <p:spPr>
+          <a:xfrm>
+            <a:off x="6747052" y="4282414"/>
+            <a:ext cx="745717" cy="369332"/>
+          </a:xfrm>
+          <a:prstGeom prst="rect">
+            <a:avLst/>
+          </a:prstGeom>
+          <a:noFill/>
+        </p:spPr>
+        <p:txBody>
+          <a:bodyPr wrap="none" rtlCol="0">
+            <a:spAutoFit/>
+          </a:bodyPr>
+          <a:lstStyle/>
+          <a:p>
+            <a:r>
+              <a:rPr lang="en-US" dirty="0">
+                <a:solidFill>
+                  <a:srgbClr val="FF0000"/>
+                </a:solidFill>
+              </a:rPr>
+              <a:t>~32us</a:t>
+            </a:r>
+          </a:p>
+        </p:txBody>
+      </p:sp>
+      <p:sp>
+        <p:nvSpPr>
+          <p:cNvPr id="12" name="TextBox 11">
+            <a:extLst>
+              <a:ext uri="{FF2B5EF4-FFF2-40B4-BE49-F238E27FC236}">
+                <a16:creationId xmlns:a16="http://schemas.microsoft.com/office/drawing/2014/main" id="{A8FFB0C7-E304-4BBC-AC4D-5DBD4A337C84}"/>
+              </a:ext>
+            </a:extLst>
+          </p:cNvPr>
+          <p:cNvSpPr txBox="1"/>
+          <p:nvPr/>
+        </p:nvSpPr>
+        <p:spPr>
+          <a:xfrm>
+            <a:off x="1189608" y="431831"/>
+            <a:ext cx="4014432" cy="369332"/>
+          </a:xfrm>
+          <a:prstGeom prst="rect">
+            <a:avLst/>
+          </a:prstGeom>
+          <a:noFill/>
+        </p:spPr>
+        <p:txBody>
+          <a:bodyPr wrap="none" rtlCol="0">
+            <a:spAutoFit/>
+          </a:bodyPr>
+          <a:lstStyle/>
+          <a:p>
+            <a:r>
+              <a:rPr lang="en-US" b="1" dirty="0"/>
+              <a:t>And  it was working correctly in Proteus</a:t>
+            </a:r>
+          </a:p>
+        </p:txBody>
+      </p:sp>
+      <p:sp>
+        <p:nvSpPr>
+          <p:cNvPr id="13" name="TextBox 12">
+            <a:extLst>
+              <a:ext uri="{FF2B5EF4-FFF2-40B4-BE49-F238E27FC236}">
+                <a16:creationId xmlns:a16="http://schemas.microsoft.com/office/drawing/2014/main" id="{69372269-C0B6-40EB-86C7-36791218B37E}"/>
+              </a:ext>
+            </a:extLst>
+          </p:cNvPr>
+          <p:cNvSpPr txBox="1"/>
+          <p:nvPr/>
+        </p:nvSpPr>
+        <p:spPr>
+          <a:xfrm>
+            <a:off x="3921214" y="5741934"/>
+            <a:ext cx="2808073" cy="369332"/>
+          </a:xfrm>
+          <a:prstGeom prst="rect">
+            <a:avLst/>
+          </a:prstGeom>
+          <a:noFill/>
+        </p:spPr>
+        <p:txBody>
+          <a:bodyPr wrap="square" rtlCol="0">
+            <a:spAutoFit/>
+          </a:bodyPr>
+          <a:lstStyle/>
+          <a:p>
+            <a:r>
+              <a:rPr lang="en-US" dirty="0">
+                <a:solidFill>
+                  <a:srgbClr val="FF0000"/>
+                </a:solidFill>
+              </a:rPr>
+              <a:t>For 128 (50% duty cycle)</a:t>
+            </a:r>
+          </a:p>
+        </p:txBody>
+      </p:sp>
+      <p:cxnSp>
+        <p:nvCxnSpPr>
+          <p:cNvPr id="15" name="Straight Arrow Connector 14">
+            <a:extLst>
+              <a:ext uri="{FF2B5EF4-FFF2-40B4-BE49-F238E27FC236}">
+                <a16:creationId xmlns:a16="http://schemas.microsoft.com/office/drawing/2014/main" id="{1BF62D86-ED88-4C63-BA88-9A6B9A65F179}"/>
+              </a:ext>
+            </a:extLst>
+          </p:cNvPr>
+          <p:cNvCxnSpPr/>
+          <p:nvPr/>
+        </p:nvCxnSpPr>
+        <p:spPr>
+          <a:xfrm flipV="1">
+            <a:off x="5183324" y="4466274"/>
+            <a:ext cx="1463090" cy="1232231"/>
+          </a:xfrm>
+          <a:prstGeom prst="straightConnector1">
+            <a:avLst/>
+          </a:prstGeom>
+          <a:ln w="38100">
+            <a:solidFill>
+              <a:srgbClr val="FF0000"/>
+            </a:solidFill>
+            <a:tailEnd type="triangle"/>
+          </a:ln>
+        </p:spPr>
+        <p:style>
+          <a:lnRef idx="1">
+            <a:schemeClr val="accent1"/>
+          </a:lnRef>
+          <a:fillRef idx="0">
+            <a:schemeClr val="accent1"/>
+          </a:fillRef>
+          <a:effectRef idx="0">
+            <a:schemeClr val="accent1"/>
+          </a:effectRef>
+          <a:fontRef idx="minor">
+            <a:schemeClr val="tx1"/>
+          </a:fontRef>
+        </p:style>
+      </p:cxnSp>
+    </p:spTree>
+    <p:extLst>
+      <p:ext uri="{BB962C8B-B14F-4D97-AF65-F5344CB8AC3E}">
+        <p14:creationId xmlns:p14="http://schemas.microsoft.com/office/powerpoint/2010/main" val="3667338062"/>
       </p:ext>
     </p:extLst>
   </p:cSld>

</xml_diff>